<commit_message>
Updated Diagrams for DG
</commit_message>
<xml_diff>
--- a/docs/tP Diagram Editable.pptx
+++ b/docs/tP Diagram Editable.pptx
@@ -9,7 +9,9 @@
     <p:sldId id="258" r:id="rId3"/>
     <p:sldId id="259" r:id="rId4"/>
     <p:sldId id="260" r:id="rId5"/>
-    <p:sldId id="261" r:id="rId6"/>
+    <p:sldId id="262" r:id="rId6"/>
+    <p:sldId id="263" r:id="rId7"/>
+    <p:sldId id="261" r:id="rId8"/>
   </p:sldIdLst>
   <p:sldSz cx="12192000" cy="6858000"/>
   <p:notesSz cx="6858000" cy="9144000"/>
@@ -108,6 +110,11 @@
       </a:defRPr>
     </a:lvl9pPr>
   </p:defaultTextStyle>
+  <p:extLst>
+    <p:ext uri="{EFAFB233-063F-42B5-8137-9DF3F51BA10A}">
+      <p15:sldGuideLst xmlns:p15="http://schemas.microsoft.com/office/powerpoint/2012/main"/>
+    </p:ext>
+  </p:extLst>
 </p:presentation>
 </file>
 
@@ -8386,6 +8393,1077 @@
       </p:grpSpPr>
       <p:sp>
         <p:nvSpPr>
+          <p:cNvPr id="14" name="Rectangle 13">
+            <a:extLst>
+              <a:ext uri="{FF2B5EF4-FFF2-40B4-BE49-F238E27FC236}">
+                <a16:creationId xmlns:a16="http://schemas.microsoft.com/office/drawing/2014/main" id="{6D67AF57-0580-A05E-CA20-3A60ECA5F0B5}"/>
+              </a:ext>
+            </a:extLst>
+          </p:cNvPr>
+          <p:cNvSpPr/>
+          <p:nvPr/>
+        </p:nvSpPr>
+        <p:spPr>
+          <a:xfrm>
+            <a:off x="571947" y="2660224"/>
+            <a:ext cx="1449800" cy="410147"/>
+          </a:xfrm>
+          <a:prstGeom prst="rect">
+            <a:avLst/>
+          </a:prstGeom>
+          <a:ln>
+            <a:solidFill>
+              <a:schemeClr val="tx1"/>
+            </a:solidFill>
+          </a:ln>
+        </p:spPr>
+        <p:style>
+          <a:lnRef idx="2">
+            <a:schemeClr val="accent4">
+              <a:shade val="50000"/>
+            </a:schemeClr>
+          </a:lnRef>
+          <a:fillRef idx="1">
+            <a:schemeClr val="accent4"/>
+          </a:fillRef>
+          <a:effectRef idx="0">
+            <a:schemeClr val="accent4"/>
+          </a:effectRef>
+          <a:fontRef idx="minor">
+            <a:schemeClr val="lt1"/>
+          </a:fontRef>
+        </p:style>
+        <p:txBody>
+          <a:bodyPr rtlCol="0" anchor="ctr"/>
+          <a:lstStyle/>
+          <a:p>
+            <a:pPr algn="ctr"/>
+            <a:r>
+              <a:rPr lang="en-US" u="sng" dirty="0">
+                <a:solidFill>
+                  <a:schemeClr val="tx1"/>
+                </a:solidFill>
+              </a:rPr>
+              <a:t>:Duck</a:t>
+            </a:r>
+          </a:p>
+        </p:txBody>
+      </p:sp>
+      <p:sp>
+        <p:nvSpPr>
+          <p:cNvPr id="15" name="Rectangle 14">
+            <a:extLst>
+              <a:ext uri="{FF2B5EF4-FFF2-40B4-BE49-F238E27FC236}">
+                <a16:creationId xmlns:a16="http://schemas.microsoft.com/office/drawing/2014/main" id="{76BFD727-9871-CCDC-082F-2133529656A4}"/>
+              </a:ext>
+            </a:extLst>
+          </p:cNvPr>
+          <p:cNvSpPr/>
+          <p:nvPr/>
+        </p:nvSpPr>
+        <p:spPr>
+          <a:xfrm>
+            <a:off x="2393756" y="2660224"/>
+            <a:ext cx="1449800" cy="410147"/>
+          </a:xfrm>
+          <a:prstGeom prst="rect">
+            <a:avLst/>
+          </a:prstGeom>
+          <a:ln>
+            <a:solidFill>
+              <a:schemeClr val="tx1"/>
+            </a:solidFill>
+          </a:ln>
+        </p:spPr>
+        <p:style>
+          <a:lnRef idx="2">
+            <a:schemeClr val="accent4">
+              <a:shade val="50000"/>
+            </a:schemeClr>
+          </a:lnRef>
+          <a:fillRef idx="1">
+            <a:schemeClr val="accent4"/>
+          </a:fillRef>
+          <a:effectRef idx="0">
+            <a:schemeClr val="accent4"/>
+          </a:effectRef>
+          <a:fontRef idx="minor">
+            <a:schemeClr val="lt1"/>
+          </a:fontRef>
+        </p:style>
+        <p:txBody>
+          <a:bodyPr rtlCol="0" anchor="ctr"/>
+          <a:lstStyle/>
+          <a:p>
+            <a:pPr algn="ctr"/>
+            <a:r>
+              <a:rPr lang="en-US" u="sng" dirty="0">
+                <a:solidFill>
+                  <a:schemeClr val="tx1"/>
+                </a:solidFill>
+              </a:rPr>
+              <a:t>:Parser</a:t>
+            </a:r>
+          </a:p>
+        </p:txBody>
+      </p:sp>
+      <p:sp>
+        <p:nvSpPr>
+          <p:cNvPr id="16" name="Rectangle 15">
+            <a:extLst>
+              <a:ext uri="{FF2B5EF4-FFF2-40B4-BE49-F238E27FC236}">
+                <a16:creationId xmlns:a16="http://schemas.microsoft.com/office/drawing/2014/main" id="{4ED65728-8D56-3CB9-CA07-0A627741DF1F}"/>
+              </a:ext>
+            </a:extLst>
+          </p:cNvPr>
+          <p:cNvSpPr/>
+          <p:nvPr/>
+        </p:nvSpPr>
+        <p:spPr>
+          <a:xfrm>
+            <a:off x="4215565" y="2660223"/>
+            <a:ext cx="1449800" cy="410147"/>
+          </a:xfrm>
+          <a:prstGeom prst="rect">
+            <a:avLst/>
+          </a:prstGeom>
+          <a:ln>
+            <a:solidFill>
+              <a:schemeClr val="tx1"/>
+            </a:solidFill>
+          </a:ln>
+        </p:spPr>
+        <p:style>
+          <a:lnRef idx="2">
+            <a:schemeClr val="accent4">
+              <a:shade val="50000"/>
+            </a:schemeClr>
+          </a:lnRef>
+          <a:fillRef idx="1">
+            <a:schemeClr val="accent4"/>
+          </a:fillRef>
+          <a:effectRef idx="0">
+            <a:schemeClr val="accent4"/>
+          </a:effectRef>
+          <a:fontRef idx="minor">
+            <a:schemeClr val="lt1"/>
+          </a:fontRef>
+        </p:style>
+        <p:txBody>
+          <a:bodyPr rtlCol="0" anchor="ctr"/>
+          <a:lstStyle/>
+          <a:p>
+            <a:pPr algn="ctr"/>
+            <a:r>
+              <a:rPr lang="en-US" u="sng" dirty="0">
+                <a:solidFill>
+                  <a:schemeClr val="tx1"/>
+                </a:solidFill>
+              </a:rPr>
+              <a:t>:TaskList</a:t>
+            </a:r>
+          </a:p>
+        </p:txBody>
+      </p:sp>
+      <p:sp>
+        <p:nvSpPr>
+          <p:cNvPr id="36" name="Rectangle 35">
+            <a:extLst>
+              <a:ext uri="{FF2B5EF4-FFF2-40B4-BE49-F238E27FC236}">
+                <a16:creationId xmlns:a16="http://schemas.microsoft.com/office/drawing/2014/main" id="{6EC4CEAC-897E-5DC8-3E7F-F2CAF2008764}"/>
+              </a:ext>
+            </a:extLst>
+          </p:cNvPr>
+          <p:cNvSpPr/>
+          <p:nvPr/>
+        </p:nvSpPr>
+        <p:spPr>
+          <a:xfrm>
+            <a:off x="6096002" y="2660225"/>
+            <a:ext cx="1944099" cy="1366492"/>
+          </a:xfrm>
+          <a:prstGeom prst="rect">
+            <a:avLst/>
+          </a:prstGeom>
+          <a:noFill/>
+        </p:spPr>
+        <p:style>
+          <a:lnRef idx="2">
+            <a:schemeClr val="accent1">
+              <a:shade val="50000"/>
+            </a:schemeClr>
+          </a:lnRef>
+          <a:fillRef idx="1">
+            <a:schemeClr val="accent1"/>
+          </a:fillRef>
+          <a:effectRef idx="0">
+            <a:schemeClr val="accent1"/>
+          </a:effectRef>
+          <a:fontRef idx="minor">
+            <a:schemeClr val="lt1"/>
+          </a:fontRef>
+        </p:style>
+        <p:txBody>
+          <a:bodyPr rtlCol="0" anchor="ctr"/>
+          <a:lstStyle/>
+          <a:p>
+            <a:pPr algn="ctr"/>
+            <a:endParaRPr lang="en-US"/>
+          </a:p>
+        </p:txBody>
+      </p:sp>
+      <p:sp>
+        <p:nvSpPr>
+          <p:cNvPr id="46" name="Rectangle 45">
+            <a:extLst>
+              <a:ext uri="{FF2B5EF4-FFF2-40B4-BE49-F238E27FC236}">
+                <a16:creationId xmlns:a16="http://schemas.microsoft.com/office/drawing/2014/main" id="{9521368B-0E03-F264-915F-BA287A49B2CE}"/>
+              </a:ext>
+            </a:extLst>
+          </p:cNvPr>
+          <p:cNvSpPr/>
+          <p:nvPr/>
+        </p:nvSpPr>
+        <p:spPr>
+          <a:xfrm>
+            <a:off x="6096001" y="2660224"/>
+            <a:ext cx="1944099" cy="410147"/>
+          </a:xfrm>
+          <a:prstGeom prst="rect">
+            <a:avLst/>
+          </a:prstGeom>
+          <a:ln>
+            <a:solidFill>
+              <a:schemeClr val="tx1"/>
+            </a:solidFill>
+          </a:ln>
+        </p:spPr>
+        <p:style>
+          <a:lnRef idx="2">
+            <a:schemeClr val="accent4">
+              <a:shade val="50000"/>
+            </a:schemeClr>
+          </a:lnRef>
+          <a:fillRef idx="1">
+            <a:schemeClr val="accent4"/>
+          </a:fillRef>
+          <a:effectRef idx="0">
+            <a:schemeClr val="accent4"/>
+          </a:effectRef>
+          <a:fontRef idx="minor">
+            <a:schemeClr val="lt1"/>
+          </a:fontRef>
+        </p:style>
+        <p:txBody>
+          <a:bodyPr rtlCol="0" anchor="ctr"/>
+          <a:lstStyle/>
+          <a:p>
+            <a:pPr algn="ctr"/>
+            <a:r>
+              <a:rPr lang="en-US" u="sng" dirty="0">
+                <a:solidFill>
+                  <a:schemeClr val="tx1"/>
+                </a:solidFill>
+              </a:rPr>
+              <a:t>:SchoolClass</a:t>
+            </a:r>
+          </a:p>
+        </p:txBody>
+      </p:sp>
+      <p:sp>
+        <p:nvSpPr>
+          <p:cNvPr id="47" name="TextBox 46">
+            <a:extLst>
+              <a:ext uri="{FF2B5EF4-FFF2-40B4-BE49-F238E27FC236}">
+                <a16:creationId xmlns:a16="http://schemas.microsoft.com/office/drawing/2014/main" id="{1557272B-FDE0-06B1-6CE9-14289BE80EE4}"/>
+              </a:ext>
+            </a:extLst>
+          </p:cNvPr>
+          <p:cNvSpPr txBox="1"/>
+          <p:nvPr/>
+        </p:nvSpPr>
+        <p:spPr>
+          <a:xfrm>
+            <a:off x="6096000" y="3070371"/>
+            <a:ext cx="1944099" cy="830997"/>
+          </a:xfrm>
+          <a:prstGeom prst="rect">
+            <a:avLst/>
+          </a:prstGeom>
+          <a:noFill/>
+        </p:spPr>
+        <p:txBody>
+          <a:bodyPr wrap="square" rtlCol="0">
+            <a:spAutoFit/>
+          </a:bodyPr>
+          <a:lstStyle/>
+          <a:p>
+            <a:r>
+              <a:rPr lang="en-SG" sz="1200" dirty="0"/>
+              <a:t>Description: Bring laptop</a:t>
+            </a:r>
+          </a:p>
+          <a:p>
+            <a:r>
+              <a:rPr lang="en-SG" sz="1200" dirty="0"/>
+              <a:t>className: CS2113</a:t>
+            </a:r>
+          </a:p>
+          <a:p>
+            <a:r>
+              <a:rPr lang="en-SG" sz="1200" dirty="0"/>
+              <a:t>start: 2023/03/23 1000</a:t>
+            </a:r>
+          </a:p>
+          <a:p>
+            <a:r>
+              <a:rPr lang="en-SG" sz="1200" dirty="0"/>
+              <a:t>end: 2023/03/23 1100</a:t>
+            </a:r>
+          </a:p>
+        </p:txBody>
+      </p:sp>
+      <p:cxnSp>
+        <p:nvCxnSpPr>
+          <p:cNvPr id="49" name="Straight Arrow Connector 48">
+            <a:extLst>
+              <a:ext uri="{FF2B5EF4-FFF2-40B4-BE49-F238E27FC236}">
+                <a16:creationId xmlns:a16="http://schemas.microsoft.com/office/drawing/2014/main" id="{8289DBC8-9F9F-AFFD-ECD7-C0BA0B27AF79}"/>
+              </a:ext>
+            </a:extLst>
+          </p:cNvPr>
+          <p:cNvCxnSpPr>
+            <a:stCxn id="14" idx="3"/>
+            <a:endCxn id="15" idx="1"/>
+          </p:cNvCxnSpPr>
+          <p:nvPr/>
+        </p:nvCxnSpPr>
+        <p:spPr>
+          <a:xfrm>
+            <a:off x="2021747" y="2865298"/>
+            <a:ext cx="372009" cy="0"/>
+          </a:xfrm>
+          <a:prstGeom prst="straightConnector1">
+            <a:avLst/>
+          </a:prstGeom>
+          <a:ln>
+            <a:solidFill>
+              <a:schemeClr val="tx1"/>
+            </a:solidFill>
+            <a:tailEnd type="triangle"/>
+          </a:ln>
+        </p:spPr>
+        <p:style>
+          <a:lnRef idx="1">
+            <a:schemeClr val="accent1"/>
+          </a:lnRef>
+          <a:fillRef idx="0">
+            <a:schemeClr val="accent1"/>
+          </a:fillRef>
+          <a:effectRef idx="0">
+            <a:schemeClr val="accent1"/>
+          </a:effectRef>
+          <a:fontRef idx="minor">
+            <a:schemeClr val="tx1"/>
+          </a:fontRef>
+        </p:style>
+      </p:cxnSp>
+      <p:cxnSp>
+        <p:nvCxnSpPr>
+          <p:cNvPr id="51" name="Straight Arrow Connector 50">
+            <a:extLst>
+              <a:ext uri="{FF2B5EF4-FFF2-40B4-BE49-F238E27FC236}">
+                <a16:creationId xmlns:a16="http://schemas.microsoft.com/office/drawing/2014/main" id="{510BAB96-5602-6FF5-B56F-6334997F660E}"/>
+              </a:ext>
+            </a:extLst>
+          </p:cNvPr>
+          <p:cNvCxnSpPr>
+            <a:stCxn id="15" idx="3"/>
+            <a:endCxn id="16" idx="1"/>
+          </p:cNvCxnSpPr>
+          <p:nvPr/>
+        </p:nvCxnSpPr>
+        <p:spPr>
+          <a:xfrm flipV="1">
+            <a:off x="3843556" y="2865297"/>
+            <a:ext cx="372009" cy="1"/>
+          </a:xfrm>
+          <a:prstGeom prst="straightConnector1">
+            <a:avLst/>
+          </a:prstGeom>
+          <a:ln>
+            <a:solidFill>
+              <a:schemeClr val="tx1"/>
+            </a:solidFill>
+            <a:tailEnd type="triangle"/>
+          </a:ln>
+        </p:spPr>
+        <p:style>
+          <a:lnRef idx="1">
+            <a:schemeClr val="accent1"/>
+          </a:lnRef>
+          <a:fillRef idx="0">
+            <a:schemeClr val="accent1"/>
+          </a:fillRef>
+          <a:effectRef idx="0">
+            <a:schemeClr val="accent1"/>
+          </a:effectRef>
+          <a:fontRef idx="minor">
+            <a:schemeClr val="tx1"/>
+          </a:fontRef>
+        </p:style>
+      </p:cxnSp>
+      <p:cxnSp>
+        <p:nvCxnSpPr>
+          <p:cNvPr id="53" name="Straight Arrow Connector 52">
+            <a:extLst>
+              <a:ext uri="{FF2B5EF4-FFF2-40B4-BE49-F238E27FC236}">
+                <a16:creationId xmlns:a16="http://schemas.microsoft.com/office/drawing/2014/main" id="{0FBEE12A-E7AA-5249-6F4E-1DFF8D9FF54C}"/>
+              </a:ext>
+            </a:extLst>
+          </p:cNvPr>
+          <p:cNvCxnSpPr>
+            <a:stCxn id="16" idx="3"/>
+            <a:endCxn id="46" idx="1"/>
+          </p:cNvCxnSpPr>
+          <p:nvPr/>
+        </p:nvCxnSpPr>
+        <p:spPr>
+          <a:xfrm>
+            <a:off x="5665365" y="2865297"/>
+            <a:ext cx="430636" cy="1"/>
+          </a:xfrm>
+          <a:prstGeom prst="straightConnector1">
+            <a:avLst/>
+          </a:prstGeom>
+          <a:ln>
+            <a:solidFill>
+              <a:schemeClr val="tx1"/>
+            </a:solidFill>
+            <a:tailEnd type="triangle"/>
+          </a:ln>
+        </p:spPr>
+        <p:style>
+          <a:lnRef idx="1">
+            <a:schemeClr val="accent1"/>
+          </a:lnRef>
+          <a:fillRef idx="0">
+            <a:schemeClr val="accent1"/>
+          </a:fillRef>
+          <a:effectRef idx="0">
+            <a:schemeClr val="accent1"/>
+          </a:effectRef>
+          <a:fontRef idx="minor">
+            <a:schemeClr val="tx1"/>
+          </a:fontRef>
+        </p:style>
+      </p:cxnSp>
+      <p:sp>
+        <p:nvSpPr>
+          <p:cNvPr id="60" name="Rectangle 59">
+            <a:extLst>
+              <a:ext uri="{FF2B5EF4-FFF2-40B4-BE49-F238E27FC236}">
+                <a16:creationId xmlns:a16="http://schemas.microsoft.com/office/drawing/2014/main" id="{18026747-EBAE-A2E1-6377-C9371F095C3C}"/>
+              </a:ext>
+            </a:extLst>
+          </p:cNvPr>
+          <p:cNvSpPr/>
+          <p:nvPr/>
+        </p:nvSpPr>
+        <p:spPr>
+          <a:xfrm>
+            <a:off x="8470734" y="2660222"/>
+            <a:ext cx="1449800" cy="410147"/>
+          </a:xfrm>
+          <a:prstGeom prst="rect">
+            <a:avLst/>
+          </a:prstGeom>
+          <a:ln>
+            <a:solidFill>
+              <a:schemeClr val="tx1"/>
+            </a:solidFill>
+          </a:ln>
+        </p:spPr>
+        <p:style>
+          <a:lnRef idx="2">
+            <a:schemeClr val="accent4">
+              <a:shade val="50000"/>
+            </a:schemeClr>
+          </a:lnRef>
+          <a:fillRef idx="1">
+            <a:schemeClr val="accent4"/>
+          </a:fillRef>
+          <a:effectRef idx="0">
+            <a:schemeClr val="accent4"/>
+          </a:effectRef>
+          <a:fontRef idx="minor">
+            <a:schemeClr val="lt1"/>
+          </a:fontRef>
+        </p:style>
+        <p:txBody>
+          <a:bodyPr rtlCol="0" anchor="ctr"/>
+          <a:lstStyle/>
+          <a:p>
+            <a:pPr algn="ctr"/>
+            <a:r>
+              <a:rPr lang="en-US" u="sng" dirty="0">
+                <a:solidFill>
+                  <a:schemeClr val="tx1"/>
+                </a:solidFill>
+              </a:rPr>
+              <a:t>:Ui</a:t>
+            </a:r>
+          </a:p>
+        </p:txBody>
+      </p:sp>
+      <p:cxnSp>
+        <p:nvCxnSpPr>
+          <p:cNvPr id="61" name="Straight Arrow Connector 60">
+            <a:extLst>
+              <a:ext uri="{FF2B5EF4-FFF2-40B4-BE49-F238E27FC236}">
+                <a16:creationId xmlns:a16="http://schemas.microsoft.com/office/drawing/2014/main" id="{6D2959EC-50EE-5DA3-883D-F21701E735BE}"/>
+              </a:ext>
+            </a:extLst>
+          </p:cNvPr>
+          <p:cNvCxnSpPr/>
+          <p:nvPr/>
+        </p:nvCxnSpPr>
+        <p:spPr>
+          <a:xfrm>
+            <a:off x="8040097" y="2865295"/>
+            <a:ext cx="430636" cy="1"/>
+          </a:xfrm>
+          <a:prstGeom prst="straightConnector1">
+            <a:avLst/>
+          </a:prstGeom>
+          <a:ln>
+            <a:solidFill>
+              <a:schemeClr val="tx1"/>
+            </a:solidFill>
+            <a:tailEnd type="triangle"/>
+          </a:ln>
+        </p:spPr>
+        <p:style>
+          <a:lnRef idx="1">
+            <a:schemeClr val="accent1"/>
+          </a:lnRef>
+          <a:fillRef idx="0">
+            <a:schemeClr val="accent1"/>
+          </a:fillRef>
+          <a:effectRef idx="0">
+            <a:schemeClr val="accent1"/>
+          </a:effectRef>
+          <a:fontRef idx="minor">
+            <a:schemeClr val="tx1"/>
+          </a:fontRef>
+        </p:style>
+      </p:cxnSp>
+    </p:spTree>
+    <p:extLst>
+      <p:ext uri="{BB962C8B-B14F-4D97-AF65-F5344CB8AC3E}">
+        <p14:creationId xmlns:p14="http://schemas.microsoft.com/office/powerpoint/2010/main" val="601594056"/>
+      </p:ext>
+    </p:extLst>
+  </p:cSld>
+  <p:clrMapOvr>
+    <a:masterClrMapping/>
+  </p:clrMapOvr>
+</p:sld>
+</file>
+
+<file path=ppt/slides/slide6.xml><?xml version="1.0" encoding="utf-8"?>
+<p:sld xmlns:a="http://schemas.openxmlformats.org/drawingml/2006/main" xmlns:r="http://schemas.openxmlformats.org/officeDocument/2006/relationships" xmlns:p="http://schemas.openxmlformats.org/presentationml/2006/main">
+  <p:cSld>
+    <p:spTree>
+      <p:nvGrpSpPr>
+        <p:cNvPr id="1" name=""/>
+        <p:cNvGrpSpPr/>
+        <p:nvPr/>
+      </p:nvGrpSpPr>
+      <p:grpSpPr>
+        <a:xfrm>
+          <a:off x="0" y="0"/>
+          <a:ext cx="0" cy="0"/>
+          <a:chOff x="0" y="0"/>
+          <a:chExt cx="0" cy="0"/>
+        </a:xfrm>
+      </p:grpSpPr>
+      <p:sp>
+        <p:nvSpPr>
+          <p:cNvPr id="58" name="Rectangle 57">
+            <a:extLst>
+              <a:ext uri="{FF2B5EF4-FFF2-40B4-BE49-F238E27FC236}">
+                <a16:creationId xmlns:a16="http://schemas.microsoft.com/office/drawing/2014/main" id="{B511BD83-A563-40C2-CA04-4A0759AA9F2D}"/>
+              </a:ext>
+            </a:extLst>
+          </p:cNvPr>
+          <p:cNvSpPr/>
+          <p:nvPr/>
+        </p:nvSpPr>
+        <p:spPr>
+          <a:xfrm>
+            <a:off x="5410898" y="2256637"/>
+            <a:ext cx="2141736" cy="544588"/>
+          </a:xfrm>
+          <a:prstGeom prst="rect">
+            <a:avLst/>
+          </a:prstGeom>
+        </p:spPr>
+        <p:style>
+          <a:lnRef idx="2">
+            <a:schemeClr val="accent4">
+              <a:shade val="50000"/>
+            </a:schemeClr>
+          </a:lnRef>
+          <a:fillRef idx="1">
+            <a:schemeClr val="accent4"/>
+          </a:fillRef>
+          <a:effectRef idx="0">
+            <a:schemeClr val="accent4"/>
+          </a:effectRef>
+          <a:fontRef idx="minor">
+            <a:schemeClr val="lt1"/>
+          </a:fontRef>
+        </p:style>
+        <p:txBody>
+          <a:bodyPr rtlCol="0" anchor="ctr"/>
+          <a:lstStyle/>
+          <a:p>
+            <a:pPr algn="ctr"/>
+            <a:endParaRPr lang="en-US"/>
+          </a:p>
+        </p:txBody>
+      </p:sp>
+      <p:sp>
+        <p:nvSpPr>
+          <p:cNvPr id="10" name="Rectangle 9">
+            <a:extLst>
+              <a:ext uri="{FF2B5EF4-FFF2-40B4-BE49-F238E27FC236}">
+                <a16:creationId xmlns:a16="http://schemas.microsoft.com/office/drawing/2014/main" id="{AEFFFB78-E723-C5FB-D1FD-FFF3E63028C9}"/>
+              </a:ext>
+            </a:extLst>
+          </p:cNvPr>
+          <p:cNvSpPr/>
+          <p:nvPr/>
+        </p:nvSpPr>
+        <p:spPr>
+          <a:xfrm>
+            <a:off x="5410899" y="2256637"/>
+            <a:ext cx="2139193" cy="3271707"/>
+          </a:xfrm>
+          <a:prstGeom prst="rect">
+            <a:avLst/>
+          </a:prstGeom>
+          <a:noFill/>
+        </p:spPr>
+        <p:style>
+          <a:lnRef idx="2">
+            <a:schemeClr val="accent1">
+              <a:shade val="50000"/>
+            </a:schemeClr>
+          </a:lnRef>
+          <a:fillRef idx="1">
+            <a:schemeClr val="accent1"/>
+          </a:fillRef>
+          <a:effectRef idx="0">
+            <a:schemeClr val="accent1"/>
+          </a:effectRef>
+          <a:fontRef idx="minor">
+            <a:schemeClr val="lt1"/>
+          </a:fontRef>
+        </p:style>
+        <p:txBody>
+          <a:bodyPr rtlCol="0" anchor="ctr"/>
+          <a:lstStyle/>
+          <a:p>
+            <a:pPr algn="ctr"/>
+            <a:endParaRPr lang="en-US"/>
+          </a:p>
+        </p:txBody>
+      </p:sp>
+      <p:sp>
+        <p:nvSpPr>
+          <p:cNvPr id="4" name="Rectangle 3">
+            <a:extLst>
+              <a:ext uri="{FF2B5EF4-FFF2-40B4-BE49-F238E27FC236}">
+                <a16:creationId xmlns:a16="http://schemas.microsoft.com/office/drawing/2014/main" id="{4FFB77A6-9FE8-B162-65B4-FBCEF4185036}"/>
+              </a:ext>
+            </a:extLst>
+          </p:cNvPr>
+          <p:cNvSpPr/>
+          <p:nvPr/>
+        </p:nvSpPr>
+        <p:spPr>
+          <a:xfrm>
+            <a:off x="1216404" y="1166069"/>
+            <a:ext cx="10477849" cy="5008227"/>
+          </a:xfrm>
+          <a:prstGeom prst="rect">
+            <a:avLst/>
+          </a:prstGeom>
+          <a:noFill/>
+        </p:spPr>
+        <p:style>
+          <a:lnRef idx="2">
+            <a:schemeClr val="accent1">
+              <a:shade val="50000"/>
+            </a:schemeClr>
+          </a:lnRef>
+          <a:fillRef idx="1">
+            <a:schemeClr val="accent1"/>
+          </a:fillRef>
+          <a:effectRef idx="0">
+            <a:schemeClr val="accent1"/>
+          </a:effectRef>
+          <a:fontRef idx="minor">
+            <a:schemeClr val="lt1"/>
+          </a:fontRef>
+        </p:style>
+        <p:txBody>
+          <a:bodyPr rtlCol="0" anchor="ctr"/>
+          <a:lstStyle/>
+          <a:p>
+            <a:pPr algn="ctr"/>
+            <a:endParaRPr lang="en-US"/>
+          </a:p>
+        </p:txBody>
+      </p:sp>
+      <p:sp>
+        <p:nvSpPr>
+          <p:cNvPr id="5" name="TextBox 4">
+            <a:extLst>
+              <a:ext uri="{FF2B5EF4-FFF2-40B4-BE49-F238E27FC236}">
+                <a16:creationId xmlns:a16="http://schemas.microsoft.com/office/drawing/2014/main" id="{17DD665C-F552-BF86-47E0-46FC65A4C442}"/>
+              </a:ext>
+            </a:extLst>
+          </p:cNvPr>
+          <p:cNvSpPr txBox="1"/>
+          <p:nvPr/>
+        </p:nvSpPr>
+        <p:spPr>
+          <a:xfrm>
+            <a:off x="5751057" y="630249"/>
+            <a:ext cx="898259" cy="369332"/>
+          </a:xfrm>
+          <a:prstGeom prst="rect">
+            <a:avLst/>
+          </a:prstGeom>
+          <a:noFill/>
+        </p:spPr>
+        <p:txBody>
+          <a:bodyPr wrap="none" rtlCol="0">
+            <a:spAutoFit/>
+          </a:bodyPr>
+          <a:lstStyle/>
+          <a:p>
+            <a:r>
+              <a:rPr lang="en-US" dirty="0"/>
+              <a:t>TaskList</a:t>
+            </a:r>
+          </a:p>
+        </p:txBody>
+      </p:sp>
+      <p:sp>
+        <p:nvSpPr>
+          <p:cNvPr id="6" name="TextBox 5">
+            <a:extLst>
+              <a:ext uri="{FF2B5EF4-FFF2-40B4-BE49-F238E27FC236}">
+                <a16:creationId xmlns:a16="http://schemas.microsoft.com/office/drawing/2014/main" id="{A49F0FB4-01EB-6B9F-6037-0B2AB7741466}"/>
+              </a:ext>
+            </a:extLst>
+          </p:cNvPr>
+          <p:cNvSpPr txBox="1"/>
+          <p:nvPr/>
+        </p:nvSpPr>
+        <p:spPr>
+          <a:xfrm>
+            <a:off x="5751057" y="2346308"/>
+            <a:ext cx="1573137" cy="369332"/>
+          </a:xfrm>
+          <a:prstGeom prst="rect">
+            <a:avLst/>
+          </a:prstGeom>
+          <a:noFill/>
+        </p:spPr>
+        <p:txBody>
+          <a:bodyPr wrap="square" rtlCol="0">
+            <a:spAutoFit/>
+          </a:bodyPr>
+          <a:lstStyle/>
+          <a:p>
+            <a:r>
+              <a:rPr lang="en-US" dirty="0"/>
+              <a:t>SchoolClass_1</a:t>
+            </a:r>
+          </a:p>
+        </p:txBody>
+      </p:sp>
+      <p:cxnSp>
+        <p:nvCxnSpPr>
+          <p:cNvPr id="12" name="Straight Connector 11">
+            <a:extLst>
+              <a:ext uri="{FF2B5EF4-FFF2-40B4-BE49-F238E27FC236}">
+                <a16:creationId xmlns:a16="http://schemas.microsoft.com/office/drawing/2014/main" id="{CFBFF283-68C8-C8CF-9E56-8B88EAE578EC}"/>
+              </a:ext>
+            </a:extLst>
+          </p:cNvPr>
+          <p:cNvCxnSpPr>
+            <a:cxnSpLocks/>
+          </p:cNvCxnSpPr>
+          <p:nvPr/>
+        </p:nvCxnSpPr>
+        <p:spPr>
+          <a:xfrm>
+            <a:off x="5410899" y="2801923"/>
+            <a:ext cx="2139193" cy="0"/>
+          </a:xfrm>
+          <a:prstGeom prst="line">
+            <a:avLst/>
+          </a:prstGeom>
+        </p:spPr>
+        <p:style>
+          <a:lnRef idx="1">
+            <a:schemeClr val="accent1"/>
+          </a:lnRef>
+          <a:fillRef idx="0">
+            <a:schemeClr val="accent1"/>
+          </a:fillRef>
+          <a:effectRef idx="0">
+            <a:schemeClr val="accent1"/>
+          </a:effectRef>
+          <a:fontRef idx="minor">
+            <a:schemeClr val="tx1"/>
+          </a:fontRef>
+        </p:style>
+      </p:cxnSp>
+      <p:cxnSp>
+        <p:nvCxnSpPr>
+          <p:cNvPr id="13" name="Straight Connector 12">
+            <a:extLst>
+              <a:ext uri="{FF2B5EF4-FFF2-40B4-BE49-F238E27FC236}">
+                <a16:creationId xmlns:a16="http://schemas.microsoft.com/office/drawing/2014/main" id="{1C415CA9-459C-76AA-AC54-59F9F86BDE67}"/>
+              </a:ext>
+            </a:extLst>
+          </p:cNvPr>
+          <p:cNvCxnSpPr>
+            <a:cxnSpLocks/>
+          </p:cNvCxnSpPr>
+          <p:nvPr/>
+        </p:nvCxnSpPr>
+        <p:spPr>
+          <a:xfrm>
+            <a:off x="5410899" y="3957507"/>
+            <a:ext cx="2139193" cy="0"/>
+          </a:xfrm>
+          <a:prstGeom prst="line">
+            <a:avLst/>
+          </a:prstGeom>
+        </p:spPr>
+        <p:style>
+          <a:lnRef idx="1">
+            <a:schemeClr val="accent1"/>
+          </a:lnRef>
+          <a:fillRef idx="0">
+            <a:schemeClr val="accent1"/>
+          </a:fillRef>
+          <a:effectRef idx="0">
+            <a:schemeClr val="accent1"/>
+          </a:effectRef>
+          <a:fontRef idx="minor">
+            <a:schemeClr val="tx1"/>
+          </a:fontRef>
+        </p:style>
+      </p:cxnSp>
+      <p:sp>
+        <p:nvSpPr>
+          <p:cNvPr id="14" name="TextBox 13">
+            <a:extLst>
+              <a:ext uri="{FF2B5EF4-FFF2-40B4-BE49-F238E27FC236}">
+                <a16:creationId xmlns:a16="http://schemas.microsoft.com/office/drawing/2014/main" id="{665769AB-C115-84DA-598F-7173FD23550B}"/>
+              </a:ext>
+            </a:extLst>
+          </p:cNvPr>
+          <p:cNvSpPr txBox="1"/>
+          <p:nvPr/>
+        </p:nvSpPr>
+        <p:spPr>
+          <a:xfrm>
+            <a:off x="5410899" y="2801923"/>
+            <a:ext cx="1990225" cy="1200329"/>
+          </a:xfrm>
+          <a:prstGeom prst="rect">
+            <a:avLst/>
+          </a:prstGeom>
+          <a:noFill/>
+        </p:spPr>
+        <p:txBody>
+          <a:bodyPr wrap="none" rtlCol="0">
+            <a:spAutoFit/>
+          </a:bodyPr>
+          <a:lstStyle/>
+          <a:p>
+            <a:r>
+              <a:rPr lang="en-US" dirty="0"/>
+              <a:t>-description: String</a:t>
+            </a:r>
+          </a:p>
+          <a:p>
+            <a:r>
+              <a:rPr lang="en-US" dirty="0"/>
+              <a:t>-className: String</a:t>
+            </a:r>
+          </a:p>
+          <a:p>
+            <a:r>
+              <a:rPr lang="en-US" dirty="0"/>
+              <a:t>-start: String</a:t>
+            </a:r>
+          </a:p>
+          <a:p>
+            <a:r>
+              <a:rPr lang="en-US" dirty="0"/>
+              <a:t>-end: String</a:t>
+            </a:r>
+          </a:p>
+        </p:txBody>
+      </p:sp>
+      <p:sp>
+        <p:nvSpPr>
+          <p:cNvPr id="18" name="TextBox 17">
+            <a:extLst>
+              <a:ext uri="{FF2B5EF4-FFF2-40B4-BE49-F238E27FC236}">
+                <a16:creationId xmlns:a16="http://schemas.microsoft.com/office/drawing/2014/main" id="{FB71CF71-1CE0-DFEF-F85D-B30CF96A9259}"/>
+              </a:ext>
+            </a:extLst>
+          </p:cNvPr>
+          <p:cNvSpPr txBox="1"/>
+          <p:nvPr/>
+        </p:nvSpPr>
+        <p:spPr>
+          <a:xfrm>
+            <a:off x="5410898" y="4053873"/>
+            <a:ext cx="2135200" cy="369332"/>
+          </a:xfrm>
+          <a:prstGeom prst="rect">
+            <a:avLst/>
+          </a:prstGeom>
+          <a:noFill/>
+        </p:spPr>
+        <p:txBody>
+          <a:bodyPr wrap="none" rtlCol="0">
+            <a:spAutoFit/>
+          </a:bodyPr>
+          <a:lstStyle/>
+          <a:p>
+            <a:r>
+              <a:rPr lang="en-US" dirty="0"/>
+              <a:t>+toSaveString: String</a:t>
+            </a:r>
+          </a:p>
+        </p:txBody>
+      </p:sp>
+      <p:sp>
+        <p:nvSpPr>
+          <p:cNvPr id="19" name="TextBox 18">
+            <a:extLst>
+              <a:ext uri="{FF2B5EF4-FFF2-40B4-BE49-F238E27FC236}">
+                <a16:creationId xmlns:a16="http://schemas.microsoft.com/office/drawing/2014/main" id="{6342C1DB-CBAE-B891-DBFC-25C6CE3FA9C5}"/>
+              </a:ext>
+            </a:extLst>
+          </p:cNvPr>
+          <p:cNvSpPr txBox="1"/>
+          <p:nvPr/>
+        </p:nvSpPr>
+        <p:spPr>
+          <a:xfrm>
+            <a:off x="5410898" y="4519570"/>
+            <a:ext cx="1705275" cy="369332"/>
+          </a:xfrm>
+          <a:prstGeom prst="rect">
+            <a:avLst/>
+          </a:prstGeom>
+          <a:noFill/>
+        </p:spPr>
+        <p:txBody>
+          <a:bodyPr wrap="none" rtlCol="0">
+            <a:spAutoFit/>
+          </a:bodyPr>
+          <a:lstStyle/>
+          <a:p>
+            <a:r>
+              <a:rPr lang="en-US" dirty="0"/>
+              <a:t>+toString: String</a:t>
+            </a:r>
+          </a:p>
+        </p:txBody>
+      </p:sp>
+      <p:sp>
+        <p:nvSpPr>
+          <p:cNvPr id="64" name="TextBox 63">
+            <a:extLst>
+              <a:ext uri="{FF2B5EF4-FFF2-40B4-BE49-F238E27FC236}">
+                <a16:creationId xmlns:a16="http://schemas.microsoft.com/office/drawing/2014/main" id="{626060C1-FEE8-7DF3-9950-9D0C9AFEEA4B}"/>
+              </a:ext>
+            </a:extLst>
+          </p:cNvPr>
+          <p:cNvSpPr txBox="1"/>
+          <p:nvPr/>
+        </p:nvSpPr>
+        <p:spPr>
+          <a:xfrm>
+            <a:off x="5614681" y="1603805"/>
+            <a:ext cx="1681294" cy="369332"/>
+          </a:xfrm>
+          <a:prstGeom prst="rect">
+            <a:avLst/>
+          </a:prstGeom>
+          <a:noFill/>
+        </p:spPr>
+        <p:txBody>
+          <a:bodyPr wrap="none" rtlCol="0">
+            <a:spAutoFit/>
+          </a:bodyPr>
+          <a:lstStyle/>
+          <a:p>
+            <a:r>
+              <a:rPr lang="en-US" dirty="0"/>
+              <a:t>expiredCount: 0</a:t>
+            </a:r>
+          </a:p>
+        </p:txBody>
+      </p:sp>
+    </p:spTree>
+    <p:extLst>
+      <p:ext uri="{BB962C8B-B14F-4D97-AF65-F5344CB8AC3E}">
+        <p14:creationId xmlns:p14="http://schemas.microsoft.com/office/powerpoint/2010/main" val="2558981008"/>
+      </p:ext>
+    </p:extLst>
+  </p:cSld>
+  <p:clrMapOvr>
+    <a:masterClrMapping/>
+  </p:clrMapOvr>
+</p:sld>
+</file>
+
+<file path=ppt/slides/slide7.xml><?xml version="1.0" encoding="utf-8"?>
+<p:sld xmlns:a="http://schemas.openxmlformats.org/drawingml/2006/main" xmlns:r="http://schemas.openxmlformats.org/officeDocument/2006/relationships" xmlns:p="http://schemas.openxmlformats.org/presentationml/2006/main">
+  <p:cSld>
+    <p:spTree>
+      <p:nvGrpSpPr>
+        <p:cNvPr id="1" name=""/>
+        <p:cNvGrpSpPr/>
+        <p:nvPr/>
+      </p:nvGrpSpPr>
+      <p:grpSpPr>
+        <a:xfrm>
+          <a:off x="0" y="0"/>
+          <a:ext cx="0" cy="0"/>
+          <a:chOff x="0" y="0"/>
+          <a:chExt cx="0" cy="0"/>
+        </a:xfrm>
+      </p:grpSpPr>
+      <p:sp>
+        <p:nvSpPr>
           <p:cNvPr id="40" name="Oval 39">
             <a:extLst>
               <a:ext uri="{FF2B5EF4-FFF2-40B4-BE49-F238E27FC236}">

</xml_diff>

<commit_message>
added class diagram for recurring tasks
</commit_message>
<xml_diff>
--- a/docs/tP Diagram Editable.pptx
+++ b/docs/tP Diagram Editable.pptx
@@ -12,6 +12,7 @@
     <p:sldId id="262" r:id="rId6"/>
     <p:sldId id="263" r:id="rId7"/>
     <p:sldId id="261" r:id="rId8"/>
+    <p:sldId id="264" r:id="rId9"/>
   </p:sldIdLst>
   <p:sldSz cx="12192000" cy="6858000"/>
   <p:notesSz cx="6858000" cy="9144000"/>
@@ -265,7 +266,7 @@
           <a:p>
             <a:fld id="{FC955756-5376-45AC-9F68-FBE46185159B}" type="datetimeFigureOut">
               <a:rPr lang="en-US" smtClean="0"/>
-              <a:t>3/22/2023</a:t>
+              <a:t>3/30/2023</a:t>
             </a:fld>
             <a:endParaRPr lang="en-US"/>
           </a:p>
@@ -463,7 +464,7 @@
           <a:p>
             <a:fld id="{FC955756-5376-45AC-9F68-FBE46185159B}" type="datetimeFigureOut">
               <a:rPr lang="en-US" smtClean="0"/>
-              <a:t>3/22/2023</a:t>
+              <a:t>3/30/2023</a:t>
             </a:fld>
             <a:endParaRPr lang="en-US"/>
           </a:p>
@@ -671,7 +672,7 @@
           <a:p>
             <a:fld id="{FC955756-5376-45AC-9F68-FBE46185159B}" type="datetimeFigureOut">
               <a:rPr lang="en-US" smtClean="0"/>
-              <a:t>3/22/2023</a:t>
+              <a:t>3/30/2023</a:t>
             </a:fld>
             <a:endParaRPr lang="en-US"/>
           </a:p>
@@ -869,7 +870,7 @@
           <a:p>
             <a:fld id="{FC955756-5376-45AC-9F68-FBE46185159B}" type="datetimeFigureOut">
               <a:rPr lang="en-US" smtClean="0"/>
-              <a:t>3/22/2023</a:t>
+              <a:t>3/30/2023</a:t>
             </a:fld>
             <a:endParaRPr lang="en-US"/>
           </a:p>
@@ -1144,7 +1145,7 @@
           <a:p>
             <a:fld id="{FC955756-5376-45AC-9F68-FBE46185159B}" type="datetimeFigureOut">
               <a:rPr lang="en-US" smtClean="0"/>
-              <a:t>3/22/2023</a:t>
+              <a:t>3/30/2023</a:t>
             </a:fld>
             <a:endParaRPr lang="en-US"/>
           </a:p>
@@ -1409,7 +1410,7 @@
           <a:p>
             <a:fld id="{FC955756-5376-45AC-9F68-FBE46185159B}" type="datetimeFigureOut">
               <a:rPr lang="en-US" smtClean="0"/>
-              <a:t>3/22/2023</a:t>
+              <a:t>3/30/2023</a:t>
             </a:fld>
             <a:endParaRPr lang="en-US"/>
           </a:p>
@@ -1821,7 +1822,7 @@
           <a:p>
             <a:fld id="{FC955756-5376-45AC-9F68-FBE46185159B}" type="datetimeFigureOut">
               <a:rPr lang="en-US" smtClean="0"/>
-              <a:t>3/22/2023</a:t>
+              <a:t>3/30/2023</a:t>
             </a:fld>
             <a:endParaRPr lang="en-US"/>
           </a:p>
@@ -1962,7 +1963,7 @@
           <a:p>
             <a:fld id="{FC955756-5376-45AC-9F68-FBE46185159B}" type="datetimeFigureOut">
               <a:rPr lang="en-US" smtClean="0"/>
-              <a:t>3/22/2023</a:t>
+              <a:t>3/30/2023</a:t>
             </a:fld>
             <a:endParaRPr lang="en-US"/>
           </a:p>
@@ -2075,7 +2076,7 @@
           <a:p>
             <a:fld id="{FC955756-5376-45AC-9F68-FBE46185159B}" type="datetimeFigureOut">
               <a:rPr lang="en-US" smtClean="0"/>
-              <a:t>3/22/2023</a:t>
+              <a:t>3/30/2023</a:t>
             </a:fld>
             <a:endParaRPr lang="en-US"/>
           </a:p>
@@ -2386,7 +2387,7 @@
           <a:p>
             <a:fld id="{FC955756-5376-45AC-9F68-FBE46185159B}" type="datetimeFigureOut">
               <a:rPr lang="en-US" smtClean="0"/>
-              <a:t>3/22/2023</a:t>
+              <a:t>3/30/2023</a:t>
             </a:fld>
             <a:endParaRPr lang="en-US"/>
           </a:p>
@@ -2674,7 +2675,7 @@
           <a:p>
             <a:fld id="{FC955756-5376-45AC-9F68-FBE46185159B}" type="datetimeFigureOut">
               <a:rPr lang="en-US" smtClean="0"/>
-              <a:t>3/22/2023</a:t>
+              <a:t>3/30/2023</a:t>
             </a:fld>
             <a:endParaRPr lang="en-US"/>
           </a:p>
@@ -2915,7 +2916,7 @@
           <a:p>
             <a:fld id="{FC955756-5376-45AC-9F68-FBE46185159B}" type="datetimeFigureOut">
               <a:rPr lang="en-US" smtClean="0"/>
-              <a:t>3/22/2023</a:t>
+              <a:t>3/30/2023</a:t>
             </a:fld>
             <a:endParaRPr lang="en-US"/>
           </a:p>
@@ -10486,6 +10487,2324 @@
 </p:sld>
 </file>
 
+<file path=ppt/slides/slide8.xml><?xml version="1.0" encoding="utf-8"?>
+<p:sld xmlns:a="http://schemas.openxmlformats.org/drawingml/2006/main" xmlns:r="http://schemas.openxmlformats.org/officeDocument/2006/relationships" xmlns:p="http://schemas.openxmlformats.org/presentationml/2006/main">
+  <p:cSld>
+    <p:spTree>
+      <p:nvGrpSpPr>
+        <p:cNvPr id="1" name=""/>
+        <p:cNvGrpSpPr/>
+        <p:nvPr/>
+      </p:nvGrpSpPr>
+      <p:grpSpPr>
+        <a:xfrm>
+          <a:off x="0" y="0"/>
+          <a:ext cx="0" cy="0"/>
+          <a:chOff x="0" y="0"/>
+          <a:chExt cx="0" cy="0"/>
+        </a:xfrm>
+      </p:grpSpPr>
+      <p:sp>
+        <p:nvSpPr>
+          <p:cNvPr id="4" name="Rectangle 3">
+            <a:extLst>
+              <a:ext uri="{FF2B5EF4-FFF2-40B4-BE49-F238E27FC236}">
+                <a16:creationId xmlns:a16="http://schemas.microsoft.com/office/drawing/2014/main" id="{0F9490B1-9589-C70B-DA1F-83F61AD9C296}"/>
+              </a:ext>
+            </a:extLst>
+          </p:cNvPr>
+          <p:cNvSpPr/>
+          <p:nvPr/>
+        </p:nvSpPr>
+        <p:spPr>
+          <a:xfrm>
+            <a:off x="9101207" y="4254499"/>
+            <a:ext cx="1996244" cy="471042"/>
+          </a:xfrm>
+          <a:prstGeom prst="rect">
+            <a:avLst/>
+          </a:prstGeom>
+        </p:spPr>
+        <p:style>
+          <a:lnRef idx="2">
+            <a:schemeClr val="accent4">
+              <a:shade val="50000"/>
+            </a:schemeClr>
+          </a:lnRef>
+          <a:fillRef idx="1">
+            <a:schemeClr val="accent4"/>
+          </a:fillRef>
+          <a:effectRef idx="0">
+            <a:schemeClr val="accent4"/>
+          </a:effectRef>
+          <a:fontRef idx="minor">
+            <a:schemeClr val="lt1"/>
+          </a:fontRef>
+        </p:style>
+        <p:txBody>
+          <a:bodyPr rtlCol="0" anchor="ctr"/>
+          <a:lstStyle/>
+          <a:p>
+            <a:pPr algn="ctr"/>
+            <a:endParaRPr lang="en-US" sz="1400"/>
+          </a:p>
+        </p:txBody>
+      </p:sp>
+      <p:sp>
+        <p:nvSpPr>
+          <p:cNvPr id="5" name="Rectangle 4">
+            <a:extLst>
+              <a:ext uri="{FF2B5EF4-FFF2-40B4-BE49-F238E27FC236}">
+                <a16:creationId xmlns:a16="http://schemas.microsoft.com/office/drawing/2014/main" id="{455B31F8-D948-159A-FF26-78F23439A601}"/>
+              </a:ext>
+            </a:extLst>
+          </p:cNvPr>
+          <p:cNvSpPr/>
+          <p:nvPr/>
+        </p:nvSpPr>
+        <p:spPr>
+          <a:xfrm>
+            <a:off x="9080553" y="4254500"/>
+            <a:ext cx="2016898" cy="1820260"/>
+          </a:xfrm>
+          <a:prstGeom prst="rect">
+            <a:avLst/>
+          </a:prstGeom>
+          <a:noFill/>
+        </p:spPr>
+        <p:style>
+          <a:lnRef idx="2">
+            <a:schemeClr val="accent1">
+              <a:shade val="50000"/>
+            </a:schemeClr>
+          </a:lnRef>
+          <a:fillRef idx="1">
+            <a:schemeClr val="accent1"/>
+          </a:fillRef>
+          <a:effectRef idx="0">
+            <a:schemeClr val="accent1"/>
+          </a:effectRef>
+          <a:fontRef idx="minor">
+            <a:schemeClr val="lt1"/>
+          </a:fontRef>
+        </p:style>
+        <p:txBody>
+          <a:bodyPr rtlCol="0" anchor="ctr"/>
+          <a:lstStyle/>
+          <a:p>
+            <a:pPr algn="ctr"/>
+            <a:endParaRPr lang="en-US" sz="1400"/>
+          </a:p>
+        </p:txBody>
+      </p:sp>
+      <p:sp>
+        <p:nvSpPr>
+          <p:cNvPr id="6" name="TextBox 5">
+            <a:extLst>
+              <a:ext uri="{FF2B5EF4-FFF2-40B4-BE49-F238E27FC236}">
+                <a16:creationId xmlns:a16="http://schemas.microsoft.com/office/drawing/2014/main" id="{9747FEE6-362E-89FB-5420-E4CD8C39BFE1}"/>
+              </a:ext>
+            </a:extLst>
+          </p:cNvPr>
+          <p:cNvSpPr txBox="1"/>
+          <p:nvPr/>
+        </p:nvSpPr>
+        <p:spPr>
+          <a:xfrm>
+            <a:off x="9246696" y="4343796"/>
+            <a:ext cx="1705265" cy="307777"/>
+          </a:xfrm>
+          <a:prstGeom prst="rect">
+            <a:avLst/>
+          </a:prstGeom>
+          <a:noFill/>
+        </p:spPr>
+        <p:txBody>
+          <a:bodyPr wrap="square" rtlCol="0">
+            <a:spAutoFit/>
+          </a:bodyPr>
+          <a:lstStyle/>
+          <a:p>
+            <a:r>
+              <a:rPr lang="en-SG" sz="1400" dirty="0"/>
+              <a:t>R</a:t>
+            </a:r>
+            <a:r>
+              <a:rPr lang="en-US" sz="1400" dirty="0" err="1"/>
+              <a:t>ecurringDeadline</a:t>
+            </a:r>
+            <a:endParaRPr lang="en-US" sz="1400" dirty="0"/>
+          </a:p>
+        </p:txBody>
+      </p:sp>
+      <p:cxnSp>
+        <p:nvCxnSpPr>
+          <p:cNvPr id="7" name="Straight Connector 6">
+            <a:extLst>
+              <a:ext uri="{FF2B5EF4-FFF2-40B4-BE49-F238E27FC236}">
+                <a16:creationId xmlns:a16="http://schemas.microsoft.com/office/drawing/2014/main" id="{A8ACBACB-09BC-3E42-4248-93EAF19736F1}"/>
+              </a:ext>
+            </a:extLst>
+          </p:cNvPr>
+          <p:cNvCxnSpPr>
+            <a:cxnSpLocks/>
+          </p:cNvCxnSpPr>
+          <p:nvPr/>
+        </p:nvCxnSpPr>
+        <p:spPr>
+          <a:xfrm>
+            <a:off x="8195257" y="257774"/>
+            <a:ext cx="1904072" cy="0"/>
+          </a:xfrm>
+          <a:prstGeom prst="line">
+            <a:avLst/>
+          </a:prstGeom>
+        </p:spPr>
+        <p:style>
+          <a:lnRef idx="1">
+            <a:schemeClr val="accent1"/>
+          </a:lnRef>
+          <a:fillRef idx="0">
+            <a:schemeClr val="accent1"/>
+          </a:fillRef>
+          <a:effectRef idx="0">
+            <a:schemeClr val="accent1"/>
+          </a:effectRef>
+          <a:fontRef idx="minor">
+            <a:schemeClr val="tx1"/>
+          </a:fontRef>
+        </p:style>
+      </p:cxnSp>
+      <p:cxnSp>
+        <p:nvCxnSpPr>
+          <p:cNvPr id="8" name="Straight Connector 7">
+            <a:extLst>
+              <a:ext uri="{FF2B5EF4-FFF2-40B4-BE49-F238E27FC236}">
+                <a16:creationId xmlns:a16="http://schemas.microsoft.com/office/drawing/2014/main" id="{507F51F6-4162-DE3B-8208-6EECFE07330F}"/>
+              </a:ext>
+            </a:extLst>
+          </p:cNvPr>
+          <p:cNvCxnSpPr>
+            <a:cxnSpLocks/>
+          </p:cNvCxnSpPr>
+          <p:nvPr/>
+        </p:nvCxnSpPr>
+        <p:spPr>
+          <a:xfrm>
+            <a:off x="9076505" y="5057715"/>
+            <a:ext cx="2000290" cy="0"/>
+          </a:xfrm>
+          <a:prstGeom prst="line">
+            <a:avLst/>
+          </a:prstGeom>
+        </p:spPr>
+        <p:style>
+          <a:lnRef idx="1">
+            <a:schemeClr val="accent1"/>
+          </a:lnRef>
+          <a:fillRef idx="0">
+            <a:schemeClr val="accent1"/>
+          </a:fillRef>
+          <a:effectRef idx="0">
+            <a:schemeClr val="accent1"/>
+          </a:effectRef>
+          <a:fontRef idx="minor">
+            <a:schemeClr val="tx1"/>
+          </a:fontRef>
+        </p:style>
+      </p:cxnSp>
+      <p:sp>
+        <p:nvSpPr>
+          <p:cNvPr id="9" name="TextBox 8">
+            <a:extLst>
+              <a:ext uri="{FF2B5EF4-FFF2-40B4-BE49-F238E27FC236}">
+                <a16:creationId xmlns:a16="http://schemas.microsoft.com/office/drawing/2014/main" id="{E627BE5F-EBA6-59F4-6EE0-003DB0E976F0}"/>
+              </a:ext>
+            </a:extLst>
+          </p:cNvPr>
+          <p:cNvSpPr txBox="1"/>
+          <p:nvPr/>
+        </p:nvSpPr>
+        <p:spPr>
+          <a:xfrm>
+            <a:off x="9101207" y="4757431"/>
+            <a:ext cx="1611673" cy="307777"/>
+          </a:xfrm>
+          <a:prstGeom prst="rect">
+            <a:avLst/>
+          </a:prstGeom>
+          <a:noFill/>
+        </p:spPr>
+        <p:txBody>
+          <a:bodyPr wrap="square" rtlCol="0">
+            <a:spAutoFit/>
+          </a:bodyPr>
+          <a:lstStyle/>
+          <a:p>
+            <a:r>
+              <a:rPr lang="en-US" sz="1400" dirty="0"/>
+              <a:t>-day: </a:t>
+            </a:r>
+            <a:r>
+              <a:rPr lang="en-US" sz="1400" dirty="0" err="1"/>
+              <a:t>DayOfWeek</a:t>
+            </a:r>
+            <a:endParaRPr lang="en-US" sz="1400" dirty="0"/>
+          </a:p>
+        </p:txBody>
+      </p:sp>
+      <p:sp>
+        <p:nvSpPr>
+          <p:cNvPr id="10" name="TextBox 9">
+            <a:extLst>
+              <a:ext uri="{FF2B5EF4-FFF2-40B4-BE49-F238E27FC236}">
+                <a16:creationId xmlns:a16="http://schemas.microsoft.com/office/drawing/2014/main" id="{9E0AF47A-95DD-2287-C4B6-75BD856D8E2E}"/>
+              </a:ext>
+            </a:extLst>
+          </p:cNvPr>
+          <p:cNvSpPr txBox="1"/>
+          <p:nvPr/>
+        </p:nvSpPr>
+        <p:spPr>
+          <a:xfrm>
+            <a:off x="9048165" y="5232690"/>
+            <a:ext cx="2064951" cy="738664"/>
+          </a:xfrm>
+          <a:prstGeom prst="rect">
+            <a:avLst/>
+          </a:prstGeom>
+          <a:noFill/>
+        </p:spPr>
+        <p:txBody>
+          <a:bodyPr wrap="square" rtlCol="0">
+            <a:spAutoFit/>
+          </a:bodyPr>
+          <a:lstStyle/>
+          <a:p>
+            <a:r>
+              <a:rPr lang="en-US" sz="1400" dirty="0"/>
+              <a:t>+</a:t>
+            </a:r>
+            <a:r>
+              <a:rPr lang="en-US" sz="1400" dirty="0" err="1"/>
+              <a:t>toSaveString</a:t>
+            </a:r>
+            <a:r>
+              <a:rPr lang="en-US" sz="1400" dirty="0"/>
+              <a:t>(): String</a:t>
+            </a:r>
+          </a:p>
+          <a:p>
+            <a:r>
+              <a:rPr lang="en-US" sz="1400" dirty="0"/>
+              <a:t>+</a:t>
+            </a:r>
+            <a:r>
+              <a:rPr lang="en-US" sz="1400" dirty="0" err="1"/>
+              <a:t>toString</a:t>
+            </a:r>
+            <a:r>
+              <a:rPr lang="en-US" sz="1400" dirty="0"/>
+              <a:t>(): String</a:t>
+            </a:r>
+          </a:p>
+          <a:p>
+            <a:r>
+              <a:rPr lang="en-US" sz="1400" dirty="0"/>
+              <a:t>+</a:t>
+            </a:r>
+            <a:r>
+              <a:rPr lang="en-US" sz="1400" dirty="0" err="1"/>
+              <a:t>getDay</a:t>
+            </a:r>
+            <a:r>
+              <a:rPr lang="en-US" sz="1400" dirty="0"/>
+              <a:t>(): </a:t>
+            </a:r>
+            <a:r>
+              <a:rPr lang="en-US" sz="1400" dirty="0" err="1"/>
+              <a:t>DayOfWeek</a:t>
+            </a:r>
+            <a:endParaRPr lang="en-US" sz="1400" dirty="0"/>
+          </a:p>
+        </p:txBody>
+      </p:sp>
+      <p:sp>
+        <p:nvSpPr>
+          <p:cNvPr id="12" name="Rectangle 11">
+            <a:extLst>
+              <a:ext uri="{FF2B5EF4-FFF2-40B4-BE49-F238E27FC236}">
+                <a16:creationId xmlns:a16="http://schemas.microsoft.com/office/drawing/2014/main" id="{90453079-7A13-2FCB-D44C-5AF315B27A7C}"/>
+              </a:ext>
+            </a:extLst>
+          </p:cNvPr>
+          <p:cNvSpPr/>
+          <p:nvPr/>
+        </p:nvSpPr>
+        <p:spPr>
+          <a:xfrm>
+            <a:off x="1216404" y="1166069"/>
+            <a:ext cx="10477849" cy="5008227"/>
+          </a:xfrm>
+          <a:prstGeom prst="rect">
+            <a:avLst/>
+          </a:prstGeom>
+          <a:noFill/>
+        </p:spPr>
+        <p:style>
+          <a:lnRef idx="2">
+            <a:schemeClr val="accent1">
+              <a:shade val="50000"/>
+            </a:schemeClr>
+          </a:lnRef>
+          <a:fillRef idx="1">
+            <a:schemeClr val="accent1"/>
+          </a:fillRef>
+          <a:effectRef idx="0">
+            <a:schemeClr val="accent1"/>
+          </a:effectRef>
+          <a:fontRef idx="minor">
+            <a:schemeClr val="lt1"/>
+          </a:fontRef>
+        </p:style>
+        <p:txBody>
+          <a:bodyPr rtlCol="0" anchor="ctr"/>
+          <a:lstStyle/>
+          <a:p>
+            <a:pPr algn="ctr"/>
+            <a:endParaRPr lang="en-US"/>
+          </a:p>
+        </p:txBody>
+      </p:sp>
+      <p:sp>
+        <p:nvSpPr>
+          <p:cNvPr id="14" name="Rectangle 13">
+            <a:extLst>
+              <a:ext uri="{FF2B5EF4-FFF2-40B4-BE49-F238E27FC236}">
+                <a16:creationId xmlns:a16="http://schemas.microsoft.com/office/drawing/2014/main" id="{A1486B98-BAF7-346F-D130-FFED74EFB8A1}"/>
+              </a:ext>
+            </a:extLst>
+          </p:cNvPr>
+          <p:cNvSpPr/>
+          <p:nvPr/>
+        </p:nvSpPr>
+        <p:spPr>
+          <a:xfrm>
+            <a:off x="1900396" y="4257590"/>
+            <a:ext cx="1929822" cy="481299"/>
+          </a:xfrm>
+          <a:prstGeom prst="rect">
+            <a:avLst/>
+          </a:prstGeom>
+        </p:spPr>
+        <p:style>
+          <a:lnRef idx="2">
+            <a:schemeClr val="accent4">
+              <a:shade val="50000"/>
+            </a:schemeClr>
+          </a:lnRef>
+          <a:fillRef idx="1">
+            <a:schemeClr val="accent4"/>
+          </a:fillRef>
+          <a:effectRef idx="0">
+            <a:schemeClr val="accent4"/>
+          </a:effectRef>
+          <a:fontRef idx="minor">
+            <a:schemeClr val="lt1"/>
+          </a:fontRef>
+        </p:style>
+        <p:txBody>
+          <a:bodyPr rtlCol="0" anchor="ctr"/>
+          <a:lstStyle/>
+          <a:p>
+            <a:pPr algn="ctr"/>
+            <a:endParaRPr lang="en-US" sz="1400"/>
+          </a:p>
+        </p:txBody>
+      </p:sp>
+      <p:sp>
+        <p:nvSpPr>
+          <p:cNvPr id="15" name="Rectangle 14">
+            <a:extLst>
+              <a:ext uri="{FF2B5EF4-FFF2-40B4-BE49-F238E27FC236}">
+                <a16:creationId xmlns:a16="http://schemas.microsoft.com/office/drawing/2014/main" id="{2478C931-B4AB-60D5-9283-F0B51820D47C}"/>
+              </a:ext>
+            </a:extLst>
+          </p:cNvPr>
+          <p:cNvSpPr/>
+          <p:nvPr/>
+        </p:nvSpPr>
+        <p:spPr>
+          <a:xfrm>
+            <a:off x="1885950" y="4254500"/>
+            <a:ext cx="1944268" cy="1820260"/>
+          </a:xfrm>
+          <a:prstGeom prst="rect">
+            <a:avLst/>
+          </a:prstGeom>
+          <a:noFill/>
+        </p:spPr>
+        <p:style>
+          <a:lnRef idx="2">
+            <a:schemeClr val="accent1">
+              <a:shade val="50000"/>
+            </a:schemeClr>
+          </a:lnRef>
+          <a:fillRef idx="1">
+            <a:schemeClr val="accent1"/>
+          </a:fillRef>
+          <a:effectRef idx="0">
+            <a:schemeClr val="accent1"/>
+          </a:effectRef>
+          <a:fontRef idx="minor">
+            <a:schemeClr val="lt1"/>
+          </a:fontRef>
+        </p:style>
+        <p:txBody>
+          <a:bodyPr rtlCol="0" anchor="ctr"/>
+          <a:lstStyle/>
+          <a:p>
+            <a:pPr algn="ctr"/>
+            <a:endParaRPr lang="en-US" sz="1400"/>
+          </a:p>
+        </p:txBody>
+      </p:sp>
+      <p:sp>
+        <p:nvSpPr>
+          <p:cNvPr id="16" name="TextBox 15">
+            <a:extLst>
+              <a:ext uri="{FF2B5EF4-FFF2-40B4-BE49-F238E27FC236}">
+                <a16:creationId xmlns:a16="http://schemas.microsoft.com/office/drawing/2014/main" id="{FECC83C0-465B-4860-5770-E35DFF5B5F1F}"/>
+              </a:ext>
+            </a:extLst>
+          </p:cNvPr>
+          <p:cNvSpPr txBox="1"/>
+          <p:nvPr/>
+        </p:nvSpPr>
+        <p:spPr>
+          <a:xfrm>
+            <a:off x="2037387" y="4344388"/>
+            <a:ext cx="1655840" cy="307777"/>
+          </a:xfrm>
+          <a:prstGeom prst="rect">
+            <a:avLst/>
+          </a:prstGeom>
+          <a:noFill/>
+        </p:spPr>
+        <p:txBody>
+          <a:bodyPr wrap="square" rtlCol="0">
+            <a:spAutoFit/>
+          </a:bodyPr>
+          <a:lstStyle/>
+          <a:p>
+            <a:r>
+              <a:rPr lang="en-SG" sz="1400" dirty="0"/>
+              <a:t>R</a:t>
+            </a:r>
+            <a:r>
+              <a:rPr lang="en-US" sz="1400" dirty="0" err="1"/>
+              <a:t>ecurringEvent</a:t>
+            </a:r>
+            <a:endParaRPr lang="en-US" sz="1400" dirty="0"/>
+          </a:p>
+        </p:txBody>
+      </p:sp>
+      <p:cxnSp>
+        <p:nvCxnSpPr>
+          <p:cNvPr id="17" name="Straight Connector 16">
+            <a:extLst>
+              <a:ext uri="{FF2B5EF4-FFF2-40B4-BE49-F238E27FC236}">
+                <a16:creationId xmlns:a16="http://schemas.microsoft.com/office/drawing/2014/main" id="{8E36CA38-2DC8-669B-5205-20B5D55E1A18}"/>
+              </a:ext>
+            </a:extLst>
+          </p:cNvPr>
+          <p:cNvCxnSpPr>
+            <a:cxnSpLocks/>
+          </p:cNvCxnSpPr>
+          <p:nvPr/>
+        </p:nvCxnSpPr>
+        <p:spPr>
+          <a:xfrm>
+            <a:off x="3522502" y="306134"/>
+            <a:ext cx="0" cy="644857"/>
+          </a:xfrm>
+          <a:prstGeom prst="line">
+            <a:avLst/>
+          </a:prstGeom>
+        </p:spPr>
+        <p:style>
+          <a:lnRef idx="1">
+            <a:schemeClr val="accent1"/>
+          </a:lnRef>
+          <a:fillRef idx="0">
+            <a:schemeClr val="accent1"/>
+          </a:fillRef>
+          <a:effectRef idx="0">
+            <a:schemeClr val="accent1"/>
+          </a:effectRef>
+          <a:fontRef idx="minor">
+            <a:schemeClr val="tx1"/>
+          </a:fontRef>
+        </p:style>
+      </p:cxnSp>
+      <p:cxnSp>
+        <p:nvCxnSpPr>
+          <p:cNvPr id="18" name="Straight Connector 17">
+            <a:extLst>
+              <a:ext uri="{FF2B5EF4-FFF2-40B4-BE49-F238E27FC236}">
+                <a16:creationId xmlns:a16="http://schemas.microsoft.com/office/drawing/2014/main" id="{C28A423C-7064-83F0-1A62-373678417291}"/>
+              </a:ext>
+            </a:extLst>
+          </p:cNvPr>
+          <p:cNvCxnSpPr>
+            <a:cxnSpLocks/>
+          </p:cNvCxnSpPr>
+          <p:nvPr/>
+        </p:nvCxnSpPr>
+        <p:spPr>
+          <a:xfrm>
+            <a:off x="1882037" y="5102165"/>
+            <a:ext cx="1933733" cy="0"/>
+          </a:xfrm>
+          <a:prstGeom prst="line">
+            <a:avLst/>
+          </a:prstGeom>
+        </p:spPr>
+        <p:style>
+          <a:lnRef idx="1">
+            <a:schemeClr val="accent1"/>
+          </a:lnRef>
+          <a:fillRef idx="0">
+            <a:schemeClr val="accent1"/>
+          </a:fillRef>
+          <a:effectRef idx="0">
+            <a:schemeClr val="accent1"/>
+          </a:effectRef>
+          <a:fontRef idx="minor">
+            <a:schemeClr val="tx1"/>
+          </a:fontRef>
+        </p:style>
+      </p:cxnSp>
+      <p:sp>
+        <p:nvSpPr>
+          <p:cNvPr id="19" name="TextBox 18">
+            <a:extLst>
+              <a:ext uri="{FF2B5EF4-FFF2-40B4-BE49-F238E27FC236}">
+                <a16:creationId xmlns:a16="http://schemas.microsoft.com/office/drawing/2014/main" id="{7EF8DCB8-48D1-31CD-8CB2-AE86A723C75F}"/>
+              </a:ext>
+            </a:extLst>
+          </p:cNvPr>
+          <p:cNvSpPr txBox="1"/>
+          <p:nvPr/>
+        </p:nvSpPr>
+        <p:spPr>
+          <a:xfrm>
+            <a:off x="1900396" y="4766638"/>
+            <a:ext cx="1558047" cy="307777"/>
+          </a:xfrm>
+          <a:prstGeom prst="rect">
+            <a:avLst/>
+          </a:prstGeom>
+          <a:noFill/>
+        </p:spPr>
+        <p:txBody>
+          <a:bodyPr wrap="square" rtlCol="0">
+            <a:spAutoFit/>
+          </a:bodyPr>
+          <a:lstStyle/>
+          <a:p>
+            <a:r>
+              <a:rPr lang="en-US" sz="1400" dirty="0"/>
+              <a:t>-day: </a:t>
+            </a:r>
+            <a:r>
+              <a:rPr lang="en-US" sz="1400" dirty="0" err="1"/>
+              <a:t>DayOfWeek</a:t>
+            </a:r>
+            <a:endParaRPr lang="en-US" sz="1400" dirty="0"/>
+          </a:p>
+        </p:txBody>
+      </p:sp>
+      <p:sp>
+        <p:nvSpPr>
+          <p:cNvPr id="20" name="TextBox 19">
+            <a:extLst>
+              <a:ext uri="{FF2B5EF4-FFF2-40B4-BE49-F238E27FC236}">
+                <a16:creationId xmlns:a16="http://schemas.microsoft.com/office/drawing/2014/main" id="{882E5F53-D39E-F586-847C-F60DB3672CAD}"/>
+              </a:ext>
+            </a:extLst>
+          </p:cNvPr>
+          <p:cNvSpPr txBox="1"/>
+          <p:nvPr/>
+        </p:nvSpPr>
+        <p:spPr>
+          <a:xfrm>
+            <a:off x="1855850" y="5259770"/>
+            <a:ext cx="1996242" cy="738664"/>
+          </a:xfrm>
+          <a:prstGeom prst="rect">
+            <a:avLst/>
+          </a:prstGeom>
+          <a:noFill/>
+        </p:spPr>
+        <p:txBody>
+          <a:bodyPr wrap="square" rtlCol="0">
+            <a:spAutoFit/>
+          </a:bodyPr>
+          <a:lstStyle/>
+          <a:p>
+            <a:r>
+              <a:rPr lang="en-US" sz="1400" dirty="0"/>
+              <a:t>+</a:t>
+            </a:r>
+            <a:r>
+              <a:rPr lang="en-US" sz="1400" dirty="0" err="1"/>
+              <a:t>toSaveString</a:t>
+            </a:r>
+            <a:r>
+              <a:rPr lang="en-US" sz="1400" dirty="0"/>
+              <a:t>(): String</a:t>
+            </a:r>
+          </a:p>
+          <a:p>
+            <a:r>
+              <a:rPr lang="en-US" sz="1400" dirty="0"/>
+              <a:t>+</a:t>
+            </a:r>
+            <a:r>
+              <a:rPr lang="en-US" sz="1400" dirty="0" err="1"/>
+              <a:t>toString</a:t>
+            </a:r>
+            <a:r>
+              <a:rPr lang="en-US" sz="1400" dirty="0"/>
+              <a:t>(): String</a:t>
+            </a:r>
+          </a:p>
+          <a:p>
+            <a:r>
+              <a:rPr lang="en-US" sz="1400" dirty="0"/>
+              <a:t>+</a:t>
+            </a:r>
+            <a:r>
+              <a:rPr lang="en-US" sz="1400" dirty="0" err="1"/>
+              <a:t>getDay</a:t>
+            </a:r>
+            <a:r>
+              <a:rPr lang="en-US" sz="1400" dirty="0"/>
+              <a:t>(): </a:t>
+            </a:r>
+            <a:r>
+              <a:rPr lang="en-US" sz="1400" dirty="0" err="1"/>
+              <a:t>DayOfWeek</a:t>
+            </a:r>
+            <a:endParaRPr lang="en-US" sz="1400" dirty="0"/>
+          </a:p>
+        </p:txBody>
+      </p:sp>
+      <p:sp>
+        <p:nvSpPr>
+          <p:cNvPr id="28" name="Rectangle 27">
+            <a:extLst>
+              <a:ext uri="{FF2B5EF4-FFF2-40B4-BE49-F238E27FC236}">
+                <a16:creationId xmlns:a16="http://schemas.microsoft.com/office/drawing/2014/main" id="{6AF79C52-3B7E-67FF-5398-C2FCD0A0B742}"/>
+              </a:ext>
+            </a:extLst>
+          </p:cNvPr>
+          <p:cNvSpPr/>
+          <p:nvPr/>
+        </p:nvSpPr>
+        <p:spPr>
+          <a:xfrm>
+            <a:off x="1797748" y="1523292"/>
+            <a:ext cx="2141736" cy="544588"/>
+          </a:xfrm>
+          <a:prstGeom prst="rect">
+            <a:avLst/>
+          </a:prstGeom>
+        </p:spPr>
+        <p:style>
+          <a:lnRef idx="2">
+            <a:schemeClr val="accent4">
+              <a:shade val="50000"/>
+            </a:schemeClr>
+          </a:lnRef>
+          <a:fillRef idx="1">
+            <a:schemeClr val="accent4"/>
+          </a:fillRef>
+          <a:effectRef idx="0">
+            <a:schemeClr val="accent4"/>
+          </a:effectRef>
+          <a:fontRef idx="minor">
+            <a:schemeClr val="lt1"/>
+          </a:fontRef>
+        </p:style>
+        <p:txBody>
+          <a:bodyPr rtlCol="0" anchor="ctr"/>
+          <a:lstStyle/>
+          <a:p>
+            <a:pPr algn="ctr"/>
+            <a:endParaRPr lang="en-US" sz="1400"/>
+          </a:p>
+        </p:txBody>
+      </p:sp>
+      <p:sp>
+        <p:nvSpPr>
+          <p:cNvPr id="29" name="Rectangle 28">
+            <a:extLst>
+              <a:ext uri="{FF2B5EF4-FFF2-40B4-BE49-F238E27FC236}">
+                <a16:creationId xmlns:a16="http://schemas.microsoft.com/office/drawing/2014/main" id="{DB420AAD-8C42-5165-32E5-A3DC9EFFB0B9}"/>
+              </a:ext>
+            </a:extLst>
+          </p:cNvPr>
+          <p:cNvSpPr/>
+          <p:nvPr/>
+        </p:nvSpPr>
+        <p:spPr>
+          <a:xfrm>
+            <a:off x="1797750" y="1523293"/>
+            <a:ext cx="2136053" cy="2087151"/>
+          </a:xfrm>
+          <a:prstGeom prst="rect">
+            <a:avLst/>
+          </a:prstGeom>
+          <a:noFill/>
+        </p:spPr>
+        <p:style>
+          <a:lnRef idx="2">
+            <a:schemeClr val="accent1">
+              <a:shade val="50000"/>
+            </a:schemeClr>
+          </a:lnRef>
+          <a:fillRef idx="1">
+            <a:schemeClr val="accent1"/>
+          </a:fillRef>
+          <a:effectRef idx="0">
+            <a:schemeClr val="accent1"/>
+          </a:effectRef>
+          <a:fontRef idx="minor">
+            <a:schemeClr val="lt1"/>
+          </a:fontRef>
+        </p:style>
+        <p:txBody>
+          <a:bodyPr rtlCol="0" anchor="ctr"/>
+          <a:lstStyle/>
+          <a:p>
+            <a:pPr algn="ctr"/>
+            <a:endParaRPr lang="en-US" sz="1400"/>
+          </a:p>
+        </p:txBody>
+      </p:sp>
+      <p:sp>
+        <p:nvSpPr>
+          <p:cNvPr id="30" name="TextBox 29">
+            <a:extLst>
+              <a:ext uri="{FF2B5EF4-FFF2-40B4-BE49-F238E27FC236}">
+                <a16:creationId xmlns:a16="http://schemas.microsoft.com/office/drawing/2014/main" id="{5B9D5078-86F0-E2C9-6DD4-689F1DBBCE32}"/>
+              </a:ext>
+            </a:extLst>
+          </p:cNvPr>
+          <p:cNvSpPr txBox="1"/>
+          <p:nvPr/>
+        </p:nvSpPr>
+        <p:spPr>
+          <a:xfrm>
+            <a:off x="2077637" y="1641697"/>
+            <a:ext cx="1573137" cy="307777"/>
+          </a:xfrm>
+          <a:prstGeom prst="rect">
+            <a:avLst/>
+          </a:prstGeom>
+          <a:noFill/>
+        </p:spPr>
+        <p:txBody>
+          <a:bodyPr wrap="square" rtlCol="0">
+            <a:spAutoFit/>
+          </a:bodyPr>
+          <a:lstStyle/>
+          <a:p>
+            <a:pPr algn="ctr"/>
+            <a:r>
+              <a:rPr lang="en-US" sz="1400" dirty="0"/>
+              <a:t>Event</a:t>
+            </a:r>
+          </a:p>
+        </p:txBody>
+      </p:sp>
+      <p:cxnSp>
+        <p:nvCxnSpPr>
+          <p:cNvPr id="31" name="Straight Connector 30">
+            <a:extLst>
+              <a:ext uri="{FF2B5EF4-FFF2-40B4-BE49-F238E27FC236}">
+                <a16:creationId xmlns:a16="http://schemas.microsoft.com/office/drawing/2014/main" id="{D9BA6747-A767-D22E-E2C7-EB44F9DA5ACC}"/>
+              </a:ext>
+            </a:extLst>
+          </p:cNvPr>
+          <p:cNvCxnSpPr>
+            <a:cxnSpLocks/>
+          </p:cNvCxnSpPr>
+          <p:nvPr/>
+        </p:nvCxnSpPr>
+        <p:spPr>
+          <a:xfrm>
+            <a:off x="1797749" y="2068578"/>
+            <a:ext cx="2139193" cy="0"/>
+          </a:xfrm>
+          <a:prstGeom prst="line">
+            <a:avLst/>
+          </a:prstGeom>
+        </p:spPr>
+        <p:style>
+          <a:lnRef idx="1">
+            <a:schemeClr val="accent1"/>
+          </a:lnRef>
+          <a:fillRef idx="0">
+            <a:schemeClr val="accent1"/>
+          </a:fillRef>
+          <a:effectRef idx="0">
+            <a:schemeClr val="accent1"/>
+          </a:effectRef>
+          <a:fontRef idx="minor">
+            <a:schemeClr val="tx1"/>
+          </a:fontRef>
+        </p:style>
+      </p:cxnSp>
+      <p:cxnSp>
+        <p:nvCxnSpPr>
+          <p:cNvPr id="32" name="Straight Connector 31">
+            <a:extLst>
+              <a:ext uri="{FF2B5EF4-FFF2-40B4-BE49-F238E27FC236}">
+                <a16:creationId xmlns:a16="http://schemas.microsoft.com/office/drawing/2014/main" id="{996E8FEA-A6BF-0C4D-F5BF-B8AD41F9B014}"/>
+              </a:ext>
+            </a:extLst>
+          </p:cNvPr>
+          <p:cNvCxnSpPr>
+            <a:cxnSpLocks/>
+          </p:cNvCxnSpPr>
+          <p:nvPr/>
+        </p:nvCxnSpPr>
+        <p:spPr>
+          <a:xfrm>
+            <a:off x="1794610" y="2591798"/>
+            <a:ext cx="2139193" cy="0"/>
+          </a:xfrm>
+          <a:prstGeom prst="line">
+            <a:avLst/>
+          </a:prstGeom>
+        </p:spPr>
+        <p:style>
+          <a:lnRef idx="1">
+            <a:schemeClr val="accent1"/>
+          </a:lnRef>
+          <a:fillRef idx="0">
+            <a:schemeClr val="accent1"/>
+          </a:fillRef>
+          <a:effectRef idx="0">
+            <a:schemeClr val="accent1"/>
+          </a:effectRef>
+          <a:fontRef idx="minor">
+            <a:schemeClr val="tx1"/>
+          </a:fontRef>
+        </p:style>
+      </p:cxnSp>
+      <p:sp>
+        <p:nvSpPr>
+          <p:cNvPr id="33" name="TextBox 32">
+            <a:extLst>
+              <a:ext uri="{FF2B5EF4-FFF2-40B4-BE49-F238E27FC236}">
+                <a16:creationId xmlns:a16="http://schemas.microsoft.com/office/drawing/2014/main" id="{FE45E37B-AFA2-BC42-7963-3CDEEC15B19F}"/>
+              </a:ext>
+            </a:extLst>
+          </p:cNvPr>
+          <p:cNvSpPr txBox="1"/>
+          <p:nvPr/>
+        </p:nvSpPr>
+        <p:spPr>
+          <a:xfrm>
+            <a:off x="1797749" y="2068578"/>
+            <a:ext cx="1091004" cy="523220"/>
+          </a:xfrm>
+          <a:prstGeom prst="rect">
+            <a:avLst/>
+          </a:prstGeom>
+          <a:noFill/>
+        </p:spPr>
+        <p:txBody>
+          <a:bodyPr wrap="none" rtlCol="0">
+            <a:spAutoFit/>
+          </a:bodyPr>
+          <a:lstStyle/>
+          <a:p>
+            <a:r>
+              <a:rPr lang="en-US" sz="1400" dirty="0"/>
+              <a:t>-start: String</a:t>
+            </a:r>
+          </a:p>
+          <a:p>
+            <a:r>
+              <a:rPr lang="en-US" sz="1400" dirty="0"/>
+              <a:t>-end: String</a:t>
+            </a:r>
+          </a:p>
+        </p:txBody>
+      </p:sp>
+      <p:sp>
+        <p:nvSpPr>
+          <p:cNvPr id="34" name="TextBox 33">
+            <a:extLst>
+              <a:ext uri="{FF2B5EF4-FFF2-40B4-BE49-F238E27FC236}">
+                <a16:creationId xmlns:a16="http://schemas.microsoft.com/office/drawing/2014/main" id="{358C1D97-85A4-C09C-D191-D504194F0585}"/>
+              </a:ext>
+            </a:extLst>
+          </p:cNvPr>
+          <p:cNvSpPr txBox="1"/>
+          <p:nvPr/>
+        </p:nvSpPr>
+        <p:spPr>
+          <a:xfrm>
+            <a:off x="1788930" y="2594788"/>
+            <a:ext cx="1813317" cy="1169551"/>
+          </a:xfrm>
+          <a:prstGeom prst="rect">
+            <a:avLst/>
+          </a:prstGeom>
+          <a:noFill/>
+        </p:spPr>
+        <p:txBody>
+          <a:bodyPr wrap="none" rtlCol="0">
+            <a:spAutoFit/>
+          </a:bodyPr>
+          <a:lstStyle/>
+          <a:p>
+            <a:r>
+              <a:rPr lang="en-US" sz="1400" dirty="0"/>
+              <a:t>+</a:t>
+            </a:r>
+            <a:r>
+              <a:rPr lang="en-US" sz="1400" dirty="0" err="1"/>
+              <a:t>toSaveString</a:t>
+            </a:r>
+            <a:r>
+              <a:rPr lang="en-US" sz="1400" dirty="0"/>
+              <a:t>(): String</a:t>
+            </a:r>
+          </a:p>
+          <a:p>
+            <a:r>
+              <a:rPr lang="en-US" sz="1400" dirty="0"/>
+              <a:t>+</a:t>
+            </a:r>
+            <a:r>
+              <a:rPr lang="en-US" sz="1400" dirty="0" err="1"/>
+              <a:t>toString</a:t>
+            </a:r>
+            <a:r>
+              <a:rPr lang="en-US" sz="1400" dirty="0"/>
+              <a:t>(): String</a:t>
+            </a:r>
+          </a:p>
+          <a:p>
+            <a:r>
+              <a:rPr lang="en-US" sz="1400" dirty="0"/>
+              <a:t>+</a:t>
+            </a:r>
+            <a:r>
+              <a:rPr lang="en-US" sz="1400" dirty="0" err="1"/>
+              <a:t>getStart</a:t>
+            </a:r>
+            <a:r>
+              <a:rPr lang="en-US" sz="1400" dirty="0"/>
+              <a:t>(): String</a:t>
+            </a:r>
+          </a:p>
+          <a:p>
+            <a:r>
+              <a:rPr lang="en-US" sz="1400" dirty="0"/>
+              <a:t>+</a:t>
+            </a:r>
+            <a:r>
+              <a:rPr lang="en-US" sz="1400" dirty="0" err="1"/>
+              <a:t>getEnd</a:t>
+            </a:r>
+            <a:r>
+              <a:rPr lang="en-US" sz="1400" dirty="0"/>
+              <a:t>(): String</a:t>
+            </a:r>
+          </a:p>
+          <a:p>
+            <a:endParaRPr lang="en-US" sz="1400" dirty="0"/>
+          </a:p>
+        </p:txBody>
+      </p:sp>
+      <p:sp>
+        <p:nvSpPr>
+          <p:cNvPr id="36" name="Rectangle 35">
+            <a:extLst>
+              <a:ext uri="{FF2B5EF4-FFF2-40B4-BE49-F238E27FC236}">
+                <a16:creationId xmlns:a16="http://schemas.microsoft.com/office/drawing/2014/main" id="{1A8148DC-1981-2682-F961-D6593777458A}"/>
+              </a:ext>
+            </a:extLst>
+          </p:cNvPr>
+          <p:cNvSpPr/>
+          <p:nvPr/>
+        </p:nvSpPr>
+        <p:spPr>
+          <a:xfrm>
+            <a:off x="9085323" y="1441152"/>
+            <a:ext cx="2141736" cy="544588"/>
+          </a:xfrm>
+          <a:prstGeom prst="rect">
+            <a:avLst/>
+          </a:prstGeom>
+        </p:spPr>
+        <p:style>
+          <a:lnRef idx="2">
+            <a:schemeClr val="accent4">
+              <a:shade val="50000"/>
+            </a:schemeClr>
+          </a:lnRef>
+          <a:fillRef idx="1">
+            <a:schemeClr val="accent4"/>
+          </a:fillRef>
+          <a:effectRef idx="0">
+            <a:schemeClr val="accent4"/>
+          </a:effectRef>
+          <a:fontRef idx="minor">
+            <a:schemeClr val="lt1"/>
+          </a:fontRef>
+        </p:style>
+        <p:txBody>
+          <a:bodyPr rtlCol="0" anchor="ctr"/>
+          <a:lstStyle/>
+          <a:p>
+            <a:pPr algn="ctr"/>
+            <a:endParaRPr lang="en-US" sz="1400"/>
+          </a:p>
+        </p:txBody>
+      </p:sp>
+      <p:sp>
+        <p:nvSpPr>
+          <p:cNvPr id="37" name="Rectangle 36">
+            <a:extLst>
+              <a:ext uri="{FF2B5EF4-FFF2-40B4-BE49-F238E27FC236}">
+                <a16:creationId xmlns:a16="http://schemas.microsoft.com/office/drawing/2014/main" id="{47449096-FA50-6727-7D3B-0914E0B9C965}"/>
+              </a:ext>
+            </a:extLst>
+          </p:cNvPr>
+          <p:cNvSpPr/>
+          <p:nvPr/>
+        </p:nvSpPr>
+        <p:spPr>
+          <a:xfrm>
+            <a:off x="9085325" y="1441153"/>
+            <a:ext cx="2136053" cy="2087151"/>
+          </a:xfrm>
+          <a:prstGeom prst="rect">
+            <a:avLst/>
+          </a:prstGeom>
+          <a:noFill/>
+        </p:spPr>
+        <p:style>
+          <a:lnRef idx="2">
+            <a:schemeClr val="accent1">
+              <a:shade val="50000"/>
+            </a:schemeClr>
+          </a:lnRef>
+          <a:fillRef idx="1">
+            <a:schemeClr val="accent1"/>
+          </a:fillRef>
+          <a:effectRef idx="0">
+            <a:schemeClr val="accent1"/>
+          </a:effectRef>
+          <a:fontRef idx="minor">
+            <a:schemeClr val="lt1"/>
+          </a:fontRef>
+        </p:style>
+        <p:txBody>
+          <a:bodyPr rtlCol="0" anchor="ctr"/>
+          <a:lstStyle/>
+          <a:p>
+            <a:pPr algn="ctr"/>
+            <a:endParaRPr lang="en-US" sz="1400"/>
+          </a:p>
+        </p:txBody>
+      </p:sp>
+      <p:sp>
+        <p:nvSpPr>
+          <p:cNvPr id="38" name="TextBox 37">
+            <a:extLst>
+              <a:ext uri="{FF2B5EF4-FFF2-40B4-BE49-F238E27FC236}">
+                <a16:creationId xmlns:a16="http://schemas.microsoft.com/office/drawing/2014/main" id="{56209AC8-7D7C-8E57-EB31-520BEE111AAB}"/>
+              </a:ext>
+            </a:extLst>
+          </p:cNvPr>
+          <p:cNvSpPr txBox="1"/>
+          <p:nvPr/>
+        </p:nvSpPr>
+        <p:spPr>
+          <a:xfrm>
+            <a:off x="9365212" y="1559557"/>
+            <a:ext cx="1573137" cy="307777"/>
+          </a:xfrm>
+          <a:prstGeom prst="rect">
+            <a:avLst/>
+          </a:prstGeom>
+          <a:noFill/>
+        </p:spPr>
+        <p:txBody>
+          <a:bodyPr wrap="square" rtlCol="0">
+            <a:spAutoFit/>
+          </a:bodyPr>
+          <a:lstStyle/>
+          <a:p>
+            <a:pPr algn="ctr"/>
+            <a:r>
+              <a:rPr lang="en-US" sz="1400" dirty="0"/>
+              <a:t>Deadline</a:t>
+            </a:r>
+          </a:p>
+        </p:txBody>
+      </p:sp>
+      <p:cxnSp>
+        <p:nvCxnSpPr>
+          <p:cNvPr id="39" name="Straight Connector 38">
+            <a:extLst>
+              <a:ext uri="{FF2B5EF4-FFF2-40B4-BE49-F238E27FC236}">
+                <a16:creationId xmlns:a16="http://schemas.microsoft.com/office/drawing/2014/main" id="{9D928A99-31C2-0057-1E6B-D78703117A97}"/>
+              </a:ext>
+            </a:extLst>
+          </p:cNvPr>
+          <p:cNvCxnSpPr>
+            <a:cxnSpLocks/>
+          </p:cNvCxnSpPr>
+          <p:nvPr/>
+        </p:nvCxnSpPr>
+        <p:spPr>
+          <a:xfrm>
+            <a:off x="9085324" y="1986438"/>
+            <a:ext cx="2139193" cy="0"/>
+          </a:xfrm>
+          <a:prstGeom prst="line">
+            <a:avLst/>
+          </a:prstGeom>
+        </p:spPr>
+        <p:style>
+          <a:lnRef idx="1">
+            <a:schemeClr val="accent1"/>
+          </a:lnRef>
+          <a:fillRef idx="0">
+            <a:schemeClr val="accent1"/>
+          </a:fillRef>
+          <a:effectRef idx="0">
+            <a:schemeClr val="accent1"/>
+          </a:effectRef>
+          <a:fontRef idx="minor">
+            <a:schemeClr val="tx1"/>
+          </a:fontRef>
+        </p:style>
+      </p:cxnSp>
+      <p:cxnSp>
+        <p:nvCxnSpPr>
+          <p:cNvPr id="40" name="Straight Connector 39">
+            <a:extLst>
+              <a:ext uri="{FF2B5EF4-FFF2-40B4-BE49-F238E27FC236}">
+                <a16:creationId xmlns:a16="http://schemas.microsoft.com/office/drawing/2014/main" id="{ACAFC4B7-55A2-6FD2-F55E-159096E98BAB}"/>
+              </a:ext>
+            </a:extLst>
+          </p:cNvPr>
+          <p:cNvCxnSpPr>
+            <a:cxnSpLocks/>
+          </p:cNvCxnSpPr>
+          <p:nvPr/>
+        </p:nvCxnSpPr>
+        <p:spPr>
+          <a:xfrm>
+            <a:off x="9076505" y="2479786"/>
+            <a:ext cx="2139193" cy="0"/>
+          </a:xfrm>
+          <a:prstGeom prst="line">
+            <a:avLst/>
+          </a:prstGeom>
+        </p:spPr>
+        <p:style>
+          <a:lnRef idx="1">
+            <a:schemeClr val="accent1"/>
+          </a:lnRef>
+          <a:fillRef idx="0">
+            <a:schemeClr val="accent1"/>
+          </a:fillRef>
+          <a:effectRef idx="0">
+            <a:schemeClr val="accent1"/>
+          </a:effectRef>
+          <a:fontRef idx="minor">
+            <a:schemeClr val="tx1"/>
+          </a:fontRef>
+        </p:style>
+      </p:cxnSp>
+      <p:sp>
+        <p:nvSpPr>
+          <p:cNvPr id="41" name="TextBox 40">
+            <a:extLst>
+              <a:ext uri="{FF2B5EF4-FFF2-40B4-BE49-F238E27FC236}">
+                <a16:creationId xmlns:a16="http://schemas.microsoft.com/office/drawing/2014/main" id="{56485748-3A53-EC88-C21A-F68921DAF75A}"/>
+              </a:ext>
+            </a:extLst>
+          </p:cNvPr>
+          <p:cNvSpPr txBox="1"/>
+          <p:nvPr/>
+        </p:nvSpPr>
+        <p:spPr>
+          <a:xfrm>
+            <a:off x="9085324" y="1986438"/>
+            <a:ext cx="929165" cy="307777"/>
+          </a:xfrm>
+          <a:prstGeom prst="rect">
+            <a:avLst/>
+          </a:prstGeom>
+          <a:noFill/>
+        </p:spPr>
+        <p:txBody>
+          <a:bodyPr wrap="none" rtlCol="0">
+            <a:spAutoFit/>
+          </a:bodyPr>
+          <a:lstStyle/>
+          <a:p>
+            <a:r>
+              <a:rPr lang="en-US" sz="1400" dirty="0"/>
+              <a:t>-by: String</a:t>
+            </a:r>
+          </a:p>
+        </p:txBody>
+      </p:sp>
+      <p:sp>
+        <p:nvSpPr>
+          <p:cNvPr id="42" name="TextBox 41">
+            <a:extLst>
+              <a:ext uri="{FF2B5EF4-FFF2-40B4-BE49-F238E27FC236}">
+                <a16:creationId xmlns:a16="http://schemas.microsoft.com/office/drawing/2014/main" id="{751996B4-0FD7-6D9F-6518-FEBEF8912627}"/>
+              </a:ext>
+            </a:extLst>
+          </p:cNvPr>
+          <p:cNvSpPr txBox="1"/>
+          <p:nvPr/>
+        </p:nvSpPr>
+        <p:spPr>
+          <a:xfrm>
+            <a:off x="9076505" y="2512648"/>
+            <a:ext cx="1813317" cy="954107"/>
+          </a:xfrm>
+          <a:prstGeom prst="rect">
+            <a:avLst/>
+          </a:prstGeom>
+          <a:noFill/>
+        </p:spPr>
+        <p:txBody>
+          <a:bodyPr wrap="none" rtlCol="0">
+            <a:spAutoFit/>
+          </a:bodyPr>
+          <a:lstStyle/>
+          <a:p>
+            <a:r>
+              <a:rPr lang="en-US" sz="1400" dirty="0"/>
+              <a:t>+</a:t>
+            </a:r>
+            <a:r>
+              <a:rPr lang="en-US" sz="1400" dirty="0" err="1"/>
+              <a:t>toSaveString</a:t>
+            </a:r>
+            <a:r>
+              <a:rPr lang="en-US" sz="1400" dirty="0"/>
+              <a:t>(): String</a:t>
+            </a:r>
+          </a:p>
+          <a:p>
+            <a:r>
+              <a:rPr lang="en-US" sz="1400" dirty="0"/>
+              <a:t>+</a:t>
+            </a:r>
+            <a:r>
+              <a:rPr lang="en-US" sz="1400" dirty="0" err="1"/>
+              <a:t>toString</a:t>
+            </a:r>
+            <a:r>
+              <a:rPr lang="en-US" sz="1400" dirty="0"/>
+              <a:t>(): String</a:t>
+            </a:r>
+          </a:p>
+          <a:p>
+            <a:r>
+              <a:rPr lang="en-US" sz="1400" dirty="0"/>
+              <a:t>+</a:t>
+            </a:r>
+            <a:r>
+              <a:rPr lang="en-US" sz="1400" dirty="0" err="1"/>
+              <a:t>getDeadline</a:t>
+            </a:r>
+            <a:r>
+              <a:rPr lang="en-US" sz="1400" dirty="0"/>
+              <a:t>(): String</a:t>
+            </a:r>
+          </a:p>
+          <a:p>
+            <a:endParaRPr lang="en-US" sz="1400" dirty="0"/>
+          </a:p>
+        </p:txBody>
+      </p:sp>
+      <p:sp>
+        <p:nvSpPr>
+          <p:cNvPr id="43" name="Rectangle 42">
+            <a:extLst>
+              <a:ext uri="{FF2B5EF4-FFF2-40B4-BE49-F238E27FC236}">
+                <a16:creationId xmlns:a16="http://schemas.microsoft.com/office/drawing/2014/main" id="{CF4E21C8-F86E-1205-A123-46458FA86E13}"/>
+              </a:ext>
+            </a:extLst>
+          </p:cNvPr>
+          <p:cNvSpPr/>
+          <p:nvPr/>
+        </p:nvSpPr>
+        <p:spPr>
+          <a:xfrm>
+            <a:off x="5367179" y="1441152"/>
+            <a:ext cx="2141736" cy="544588"/>
+          </a:xfrm>
+          <a:prstGeom prst="rect">
+            <a:avLst/>
+          </a:prstGeom>
+        </p:spPr>
+        <p:style>
+          <a:lnRef idx="2">
+            <a:schemeClr val="accent4">
+              <a:shade val="50000"/>
+            </a:schemeClr>
+          </a:lnRef>
+          <a:fillRef idx="1">
+            <a:schemeClr val="accent4"/>
+          </a:fillRef>
+          <a:effectRef idx="0">
+            <a:schemeClr val="accent4"/>
+          </a:effectRef>
+          <a:fontRef idx="minor">
+            <a:schemeClr val="lt1"/>
+          </a:fontRef>
+        </p:style>
+        <p:txBody>
+          <a:bodyPr rtlCol="0" anchor="ctr"/>
+          <a:lstStyle/>
+          <a:p>
+            <a:pPr algn="ctr"/>
+            <a:endParaRPr lang="en-US" sz="1400"/>
+          </a:p>
+        </p:txBody>
+      </p:sp>
+      <p:sp>
+        <p:nvSpPr>
+          <p:cNvPr id="44" name="Rectangle 43">
+            <a:extLst>
+              <a:ext uri="{FF2B5EF4-FFF2-40B4-BE49-F238E27FC236}">
+                <a16:creationId xmlns:a16="http://schemas.microsoft.com/office/drawing/2014/main" id="{FB110E51-C13A-9EE5-30B5-0F27CACD6201}"/>
+              </a:ext>
+            </a:extLst>
+          </p:cNvPr>
+          <p:cNvSpPr/>
+          <p:nvPr/>
+        </p:nvSpPr>
+        <p:spPr>
+          <a:xfrm>
+            <a:off x="5367181" y="1441650"/>
+            <a:ext cx="2159845" cy="4667495"/>
+          </a:xfrm>
+          <a:prstGeom prst="rect">
+            <a:avLst/>
+          </a:prstGeom>
+          <a:noFill/>
+        </p:spPr>
+        <p:style>
+          <a:lnRef idx="2">
+            <a:schemeClr val="accent1">
+              <a:shade val="50000"/>
+            </a:schemeClr>
+          </a:lnRef>
+          <a:fillRef idx="1">
+            <a:schemeClr val="accent1"/>
+          </a:fillRef>
+          <a:effectRef idx="0">
+            <a:schemeClr val="accent1"/>
+          </a:effectRef>
+          <a:fontRef idx="minor">
+            <a:schemeClr val="lt1"/>
+          </a:fontRef>
+        </p:style>
+        <p:txBody>
+          <a:bodyPr rtlCol="0" anchor="ctr"/>
+          <a:lstStyle/>
+          <a:p>
+            <a:pPr algn="ctr"/>
+            <a:endParaRPr lang="en-US" sz="1400"/>
+          </a:p>
+        </p:txBody>
+      </p:sp>
+      <p:sp>
+        <p:nvSpPr>
+          <p:cNvPr id="45" name="TextBox 44">
+            <a:extLst>
+              <a:ext uri="{FF2B5EF4-FFF2-40B4-BE49-F238E27FC236}">
+                <a16:creationId xmlns:a16="http://schemas.microsoft.com/office/drawing/2014/main" id="{79E3FA94-1B4C-DE5E-9D61-9B5A66076C33}"/>
+              </a:ext>
+            </a:extLst>
+          </p:cNvPr>
+          <p:cNvSpPr txBox="1"/>
+          <p:nvPr/>
+        </p:nvSpPr>
+        <p:spPr>
+          <a:xfrm>
+            <a:off x="5647068" y="1559557"/>
+            <a:ext cx="1573137" cy="307777"/>
+          </a:xfrm>
+          <a:prstGeom prst="rect">
+            <a:avLst/>
+          </a:prstGeom>
+          <a:noFill/>
+        </p:spPr>
+        <p:txBody>
+          <a:bodyPr wrap="square" rtlCol="0">
+            <a:spAutoFit/>
+          </a:bodyPr>
+          <a:lstStyle/>
+          <a:p>
+            <a:pPr algn="ctr"/>
+            <a:r>
+              <a:rPr lang="en-US" sz="1400" dirty="0"/>
+              <a:t>Task</a:t>
+            </a:r>
+          </a:p>
+        </p:txBody>
+      </p:sp>
+      <p:cxnSp>
+        <p:nvCxnSpPr>
+          <p:cNvPr id="46" name="Straight Connector 45">
+            <a:extLst>
+              <a:ext uri="{FF2B5EF4-FFF2-40B4-BE49-F238E27FC236}">
+                <a16:creationId xmlns:a16="http://schemas.microsoft.com/office/drawing/2014/main" id="{61C310C7-93A2-6559-1DBC-6F49B98387DE}"/>
+              </a:ext>
+            </a:extLst>
+          </p:cNvPr>
+          <p:cNvCxnSpPr>
+            <a:cxnSpLocks/>
+          </p:cNvCxnSpPr>
+          <p:nvPr/>
+        </p:nvCxnSpPr>
+        <p:spPr>
+          <a:xfrm>
+            <a:off x="5367180" y="1986438"/>
+            <a:ext cx="2139193" cy="0"/>
+          </a:xfrm>
+          <a:prstGeom prst="line">
+            <a:avLst/>
+          </a:prstGeom>
+        </p:spPr>
+        <p:style>
+          <a:lnRef idx="1">
+            <a:schemeClr val="accent1"/>
+          </a:lnRef>
+          <a:fillRef idx="0">
+            <a:schemeClr val="accent1"/>
+          </a:fillRef>
+          <a:effectRef idx="0">
+            <a:schemeClr val="accent1"/>
+          </a:effectRef>
+          <a:fontRef idx="minor">
+            <a:schemeClr val="tx1"/>
+          </a:fontRef>
+        </p:style>
+      </p:cxnSp>
+      <p:cxnSp>
+        <p:nvCxnSpPr>
+          <p:cNvPr id="47" name="Straight Connector 46">
+            <a:extLst>
+              <a:ext uri="{FF2B5EF4-FFF2-40B4-BE49-F238E27FC236}">
+                <a16:creationId xmlns:a16="http://schemas.microsoft.com/office/drawing/2014/main" id="{878E3335-7789-8146-CB02-ED7DA654E5C0}"/>
+              </a:ext>
+            </a:extLst>
+          </p:cNvPr>
+          <p:cNvCxnSpPr>
+            <a:cxnSpLocks/>
+          </p:cNvCxnSpPr>
+          <p:nvPr/>
+        </p:nvCxnSpPr>
+        <p:spPr>
+          <a:xfrm>
+            <a:off x="5364039" y="2948854"/>
+            <a:ext cx="2139193" cy="0"/>
+          </a:xfrm>
+          <a:prstGeom prst="line">
+            <a:avLst/>
+          </a:prstGeom>
+        </p:spPr>
+        <p:style>
+          <a:lnRef idx="1">
+            <a:schemeClr val="accent1"/>
+          </a:lnRef>
+          <a:fillRef idx="0">
+            <a:schemeClr val="accent1"/>
+          </a:fillRef>
+          <a:effectRef idx="0">
+            <a:schemeClr val="accent1"/>
+          </a:effectRef>
+          <a:fontRef idx="minor">
+            <a:schemeClr val="tx1"/>
+          </a:fontRef>
+        </p:style>
+      </p:cxnSp>
+      <p:sp>
+        <p:nvSpPr>
+          <p:cNvPr id="48" name="TextBox 47">
+            <a:extLst>
+              <a:ext uri="{FF2B5EF4-FFF2-40B4-BE49-F238E27FC236}">
+                <a16:creationId xmlns:a16="http://schemas.microsoft.com/office/drawing/2014/main" id="{73AF6AFB-3CDD-4765-86BA-44E07359A6EB}"/>
+              </a:ext>
+            </a:extLst>
+          </p:cNvPr>
+          <p:cNvSpPr txBox="1"/>
+          <p:nvPr/>
+        </p:nvSpPr>
+        <p:spPr>
+          <a:xfrm>
+            <a:off x="5367180" y="1986438"/>
+            <a:ext cx="1573701" cy="954107"/>
+          </a:xfrm>
+          <a:prstGeom prst="rect">
+            <a:avLst/>
+          </a:prstGeom>
+          <a:noFill/>
+        </p:spPr>
+        <p:txBody>
+          <a:bodyPr wrap="none" rtlCol="0">
+            <a:spAutoFit/>
+          </a:bodyPr>
+          <a:lstStyle/>
+          <a:p>
+            <a:r>
+              <a:rPr lang="en-US" sz="1400" dirty="0"/>
+              <a:t>-</a:t>
+            </a:r>
+            <a:r>
+              <a:rPr lang="en-US" sz="1400" dirty="0" err="1"/>
+              <a:t>taskCount</a:t>
+            </a:r>
+            <a:r>
+              <a:rPr lang="en-US" sz="1400" dirty="0"/>
+              <a:t>: int</a:t>
+            </a:r>
+          </a:p>
+          <a:p>
+            <a:r>
+              <a:rPr lang="en-US" sz="1400" dirty="0"/>
+              <a:t>-description: String</a:t>
+            </a:r>
+          </a:p>
+          <a:p>
+            <a:r>
+              <a:rPr lang="en-US" sz="1400" dirty="0"/>
+              <a:t>-priority: int</a:t>
+            </a:r>
+          </a:p>
+          <a:p>
+            <a:r>
+              <a:rPr lang="en-US" sz="1400" dirty="0"/>
+              <a:t>-</a:t>
+            </a:r>
+            <a:r>
+              <a:rPr lang="en-US" sz="1400" dirty="0" err="1"/>
+              <a:t>isDone</a:t>
+            </a:r>
+            <a:r>
+              <a:rPr lang="en-US" sz="1400" dirty="0"/>
+              <a:t>: </a:t>
+            </a:r>
+            <a:r>
+              <a:rPr lang="en-US" sz="1400" dirty="0" err="1"/>
+              <a:t>boolean</a:t>
+            </a:r>
+            <a:endParaRPr lang="en-US" sz="1400" dirty="0"/>
+          </a:p>
+        </p:txBody>
+      </p:sp>
+      <p:sp>
+        <p:nvSpPr>
+          <p:cNvPr id="49" name="TextBox 48">
+            <a:extLst>
+              <a:ext uri="{FF2B5EF4-FFF2-40B4-BE49-F238E27FC236}">
+                <a16:creationId xmlns:a16="http://schemas.microsoft.com/office/drawing/2014/main" id="{5F59BFF3-E2C0-3AE8-416A-93DB54DBD7BD}"/>
+              </a:ext>
+            </a:extLst>
+          </p:cNvPr>
+          <p:cNvSpPr txBox="1"/>
+          <p:nvPr/>
+        </p:nvSpPr>
+        <p:spPr>
+          <a:xfrm>
+            <a:off x="5364039" y="2974735"/>
+            <a:ext cx="2234073" cy="3108543"/>
+          </a:xfrm>
+          <a:prstGeom prst="rect">
+            <a:avLst/>
+          </a:prstGeom>
+          <a:noFill/>
+        </p:spPr>
+        <p:txBody>
+          <a:bodyPr wrap="none" rtlCol="0">
+            <a:spAutoFit/>
+          </a:bodyPr>
+          <a:lstStyle/>
+          <a:p>
+            <a:r>
+              <a:rPr lang="en-US" sz="1400" dirty="0"/>
+              <a:t>+</a:t>
+            </a:r>
+            <a:r>
+              <a:rPr lang="en-US" sz="1400" dirty="0" err="1"/>
+              <a:t>setPriority</a:t>
+            </a:r>
+            <a:r>
+              <a:rPr lang="en-US" sz="1400" dirty="0"/>
+              <a:t>()</a:t>
+            </a:r>
+          </a:p>
+          <a:p>
+            <a:r>
+              <a:rPr lang="en-US" sz="1400" dirty="0"/>
+              <a:t>+</a:t>
+            </a:r>
+            <a:r>
+              <a:rPr lang="en-US" sz="1400" dirty="0" err="1"/>
+              <a:t>clearCount</a:t>
+            </a:r>
+            <a:r>
+              <a:rPr lang="en-US" sz="1400" dirty="0"/>
+              <a:t>()</a:t>
+            </a:r>
+          </a:p>
+          <a:p>
+            <a:r>
+              <a:rPr lang="en-US" sz="1400" dirty="0"/>
+              <a:t>+</a:t>
+            </a:r>
+            <a:r>
+              <a:rPr lang="en-US" sz="1400" dirty="0" err="1"/>
+              <a:t>markAsDone</a:t>
+            </a:r>
+            <a:r>
+              <a:rPr lang="en-US" sz="1400" dirty="0"/>
+              <a:t>()</a:t>
+            </a:r>
+          </a:p>
+          <a:p>
+            <a:r>
+              <a:rPr lang="en-US" sz="1400" dirty="0"/>
+              <a:t>+</a:t>
+            </a:r>
+            <a:r>
+              <a:rPr lang="en-US" sz="1400" dirty="0" err="1"/>
+              <a:t>markAsNotDone</a:t>
+            </a:r>
+            <a:r>
+              <a:rPr lang="en-US" sz="1400" dirty="0"/>
+              <a:t>()</a:t>
+            </a:r>
+          </a:p>
+          <a:p>
+            <a:r>
+              <a:rPr lang="en-US" sz="1400" dirty="0"/>
+              <a:t>+</a:t>
+            </a:r>
+            <a:r>
+              <a:rPr lang="en-US" sz="1400" dirty="0" err="1"/>
+              <a:t>getStatusIcon</a:t>
+            </a:r>
+            <a:r>
+              <a:rPr lang="en-US" sz="1400" dirty="0"/>
+              <a:t>(): String</a:t>
+            </a:r>
+          </a:p>
+          <a:p>
+            <a:r>
+              <a:rPr lang="en-US" sz="1400" dirty="0"/>
+              <a:t>+</a:t>
+            </a:r>
+            <a:r>
+              <a:rPr lang="en-US" sz="1400" dirty="0" err="1"/>
+              <a:t>toSaveString</a:t>
+            </a:r>
+            <a:r>
+              <a:rPr lang="en-US" sz="1400" dirty="0"/>
+              <a:t>(): String</a:t>
+            </a:r>
+          </a:p>
+          <a:p>
+            <a:r>
+              <a:rPr lang="en-US" sz="1400" dirty="0"/>
+              <a:t>+</a:t>
+            </a:r>
+            <a:r>
+              <a:rPr lang="en-US" sz="1400" dirty="0" err="1"/>
+              <a:t>toString</a:t>
+            </a:r>
+            <a:r>
+              <a:rPr lang="en-US" sz="1400" dirty="0"/>
+              <a:t>(): String</a:t>
+            </a:r>
+          </a:p>
+          <a:p>
+            <a:r>
+              <a:rPr lang="en-US" sz="1400" dirty="0"/>
+              <a:t>+</a:t>
+            </a:r>
+            <a:r>
+              <a:rPr lang="en-US" sz="1400" dirty="0" err="1"/>
+              <a:t>getDescription</a:t>
+            </a:r>
+            <a:r>
+              <a:rPr lang="en-US" sz="1400" dirty="0"/>
+              <a:t>(): String</a:t>
+            </a:r>
+          </a:p>
+          <a:p>
+            <a:r>
+              <a:rPr lang="en-US" sz="1400" dirty="0"/>
+              <a:t>+</a:t>
+            </a:r>
+            <a:r>
+              <a:rPr lang="en-US" sz="1400" dirty="0" err="1"/>
+              <a:t>getPriority</a:t>
+            </a:r>
+            <a:r>
+              <a:rPr lang="en-US" sz="1400" dirty="0"/>
+              <a:t>(): String</a:t>
+            </a:r>
+          </a:p>
+          <a:p>
+            <a:r>
+              <a:rPr lang="en-US" sz="1400" dirty="0"/>
+              <a:t>+</a:t>
+            </a:r>
+            <a:r>
+              <a:rPr lang="en-US" sz="1400" dirty="0" err="1"/>
+              <a:t>returnPriority</a:t>
+            </a:r>
+            <a:r>
+              <a:rPr lang="en-US" sz="1400" dirty="0"/>
+              <a:t>(): int</a:t>
+            </a:r>
+          </a:p>
+          <a:p>
+            <a:r>
+              <a:rPr lang="en-US" sz="1400" dirty="0"/>
+              <a:t>+</a:t>
+            </a:r>
+            <a:r>
+              <a:rPr lang="en-US" sz="1400" dirty="0" err="1"/>
+              <a:t>incrementCount</a:t>
+            </a:r>
+            <a:r>
+              <a:rPr lang="en-US" sz="1400" dirty="0"/>
+              <a:t>()</a:t>
+            </a:r>
+          </a:p>
+          <a:p>
+            <a:r>
+              <a:rPr lang="en-US" sz="1400" dirty="0"/>
+              <a:t>+</a:t>
+            </a:r>
+            <a:r>
+              <a:rPr lang="en-US" sz="1400" dirty="0" err="1"/>
+              <a:t>decrementCount</a:t>
+            </a:r>
+            <a:r>
+              <a:rPr lang="en-US" sz="1400" dirty="0"/>
+              <a:t>()</a:t>
+            </a:r>
+          </a:p>
+          <a:p>
+            <a:r>
+              <a:rPr lang="en-US" sz="1400" dirty="0"/>
+              <a:t>+</a:t>
+            </a:r>
+            <a:r>
+              <a:rPr lang="en-US" sz="1400" dirty="0" err="1"/>
+              <a:t>getTaskCount</a:t>
+            </a:r>
+            <a:r>
+              <a:rPr lang="en-US" sz="1400" dirty="0"/>
+              <a:t>(): int</a:t>
+            </a:r>
+          </a:p>
+          <a:p>
+            <a:r>
+              <a:rPr lang="en-US" sz="1400" dirty="0"/>
+              <a:t>+</a:t>
+            </a:r>
+            <a:r>
+              <a:rPr lang="en-US" sz="1400" dirty="0" err="1"/>
+              <a:t>getDoneCondition</a:t>
+            </a:r>
+            <a:r>
+              <a:rPr lang="en-US" sz="1400" dirty="0"/>
+              <a:t>(): String</a:t>
+            </a:r>
+          </a:p>
+        </p:txBody>
+      </p:sp>
+      <p:cxnSp>
+        <p:nvCxnSpPr>
+          <p:cNvPr id="52" name="Straight Connector 51">
+            <a:extLst>
+              <a:ext uri="{FF2B5EF4-FFF2-40B4-BE49-F238E27FC236}">
+                <a16:creationId xmlns:a16="http://schemas.microsoft.com/office/drawing/2014/main" id="{BCC389B7-18B1-3237-7652-18A6DD153974}"/>
+              </a:ext>
+            </a:extLst>
+          </p:cNvPr>
+          <p:cNvCxnSpPr/>
+          <p:nvPr/>
+        </p:nvCxnSpPr>
+        <p:spPr>
+          <a:xfrm>
+            <a:off x="2926724" y="3754533"/>
+            <a:ext cx="0" cy="510576"/>
+          </a:xfrm>
+          <a:prstGeom prst="line">
+            <a:avLst/>
+          </a:prstGeom>
+          <a:ln w="19050"/>
+        </p:spPr>
+        <p:style>
+          <a:lnRef idx="1">
+            <a:schemeClr val="dk1"/>
+          </a:lnRef>
+          <a:fillRef idx="0">
+            <a:schemeClr val="dk1"/>
+          </a:fillRef>
+          <a:effectRef idx="0">
+            <a:schemeClr val="dk1"/>
+          </a:effectRef>
+          <a:fontRef idx="minor">
+            <a:schemeClr val="tx1"/>
+          </a:fontRef>
+        </p:style>
+      </p:cxnSp>
+      <p:sp>
+        <p:nvSpPr>
+          <p:cNvPr id="53" name="Isosceles Triangle 52">
+            <a:extLst>
+              <a:ext uri="{FF2B5EF4-FFF2-40B4-BE49-F238E27FC236}">
+                <a16:creationId xmlns:a16="http://schemas.microsoft.com/office/drawing/2014/main" id="{C76A68FC-10C8-A2DD-AEFD-DC5463D595E4}"/>
+              </a:ext>
+            </a:extLst>
+          </p:cNvPr>
+          <p:cNvSpPr/>
+          <p:nvPr/>
+        </p:nvSpPr>
+        <p:spPr>
+          <a:xfrm>
+            <a:off x="2745760" y="3607351"/>
+            <a:ext cx="361927" cy="160082"/>
+          </a:xfrm>
+          <a:prstGeom prst="triangle">
+            <a:avLst/>
+          </a:prstGeom>
+          <a:solidFill>
+            <a:schemeClr val="bg1"/>
+          </a:solidFill>
+        </p:spPr>
+        <p:style>
+          <a:lnRef idx="2">
+            <a:schemeClr val="dk1">
+              <a:shade val="50000"/>
+            </a:schemeClr>
+          </a:lnRef>
+          <a:fillRef idx="1">
+            <a:schemeClr val="dk1"/>
+          </a:fillRef>
+          <a:effectRef idx="0">
+            <a:schemeClr val="dk1"/>
+          </a:effectRef>
+          <a:fontRef idx="minor">
+            <a:schemeClr val="lt1"/>
+          </a:fontRef>
+        </p:style>
+        <p:txBody>
+          <a:bodyPr rtlCol="0" anchor="ctr"/>
+          <a:lstStyle/>
+          <a:p>
+            <a:pPr algn="ctr"/>
+            <a:endParaRPr lang="en-US"/>
+          </a:p>
+        </p:txBody>
+      </p:sp>
+      <p:cxnSp>
+        <p:nvCxnSpPr>
+          <p:cNvPr id="54" name="Straight Connector 53">
+            <a:extLst>
+              <a:ext uri="{FF2B5EF4-FFF2-40B4-BE49-F238E27FC236}">
+                <a16:creationId xmlns:a16="http://schemas.microsoft.com/office/drawing/2014/main" id="{0BEEE847-667A-ED34-E974-0195AE36C8F0}"/>
+              </a:ext>
+            </a:extLst>
+          </p:cNvPr>
+          <p:cNvCxnSpPr>
+            <a:cxnSpLocks/>
+            <a:endCxn id="5" idx="0"/>
+          </p:cNvCxnSpPr>
+          <p:nvPr/>
+        </p:nvCxnSpPr>
+        <p:spPr>
+          <a:xfrm flipH="1">
+            <a:off x="10089002" y="3685969"/>
+            <a:ext cx="10327" cy="568531"/>
+          </a:xfrm>
+          <a:prstGeom prst="line">
+            <a:avLst/>
+          </a:prstGeom>
+          <a:ln w="19050"/>
+        </p:spPr>
+        <p:style>
+          <a:lnRef idx="1">
+            <a:schemeClr val="dk1"/>
+          </a:lnRef>
+          <a:fillRef idx="0">
+            <a:schemeClr val="dk1"/>
+          </a:fillRef>
+          <a:effectRef idx="0">
+            <a:schemeClr val="dk1"/>
+          </a:effectRef>
+          <a:fontRef idx="minor">
+            <a:schemeClr val="tx1"/>
+          </a:fontRef>
+        </p:style>
+      </p:cxnSp>
+      <p:sp>
+        <p:nvSpPr>
+          <p:cNvPr id="55" name="Isosceles Triangle 54">
+            <a:extLst>
+              <a:ext uri="{FF2B5EF4-FFF2-40B4-BE49-F238E27FC236}">
+                <a16:creationId xmlns:a16="http://schemas.microsoft.com/office/drawing/2014/main" id="{40702A49-5FAD-2758-CD97-139E90B0B444}"/>
+              </a:ext>
+            </a:extLst>
+          </p:cNvPr>
+          <p:cNvSpPr/>
+          <p:nvPr/>
+        </p:nvSpPr>
+        <p:spPr>
+          <a:xfrm>
+            <a:off x="9918365" y="3538787"/>
+            <a:ext cx="361927" cy="160082"/>
+          </a:xfrm>
+          <a:prstGeom prst="triangle">
+            <a:avLst/>
+          </a:prstGeom>
+          <a:solidFill>
+            <a:schemeClr val="bg1"/>
+          </a:solidFill>
+        </p:spPr>
+        <p:style>
+          <a:lnRef idx="2">
+            <a:schemeClr val="dk1">
+              <a:shade val="50000"/>
+            </a:schemeClr>
+          </a:lnRef>
+          <a:fillRef idx="1">
+            <a:schemeClr val="dk1"/>
+          </a:fillRef>
+          <a:effectRef idx="0">
+            <a:schemeClr val="dk1"/>
+          </a:effectRef>
+          <a:fontRef idx="minor">
+            <a:schemeClr val="lt1"/>
+          </a:fontRef>
+        </p:style>
+        <p:txBody>
+          <a:bodyPr rtlCol="0" anchor="ctr"/>
+          <a:lstStyle/>
+          <a:p>
+            <a:pPr algn="ctr"/>
+            <a:endParaRPr lang="en-US"/>
+          </a:p>
+        </p:txBody>
+      </p:sp>
+      <p:cxnSp>
+        <p:nvCxnSpPr>
+          <p:cNvPr id="60" name="Straight Connector 59">
+            <a:extLst>
+              <a:ext uri="{FF2B5EF4-FFF2-40B4-BE49-F238E27FC236}">
+                <a16:creationId xmlns:a16="http://schemas.microsoft.com/office/drawing/2014/main" id="{40D243EA-5F26-D841-BE6D-244C59CE7DCC}"/>
+              </a:ext>
+            </a:extLst>
+          </p:cNvPr>
+          <p:cNvCxnSpPr>
+            <a:cxnSpLocks/>
+          </p:cNvCxnSpPr>
+          <p:nvPr/>
+        </p:nvCxnSpPr>
+        <p:spPr>
+          <a:xfrm flipH="1">
+            <a:off x="5054600" y="444386"/>
+            <a:ext cx="878182" cy="0"/>
+          </a:xfrm>
+          <a:prstGeom prst="line">
+            <a:avLst/>
+          </a:prstGeom>
+          <a:ln w="19050"/>
+        </p:spPr>
+        <p:style>
+          <a:lnRef idx="1">
+            <a:schemeClr val="dk1"/>
+          </a:lnRef>
+          <a:fillRef idx="0">
+            <a:schemeClr val="dk1"/>
+          </a:fillRef>
+          <a:effectRef idx="0">
+            <a:schemeClr val="dk1"/>
+          </a:effectRef>
+          <a:fontRef idx="minor">
+            <a:schemeClr val="tx1"/>
+          </a:fontRef>
+        </p:style>
+      </p:cxnSp>
+      <p:sp>
+        <p:nvSpPr>
+          <p:cNvPr id="61" name="Isosceles Triangle 60">
+            <a:extLst>
+              <a:ext uri="{FF2B5EF4-FFF2-40B4-BE49-F238E27FC236}">
+                <a16:creationId xmlns:a16="http://schemas.microsoft.com/office/drawing/2014/main" id="{9C755AE2-61CB-01C5-56F0-444E0EE79F4C}"/>
+              </a:ext>
+            </a:extLst>
+          </p:cNvPr>
+          <p:cNvSpPr/>
+          <p:nvPr/>
+        </p:nvSpPr>
+        <p:spPr>
+          <a:xfrm rot="5400000">
+            <a:off x="5831860" y="372116"/>
+            <a:ext cx="361927" cy="160082"/>
+          </a:xfrm>
+          <a:prstGeom prst="triangle">
+            <a:avLst/>
+          </a:prstGeom>
+          <a:solidFill>
+            <a:schemeClr val="bg1"/>
+          </a:solidFill>
+        </p:spPr>
+        <p:style>
+          <a:lnRef idx="2">
+            <a:schemeClr val="dk1">
+              <a:shade val="50000"/>
+            </a:schemeClr>
+          </a:lnRef>
+          <a:fillRef idx="1">
+            <a:schemeClr val="dk1"/>
+          </a:fillRef>
+          <a:effectRef idx="0">
+            <a:schemeClr val="dk1"/>
+          </a:effectRef>
+          <a:fontRef idx="minor">
+            <a:schemeClr val="lt1"/>
+          </a:fontRef>
+        </p:style>
+        <p:txBody>
+          <a:bodyPr rtlCol="0" anchor="ctr"/>
+          <a:lstStyle/>
+          <a:p>
+            <a:pPr algn="ctr"/>
+            <a:endParaRPr lang="en-US"/>
+          </a:p>
+        </p:txBody>
+      </p:sp>
+      <p:cxnSp>
+        <p:nvCxnSpPr>
+          <p:cNvPr id="64" name="Straight Connector 63">
+            <a:extLst>
+              <a:ext uri="{FF2B5EF4-FFF2-40B4-BE49-F238E27FC236}">
+                <a16:creationId xmlns:a16="http://schemas.microsoft.com/office/drawing/2014/main" id="{BC467B80-148E-1947-A209-F548ACDFD3F4}"/>
+              </a:ext>
+            </a:extLst>
+          </p:cNvPr>
+          <p:cNvCxnSpPr>
+            <a:cxnSpLocks/>
+          </p:cNvCxnSpPr>
+          <p:nvPr/>
+        </p:nvCxnSpPr>
+        <p:spPr>
+          <a:xfrm flipH="1">
+            <a:off x="3930661" y="1788738"/>
+            <a:ext cx="1267614" cy="0"/>
+          </a:xfrm>
+          <a:prstGeom prst="line">
+            <a:avLst/>
+          </a:prstGeom>
+          <a:ln w="19050"/>
+        </p:spPr>
+        <p:style>
+          <a:lnRef idx="1">
+            <a:schemeClr val="dk1"/>
+          </a:lnRef>
+          <a:fillRef idx="0">
+            <a:schemeClr val="dk1"/>
+          </a:fillRef>
+          <a:effectRef idx="0">
+            <a:schemeClr val="dk1"/>
+          </a:effectRef>
+          <a:fontRef idx="minor">
+            <a:schemeClr val="tx1"/>
+          </a:fontRef>
+        </p:style>
+      </p:cxnSp>
+      <p:sp>
+        <p:nvSpPr>
+          <p:cNvPr id="65" name="Isosceles Triangle 64">
+            <a:extLst>
+              <a:ext uri="{FF2B5EF4-FFF2-40B4-BE49-F238E27FC236}">
+                <a16:creationId xmlns:a16="http://schemas.microsoft.com/office/drawing/2014/main" id="{C301A6F3-3A47-7BB5-FEC7-B61A45B75E91}"/>
+              </a:ext>
+            </a:extLst>
+          </p:cNvPr>
+          <p:cNvSpPr/>
+          <p:nvPr/>
+        </p:nvSpPr>
+        <p:spPr>
+          <a:xfrm rot="5400000">
+            <a:off x="5097353" y="1716468"/>
+            <a:ext cx="361927" cy="160082"/>
+          </a:xfrm>
+          <a:prstGeom prst="triangle">
+            <a:avLst/>
+          </a:prstGeom>
+          <a:solidFill>
+            <a:schemeClr val="bg1"/>
+          </a:solidFill>
+        </p:spPr>
+        <p:style>
+          <a:lnRef idx="2">
+            <a:schemeClr val="dk1">
+              <a:shade val="50000"/>
+            </a:schemeClr>
+          </a:lnRef>
+          <a:fillRef idx="1">
+            <a:schemeClr val="dk1"/>
+          </a:fillRef>
+          <a:effectRef idx="0">
+            <a:schemeClr val="dk1"/>
+          </a:effectRef>
+          <a:fontRef idx="minor">
+            <a:schemeClr val="lt1"/>
+          </a:fontRef>
+        </p:style>
+        <p:txBody>
+          <a:bodyPr rtlCol="0" anchor="ctr"/>
+          <a:lstStyle/>
+          <a:p>
+            <a:pPr algn="ctr"/>
+            <a:endParaRPr lang="en-US"/>
+          </a:p>
+        </p:txBody>
+      </p:sp>
+      <p:cxnSp>
+        <p:nvCxnSpPr>
+          <p:cNvPr id="68" name="Straight Connector 67">
+            <a:extLst>
+              <a:ext uri="{FF2B5EF4-FFF2-40B4-BE49-F238E27FC236}">
+                <a16:creationId xmlns:a16="http://schemas.microsoft.com/office/drawing/2014/main" id="{58BC1B71-E9CD-B72A-0DBA-805DF4A357E9}"/>
+              </a:ext>
+            </a:extLst>
+          </p:cNvPr>
+          <p:cNvCxnSpPr>
+            <a:cxnSpLocks/>
+          </p:cNvCxnSpPr>
+          <p:nvPr/>
+        </p:nvCxnSpPr>
+        <p:spPr>
+          <a:xfrm flipH="1">
+            <a:off x="7677820" y="1739441"/>
+            <a:ext cx="1398685" cy="0"/>
+          </a:xfrm>
+          <a:prstGeom prst="line">
+            <a:avLst/>
+          </a:prstGeom>
+          <a:ln w="19050"/>
+        </p:spPr>
+        <p:style>
+          <a:lnRef idx="1">
+            <a:schemeClr val="dk1"/>
+          </a:lnRef>
+          <a:fillRef idx="0">
+            <a:schemeClr val="dk1"/>
+          </a:fillRef>
+          <a:effectRef idx="0">
+            <a:schemeClr val="dk1"/>
+          </a:effectRef>
+          <a:fontRef idx="minor">
+            <a:schemeClr val="tx1"/>
+          </a:fontRef>
+        </p:style>
+      </p:cxnSp>
+      <p:sp>
+        <p:nvSpPr>
+          <p:cNvPr id="69" name="Isosceles Triangle 68">
+            <a:extLst>
+              <a:ext uri="{FF2B5EF4-FFF2-40B4-BE49-F238E27FC236}">
+                <a16:creationId xmlns:a16="http://schemas.microsoft.com/office/drawing/2014/main" id="{46966CFE-2F4A-E6B5-1388-D08939A82D82}"/>
+              </a:ext>
+            </a:extLst>
+          </p:cNvPr>
+          <p:cNvSpPr/>
+          <p:nvPr/>
+        </p:nvSpPr>
+        <p:spPr>
+          <a:xfrm rot="16200000">
+            <a:off x="7416814" y="1660479"/>
+            <a:ext cx="361927" cy="160084"/>
+          </a:xfrm>
+          <a:prstGeom prst="triangle">
+            <a:avLst/>
+          </a:prstGeom>
+          <a:solidFill>
+            <a:schemeClr val="bg1"/>
+          </a:solidFill>
+        </p:spPr>
+        <p:style>
+          <a:lnRef idx="2">
+            <a:schemeClr val="dk1">
+              <a:shade val="50000"/>
+            </a:schemeClr>
+          </a:lnRef>
+          <a:fillRef idx="1">
+            <a:schemeClr val="dk1"/>
+          </a:fillRef>
+          <a:effectRef idx="0">
+            <a:schemeClr val="dk1"/>
+          </a:effectRef>
+          <a:fontRef idx="minor">
+            <a:schemeClr val="lt1"/>
+          </a:fontRef>
+        </p:style>
+        <p:txBody>
+          <a:bodyPr rtlCol="0" anchor="ctr"/>
+          <a:lstStyle/>
+          <a:p>
+            <a:pPr algn="ctr"/>
+            <a:endParaRPr lang="en-US"/>
+          </a:p>
+        </p:txBody>
+      </p:sp>
+    </p:spTree>
+    <p:extLst>
+      <p:ext uri="{BB962C8B-B14F-4D97-AF65-F5344CB8AC3E}">
+        <p14:creationId xmlns:p14="http://schemas.microsoft.com/office/powerpoint/2010/main" val="241774144"/>
+      </p:ext>
+    </p:extLst>
+  </p:cSld>
+  <p:clrMapOvr>
+    <a:masterClrMapping/>
+  </p:clrMapOvr>
+</p:sld>
+</file>
+
 <file path=ppt/theme/theme1.xml><?xml version="1.0" encoding="utf-8"?>
 <a:theme xmlns:a="http://schemas.openxmlformats.org/drawingml/2006/main" name="Office Theme">
   <a:themeElements>

</xml_diff>

<commit_message>
Added sequence diagrams for listClasses and addSchoolClass
</commit_message>
<xml_diff>
--- a/docs/tP Diagram Editable.pptx
+++ b/docs/tP Diagram Editable.pptx
@@ -13,6 +13,8 @@
     <p:sldId id="263" r:id="rId7"/>
     <p:sldId id="261" r:id="rId8"/>
     <p:sldId id="264" r:id="rId9"/>
+    <p:sldId id="265" r:id="rId10"/>
+    <p:sldId id="266" r:id="rId11"/>
   </p:sldIdLst>
   <p:sldSz cx="12192000" cy="6858000"/>
   <p:notesSz cx="6858000" cy="9144000"/>
@@ -266,7 +268,7 @@
           <a:p>
             <a:fld id="{FC955756-5376-45AC-9F68-FBE46185159B}" type="datetimeFigureOut">
               <a:rPr lang="en-US" smtClean="0"/>
-              <a:t>3/30/2023</a:t>
+              <a:t>4/5/2023</a:t>
             </a:fld>
             <a:endParaRPr lang="en-US"/>
           </a:p>
@@ -464,7 +466,7 @@
           <a:p>
             <a:fld id="{FC955756-5376-45AC-9F68-FBE46185159B}" type="datetimeFigureOut">
               <a:rPr lang="en-US" smtClean="0"/>
-              <a:t>3/30/2023</a:t>
+              <a:t>4/5/2023</a:t>
             </a:fld>
             <a:endParaRPr lang="en-US"/>
           </a:p>
@@ -672,7 +674,7 @@
           <a:p>
             <a:fld id="{FC955756-5376-45AC-9F68-FBE46185159B}" type="datetimeFigureOut">
               <a:rPr lang="en-US" smtClean="0"/>
-              <a:t>3/30/2023</a:t>
+              <a:t>4/5/2023</a:t>
             </a:fld>
             <a:endParaRPr lang="en-US"/>
           </a:p>
@@ -870,7 +872,7 @@
           <a:p>
             <a:fld id="{FC955756-5376-45AC-9F68-FBE46185159B}" type="datetimeFigureOut">
               <a:rPr lang="en-US" smtClean="0"/>
-              <a:t>3/30/2023</a:t>
+              <a:t>4/5/2023</a:t>
             </a:fld>
             <a:endParaRPr lang="en-US"/>
           </a:p>
@@ -1145,7 +1147,7 @@
           <a:p>
             <a:fld id="{FC955756-5376-45AC-9F68-FBE46185159B}" type="datetimeFigureOut">
               <a:rPr lang="en-US" smtClean="0"/>
-              <a:t>3/30/2023</a:t>
+              <a:t>4/5/2023</a:t>
             </a:fld>
             <a:endParaRPr lang="en-US"/>
           </a:p>
@@ -1410,7 +1412,7 @@
           <a:p>
             <a:fld id="{FC955756-5376-45AC-9F68-FBE46185159B}" type="datetimeFigureOut">
               <a:rPr lang="en-US" smtClean="0"/>
-              <a:t>3/30/2023</a:t>
+              <a:t>4/5/2023</a:t>
             </a:fld>
             <a:endParaRPr lang="en-US"/>
           </a:p>
@@ -1822,7 +1824,7 @@
           <a:p>
             <a:fld id="{FC955756-5376-45AC-9F68-FBE46185159B}" type="datetimeFigureOut">
               <a:rPr lang="en-US" smtClean="0"/>
-              <a:t>3/30/2023</a:t>
+              <a:t>4/5/2023</a:t>
             </a:fld>
             <a:endParaRPr lang="en-US"/>
           </a:p>
@@ -1963,7 +1965,7 @@
           <a:p>
             <a:fld id="{FC955756-5376-45AC-9F68-FBE46185159B}" type="datetimeFigureOut">
               <a:rPr lang="en-US" smtClean="0"/>
-              <a:t>3/30/2023</a:t>
+              <a:t>4/5/2023</a:t>
             </a:fld>
             <a:endParaRPr lang="en-US"/>
           </a:p>
@@ -2076,7 +2078,7 @@
           <a:p>
             <a:fld id="{FC955756-5376-45AC-9F68-FBE46185159B}" type="datetimeFigureOut">
               <a:rPr lang="en-US" smtClean="0"/>
-              <a:t>3/30/2023</a:t>
+              <a:t>4/5/2023</a:t>
             </a:fld>
             <a:endParaRPr lang="en-US"/>
           </a:p>
@@ -2387,7 +2389,7 @@
           <a:p>
             <a:fld id="{FC955756-5376-45AC-9F68-FBE46185159B}" type="datetimeFigureOut">
               <a:rPr lang="en-US" smtClean="0"/>
-              <a:t>3/30/2023</a:t>
+              <a:t>4/5/2023</a:t>
             </a:fld>
             <a:endParaRPr lang="en-US"/>
           </a:p>
@@ -2675,7 +2677,7 @@
           <a:p>
             <a:fld id="{FC955756-5376-45AC-9F68-FBE46185159B}" type="datetimeFigureOut">
               <a:rPr lang="en-US" smtClean="0"/>
-              <a:t>3/30/2023</a:t>
+              <a:t>4/5/2023</a:t>
             </a:fld>
             <a:endParaRPr lang="en-US"/>
           </a:p>
@@ -2916,7 +2918,7 @@
           <a:p>
             <a:fld id="{FC955756-5376-45AC-9F68-FBE46185159B}" type="datetimeFigureOut">
               <a:rPr lang="en-US" smtClean="0"/>
-              <a:t>3/30/2023</a:t>
+              <a:t>4/5/2023</a:t>
             </a:fld>
             <a:endParaRPr lang="en-US"/>
           </a:p>
@@ -5259,6 +5261,1583 @@
 </p:sld>
 </file>
 
+<file path=ppt/slides/slide10.xml><?xml version="1.0" encoding="utf-8"?>
+<p:sld xmlns:a="http://schemas.openxmlformats.org/drawingml/2006/main" xmlns:r="http://schemas.openxmlformats.org/officeDocument/2006/relationships" xmlns:p="http://schemas.openxmlformats.org/presentationml/2006/main">
+  <p:cSld>
+    <p:spTree>
+      <p:nvGrpSpPr>
+        <p:cNvPr id="1" name=""/>
+        <p:cNvGrpSpPr/>
+        <p:nvPr/>
+      </p:nvGrpSpPr>
+      <p:grpSpPr>
+        <a:xfrm>
+          <a:off x="0" y="0"/>
+          <a:ext cx="0" cy="0"/>
+          <a:chOff x="0" y="0"/>
+          <a:chExt cx="0" cy="0"/>
+        </a:xfrm>
+      </p:grpSpPr>
+      <p:sp>
+        <p:nvSpPr>
+          <p:cNvPr id="4" name="Rectangle 3">
+            <a:extLst>
+              <a:ext uri="{FF2B5EF4-FFF2-40B4-BE49-F238E27FC236}">
+                <a16:creationId xmlns:a16="http://schemas.microsoft.com/office/drawing/2014/main" id="{6A975450-4A91-72F5-94F8-9286A59B9ADC}"/>
+              </a:ext>
+            </a:extLst>
+          </p:cNvPr>
+          <p:cNvSpPr/>
+          <p:nvPr/>
+        </p:nvSpPr>
+        <p:spPr>
+          <a:xfrm>
+            <a:off x="545545" y="377504"/>
+            <a:ext cx="860567" cy="302003"/>
+          </a:xfrm>
+          <a:prstGeom prst="rect">
+            <a:avLst/>
+          </a:prstGeom>
+          <a:solidFill>
+            <a:schemeClr val="accent4">
+              <a:lumMod val="40000"/>
+              <a:lumOff val="60000"/>
+            </a:schemeClr>
+          </a:solidFill>
+          <a:ln>
+            <a:solidFill>
+              <a:schemeClr val="tx1"/>
+            </a:solidFill>
+          </a:ln>
+        </p:spPr>
+        <p:style>
+          <a:lnRef idx="2">
+            <a:schemeClr val="accent1">
+              <a:shade val="50000"/>
+            </a:schemeClr>
+          </a:lnRef>
+          <a:fillRef idx="1">
+            <a:schemeClr val="accent1"/>
+          </a:fillRef>
+          <a:effectRef idx="0">
+            <a:schemeClr val="accent1"/>
+          </a:effectRef>
+          <a:fontRef idx="minor">
+            <a:schemeClr val="lt1"/>
+          </a:fontRef>
+        </p:style>
+        <p:txBody>
+          <a:bodyPr rtlCol="0" anchor="ctr"/>
+          <a:lstStyle/>
+          <a:p>
+            <a:pPr algn="ctr"/>
+            <a:r>
+              <a:rPr lang="en-SG" dirty="0">
+                <a:solidFill>
+                  <a:schemeClr val="tx1"/>
+                </a:solidFill>
+              </a:rPr>
+              <a:t>:Parser</a:t>
+            </a:r>
+          </a:p>
+        </p:txBody>
+      </p:sp>
+      <p:sp>
+        <p:nvSpPr>
+          <p:cNvPr id="7" name="Rectangle 6">
+            <a:extLst>
+              <a:ext uri="{FF2B5EF4-FFF2-40B4-BE49-F238E27FC236}">
+                <a16:creationId xmlns:a16="http://schemas.microsoft.com/office/drawing/2014/main" id="{789BA236-5688-B76C-40D5-D82C259DE51F}"/>
+              </a:ext>
+            </a:extLst>
+          </p:cNvPr>
+          <p:cNvSpPr/>
+          <p:nvPr/>
+        </p:nvSpPr>
+        <p:spPr>
+          <a:xfrm>
+            <a:off x="4363258" y="1675474"/>
+            <a:ext cx="1397782" cy="302003"/>
+          </a:xfrm>
+          <a:prstGeom prst="rect">
+            <a:avLst/>
+          </a:prstGeom>
+          <a:solidFill>
+            <a:schemeClr val="accent4">
+              <a:lumMod val="40000"/>
+              <a:lumOff val="60000"/>
+            </a:schemeClr>
+          </a:solidFill>
+          <a:ln>
+            <a:solidFill>
+              <a:schemeClr val="tx1"/>
+            </a:solidFill>
+          </a:ln>
+        </p:spPr>
+        <p:style>
+          <a:lnRef idx="2">
+            <a:schemeClr val="accent1">
+              <a:shade val="50000"/>
+            </a:schemeClr>
+          </a:lnRef>
+          <a:fillRef idx="1">
+            <a:schemeClr val="accent1"/>
+          </a:fillRef>
+          <a:effectRef idx="0">
+            <a:schemeClr val="accent1"/>
+          </a:effectRef>
+          <a:fontRef idx="minor">
+            <a:schemeClr val="lt1"/>
+          </a:fontRef>
+        </p:style>
+        <p:txBody>
+          <a:bodyPr rtlCol="0" anchor="ctr"/>
+          <a:lstStyle/>
+          <a:p>
+            <a:pPr algn="ctr"/>
+            <a:r>
+              <a:rPr lang="en-SG" dirty="0">
+                <a:solidFill>
+                  <a:schemeClr val="tx1"/>
+                </a:solidFill>
+              </a:rPr>
+              <a:t>:SchoolClass</a:t>
+            </a:r>
+          </a:p>
+        </p:txBody>
+      </p:sp>
+      <p:sp>
+        <p:nvSpPr>
+          <p:cNvPr id="9" name="Rectangle 8">
+            <a:extLst>
+              <a:ext uri="{FF2B5EF4-FFF2-40B4-BE49-F238E27FC236}">
+                <a16:creationId xmlns:a16="http://schemas.microsoft.com/office/drawing/2014/main" id="{8C1F886F-AE13-9D8C-0324-0BEC3E02ED65}"/>
+              </a:ext>
+            </a:extLst>
+          </p:cNvPr>
+          <p:cNvSpPr/>
+          <p:nvPr/>
+        </p:nvSpPr>
+        <p:spPr>
+          <a:xfrm>
+            <a:off x="2381839" y="373064"/>
+            <a:ext cx="990718" cy="302003"/>
+          </a:xfrm>
+          <a:prstGeom prst="rect">
+            <a:avLst/>
+          </a:prstGeom>
+          <a:solidFill>
+            <a:schemeClr val="accent4">
+              <a:lumMod val="40000"/>
+              <a:lumOff val="60000"/>
+            </a:schemeClr>
+          </a:solidFill>
+          <a:ln>
+            <a:solidFill>
+              <a:schemeClr val="tx1"/>
+            </a:solidFill>
+          </a:ln>
+        </p:spPr>
+        <p:style>
+          <a:lnRef idx="2">
+            <a:schemeClr val="accent1">
+              <a:shade val="50000"/>
+            </a:schemeClr>
+          </a:lnRef>
+          <a:fillRef idx="1">
+            <a:schemeClr val="accent1"/>
+          </a:fillRef>
+          <a:effectRef idx="0">
+            <a:schemeClr val="accent1"/>
+          </a:effectRef>
+          <a:fontRef idx="minor">
+            <a:schemeClr val="lt1"/>
+          </a:fontRef>
+        </p:style>
+        <p:txBody>
+          <a:bodyPr rtlCol="0" anchor="ctr"/>
+          <a:lstStyle/>
+          <a:p>
+            <a:pPr algn="ctr"/>
+            <a:r>
+              <a:rPr lang="en-SG" dirty="0">
+                <a:solidFill>
+                  <a:schemeClr val="tx1"/>
+                </a:solidFill>
+              </a:rPr>
+              <a:t>:TaskList</a:t>
+            </a:r>
+          </a:p>
+        </p:txBody>
+      </p:sp>
+      <p:cxnSp>
+        <p:nvCxnSpPr>
+          <p:cNvPr id="11" name="Straight Connector 10">
+            <a:extLst>
+              <a:ext uri="{FF2B5EF4-FFF2-40B4-BE49-F238E27FC236}">
+                <a16:creationId xmlns:a16="http://schemas.microsoft.com/office/drawing/2014/main" id="{A21AF19C-D9D9-0FE7-FFDA-23843CB88743}"/>
+              </a:ext>
+            </a:extLst>
+          </p:cNvPr>
+          <p:cNvCxnSpPr>
+            <a:cxnSpLocks/>
+            <a:stCxn id="4" idx="2"/>
+          </p:cNvCxnSpPr>
+          <p:nvPr/>
+        </p:nvCxnSpPr>
+        <p:spPr>
+          <a:xfrm flipH="1">
+            <a:off x="956606" y="679507"/>
+            <a:ext cx="19223" cy="5830349"/>
+          </a:xfrm>
+          <a:prstGeom prst="line">
+            <a:avLst/>
+          </a:prstGeom>
+          <a:ln w="19050">
+            <a:solidFill>
+              <a:schemeClr val="tx1">
+                <a:lumMod val="50000"/>
+                <a:lumOff val="50000"/>
+              </a:schemeClr>
+            </a:solidFill>
+            <a:prstDash val="dash"/>
+          </a:ln>
+        </p:spPr>
+        <p:style>
+          <a:lnRef idx="1">
+            <a:schemeClr val="accent1"/>
+          </a:lnRef>
+          <a:fillRef idx="0">
+            <a:schemeClr val="accent1"/>
+          </a:fillRef>
+          <a:effectRef idx="0">
+            <a:schemeClr val="accent1"/>
+          </a:effectRef>
+          <a:fontRef idx="minor">
+            <a:schemeClr val="tx1"/>
+          </a:fontRef>
+        </p:style>
+      </p:cxnSp>
+      <p:cxnSp>
+        <p:nvCxnSpPr>
+          <p:cNvPr id="12" name="Straight Connector 11">
+            <a:extLst>
+              <a:ext uri="{FF2B5EF4-FFF2-40B4-BE49-F238E27FC236}">
+                <a16:creationId xmlns:a16="http://schemas.microsoft.com/office/drawing/2014/main" id="{68ECC557-D3D1-C9C6-C659-8784254D43F8}"/>
+              </a:ext>
+            </a:extLst>
+          </p:cNvPr>
+          <p:cNvCxnSpPr/>
+          <p:nvPr/>
+        </p:nvCxnSpPr>
+        <p:spPr>
+          <a:xfrm>
+            <a:off x="2868337" y="679508"/>
+            <a:ext cx="4194" cy="5830349"/>
+          </a:xfrm>
+          <a:prstGeom prst="line">
+            <a:avLst/>
+          </a:prstGeom>
+          <a:ln w="19050">
+            <a:solidFill>
+              <a:schemeClr val="tx1">
+                <a:lumMod val="50000"/>
+                <a:lumOff val="50000"/>
+              </a:schemeClr>
+            </a:solidFill>
+            <a:prstDash val="dash"/>
+          </a:ln>
+        </p:spPr>
+        <p:style>
+          <a:lnRef idx="1">
+            <a:schemeClr val="accent1"/>
+          </a:lnRef>
+          <a:fillRef idx="0">
+            <a:schemeClr val="accent1"/>
+          </a:fillRef>
+          <a:effectRef idx="0">
+            <a:schemeClr val="accent1"/>
+          </a:effectRef>
+          <a:fontRef idx="minor">
+            <a:schemeClr val="tx1"/>
+          </a:fontRef>
+        </p:style>
+      </p:cxnSp>
+      <p:sp>
+        <p:nvSpPr>
+          <p:cNvPr id="16" name="Rectangle 15">
+            <a:extLst>
+              <a:ext uri="{FF2B5EF4-FFF2-40B4-BE49-F238E27FC236}">
+                <a16:creationId xmlns:a16="http://schemas.microsoft.com/office/drawing/2014/main" id="{443DEF40-EE55-8F3D-83F1-34AD7A468DF3}"/>
+              </a:ext>
+            </a:extLst>
+          </p:cNvPr>
+          <p:cNvSpPr/>
+          <p:nvPr/>
+        </p:nvSpPr>
+        <p:spPr>
+          <a:xfrm>
+            <a:off x="2785145" y="906011"/>
+            <a:ext cx="184554" cy="5486400"/>
+          </a:xfrm>
+          <a:prstGeom prst="rect">
+            <a:avLst/>
+          </a:prstGeom>
+          <a:solidFill>
+            <a:schemeClr val="accent4">
+              <a:lumMod val="60000"/>
+              <a:lumOff val="40000"/>
+            </a:schemeClr>
+          </a:solidFill>
+          <a:ln>
+            <a:solidFill>
+              <a:schemeClr val="bg2">
+                <a:lumMod val="75000"/>
+              </a:schemeClr>
+            </a:solidFill>
+          </a:ln>
+        </p:spPr>
+        <p:style>
+          <a:lnRef idx="2">
+            <a:schemeClr val="accent1">
+              <a:shade val="50000"/>
+            </a:schemeClr>
+          </a:lnRef>
+          <a:fillRef idx="1">
+            <a:schemeClr val="accent1"/>
+          </a:fillRef>
+          <a:effectRef idx="0">
+            <a:schemeClr val="accent1"/>
+          </a:effectRef>
+          <a:fontRef idx="minor">
+            <a:schemeClr val="lt1"/>
+          </a:fontRef>
+        </p:style>
+        <p:txBody>
+          <a:bodyPr rtlCol="0" anchor="ctr"/>
+          <a:lstStyle/>
+          <a:p>
+            <a:pPr algn="ctr"/>
+            <a:endParaRPr lang="en-SG"/>
+          </a:p>
+        </p:txBody>
+      </p:sp>
+      <p:cxnSp>
+        <p:nvCxnSpPr>
+          <p:cNvPr id="18" name="Straight Arrow Connector 17">
+            <a:extLst>
+              <a:ext uri="{FF2B5EF4-FFF2-40B4-BE49-F238E27FC236}">
+                <a16:creationId xmlns:a16="http://schemas.microsoft.com/office/drawing/2014/main" id="{2A026EFF-A2B7-77FC-7BF5-D849E09C5001}"/>
+              </a:ext>
+            </a:extLst>
+          </p:cNvPr>
+          <p:cNvCxnSpPr/>
+          <p:nvPr/>
+        </p:nvCxnSpPr>
+        <p:spPr>
+          <a:xfrm>
+            <a:off x="968929" y="906011"/>
+            <a:ext cx="1816216" cy="0"/>
+          </a:xfrm>
+          <a:prstGeom prst="straightConnector1">
+            <a:avLst/>
+          </a:prstGeom>
+          <a:ln>
+            <a:tailEnd type="triangle"/>
+          </a:ln>
+        </p:spPr>
+        <p:style>
+          <a:lnRef idx="1">
+            <a:schemeClr val="dk1"/>
+          </a:lnRef>
+          <a:fillRef idx="0">
+            <a:schemeClr val="dk1"/>
+          </a:fillRef>
+          <a:effectRef idx="0">
+            <a:schemeClr val="dk1"/>
+          </a:effectRef>
+          <a:fontRef idx="minor">
+            <a:schemeClr val="tx1"/>
+          </a:fontRef>
+        </p:style>
+      </p:cxnSp>
+      <p:sp>
+        <p:nvSpPr>
+          <p:cNvPr id="19" name="TextBox 18">
+            <a:extLst>
+              <a:ext uri="{FF2B5EF4-FFF2-40B4-BE49-F238E27FC236}">
+                <a16:creationId xmlns:a16="http://schemas.microsoft.com/office/drawing/2014/main" id="{90A56D40-C2D3-7E9A-02F0-898A8E4BE16A}"/>
+              </a:ext>
+            </a:extLst>
+          </p:cNvPr>
+          <p:cNvSpPr txBox="1"/>
+          <p:nvPr/>
+        </p:nvSpPr>
+        <p:spPr>
+          <a:xfrm>
+            <a:off x="1491663" y="629012"/>
+            <a:ext cx="780150" cy="276999"/>
+          </a:xfrm>
+          <a:prstGeom prst="rect">
+            <a:avLst/>
+          </a:prstGeom>
+          <a:noFill/>
+        </p:spPr>
+        <p:txBody>
+          <a:bodyPr wrap="none" rtlCol="0">
+            <a:spAutoFit/>
+          </a:bodyPr>
+          <a:lstStyle/>
+          <a:p>
+            <a:r>
+              <a:rPr lang="en-SG" sz="1200" dirty="0"/>
+              <a:t>addTask()</a:t>
+            </a:r>
+          </a:p>
+        </p:txBody>
+      </p:sp>
+      <p:sp>
+        <p:nvSpPr>
+          <p:cNvPr id="22" name="Rectangle 21">
+            <a:extLst>
+              <a:ext uri="{FF2B5EF4-FFF2-40B4-BE49-F238E27FC236}">
+                <a16:creationId xmlns:a16="http://schemas.microsoft.com/office/drawing/2014/main" id="{D1219018-454A-9D48-CE98-9C42DA7129DE}"/>
+              </a:ext>
+            </a:extLst>
+          </p:cNvPr>
+          <p:cNvSpPr/>
+          <p:nvPr/>
+        </p:nvSpPr>
+        <p:spPr>
+          <a:xfrm>
+            <a:off x="2875951" y="1341173"/>
+            <a:ext cx="189937" cy="4507015"/>
+          </a:xfrm>
+          <a:prstGeom prst="rect">
+            <a:avLst/>
+          </a:prstGeom>
+          <a:solidFill>
+            <a:schemeClr val="accent4">
+              <a:lumMod val="60000"/>
+              <a:lumOff val="40000"/>
+            </a:schemeClr>
+          </a:solidFill>
+          <a:ln>
+            <a:solidFill>
+              <a:schemeClr val="bg2">
+                <a:lumMod val="75000"/>
+              </a:schemeClr>
+            </a:solidFill>
+          </a:ln>
+        </p:spPr>
+        <p:style>
+          <a:lnRef idx="2">
+            <a:schemeClr val="accent1">
+              <a:shade val="50000"/>
+            </a:schemeClr>
+          </a:lnRef>
+          <a:fillRef idx="1">
+            <a:schemeClr val="accent1"/>
+          </a:fillRef>
+          <a:effectRef idx="0">
+            <a:schemeClr val="accent1"/>
+          </a:effectRef>
+          <a:fontRef idx="minor">
+            <a:schemeClr val="lt1"/>
+          </a:fontRef>
+        </p:style>
+        <p:txBody>
+          <a:bodyPr rtlCol="0" anchor="ctr"/>
+          <a:lstStyle/>
+          <a:p>
+            <a:pPr algn="ctr"/>
+            <a:endParaRPr lang="en-SG"/>
+          </a:p>
+        </p:txBody>
+      </p:sp>
+      <p:cxnSp>
+        <p:nvCxnSpPr>
+          <p:cNvPr id="2" name="Straight Connector 1">
+            <a:extLst>
+              <a:ext uri="{FF2B5EF4-FFF2-40B4-BE49-F238E27FC236}">
+                <a16:creationId xmlns:a16="http://schemas.microsoft.com/office/drawing/2014/main" id="{D9E1806D-3D79-30C2-489A-D77C7EEDBC96}"/>
+              </a:ext>
+            </a:extLst>
+          </p:cNvPr>
+          <p:cNvCxnSpPr/>
+          <p:nvPr/>
+        </p:nvCxnSpPr>
+        <p:spPr>
+          <a:xfrm>
+            <a:off x="2971795" y="1173200"/>
+            <a:ext cx="353387" cy="0"/>
+          </a:xfrm>
+          <a:prstGeom prst="line">
+            <a:avLst/>
+          </a:prstGeom>
+        </p:spPr>
+        <p:style>
+          <a:lnRef idx="1">
+            <a:schemeClr val="dk1"/>
+          </a:lnRef>
+          <a:fillRef idx="0">
+            <a:schemeClr val="dk1"/>
+          </a:fillRef>
+          <a:effectRef idx="0">
+            <a:schemeClr val="dk1"/>
+          </a:effectRef>
+          <a:fontRef idx="minor">
+            <a:schemeClr val="tx1"/>
+          </a:fontRef>
+        </p:style>
+      </p:cxnSp>
+      <p:cxnSp>
+        <p:nvCxnSpPr>
+          <p:cNvPr id="3" name="Straight Connector 2">
+            <a:extLst>
+              <a:ext uri="{FF2B5EF4-FFF2-40B4-BE49-F238E27FC236}">
+                <a16:creationId xmlns:a16="http://schemas.microsoft.com/office/drawing/2014/main" id="{EEAD6274-220F-E279-66A5-282C14807B03}"/>
+              </a:ext>
+            </a:extLst>
+          </p:cNvPr>
+          <p:cNvCxnSpPr/>
+          <p:nvPr/>
+        </p:nvCxnSpPr>
+        <p:spPr>
+          <a:xfrm>
+            <a:off x="3325182" y="1173200"/>
+            <a:ext cx="0" cy="67112"/>
+          </a:xfrm>
+          <a:prstGeom prst="line">
+            <a:avLst/>
+          </a:prstGeom>
+        </p:spPr>
+        <p:style>
+          <a:lnRef idx="1">
+            <a:schemeClr val="dk1"/>
+          </a:lnRef>
+          <a:fillRef idx="0">
+            <a:schemeClr val="dk1"/>
+          </a:fillRef>
+          <a:effectRef idx="0">
+            <a:schemeClr val="dk1"/>
+          </a:effectRef>
+          <a:fontRef idx="minor">
+            <a:schemeClr val="tx1"/>
+          </a:fontRef>
+        </p:style>
+      </p:cxnSp>
+      <p:cxnSp>
+        <p:nvCxnSpPr>
+          <p:cNvPr id="5" name="Straight Arrow Connector 4">
+            <a:extLst>
+              <a:ext uri="{FF2B5EF4-FFF2-40B4-BE49-F238E27FC236}">
+                <a16:creationId xmlns:a16="http://schemas.microsoft.com/office/drawing/2014/main" id="{F7A7ED7D-98AD-1BCF-FD10-CD82AE3218A4}"/>
+              </a:ext>
+            </a:extLst>
+          </p:cNvPr>
+          <p:cNvCxnSpPr/>
+          <p:nvPr/>
+        </p:nvCxnSpPr>
+        <p:spPr>
+          <a:xfrm flipH="1">
+            <a:off x="3059879" y="1240312"/>
+            <a:ext cx="265303" cy="96310"/>
+          </a:xfrm>
+          <a:prstGeom prst="straightConnector1">
+            <a:avLst/>
+          </a:prstGeom>
+          <a:ln>
+            <a:tailEnd type="triangle"/>
+          </a:ln>
+        </p:spPr>
+        <p:style>
+          <a:lnRef idx="1">
+            <a:schemeClr val="dk1"/>
+          </a:lnRef>
+          <a:fillRef idx="0">
+            <a:schemeClr val="dk1"/>
+          </a:fillRef>
+          <a:effectRef idx="0">
+            <a:schemeClr val="dk1"/>
+          </a:effectRef>
+          <a:fontRef idx="minor">
+            <a:schemeClr val="tx1"/>
+          </a:fontRef>
+        </p:style>
+      </p:cxnSp>
+      <p:sp>
+        <p:nvSpPr>
+          <p:cNvPr id="10" name="TextBox 9">
+            <a:extLst>
+              <a:ext uri="{FF2B5EF4-FFF2-40B4-BE49-F238E27FC236}">
+                <a16:creationId xmlns:a16="http://schemas.microsoft.com/office/drawing/2014/main" id="{2ED70366-310F-9F9E-0C19-22E78E04A460}"/>
+              </a:ext>
+            </a:extLst>
+          </p:cNvPr>
+          <p:cNvSpPr txBox="1"/>
+          <p:nvPr/>
+        </p:nvSpPr>
+        <p:spPr>
+          <a:xfrm>
+            <a:off x="2934407" y="925780"/>
+            <a:ext cx="1239442" cy="276999"/>
+          </a:xfrm>
+          <a:prstGeom prst="rect">
+            <a:avLst/>
+          </a:prstGeom>
+          <a:noFill/>
+        </p:spPr>
+        <p:txBody>
+          <a:bodyPr wrap="none" rtlCol="0">
+            <a:spAutoFit/>
+          </a:bodyPr>
+          <a:lstStyle/>
+          <a:p>
+            <a:r>
+              <a:rPr lang="en-SG" sz="1200" dirty="0"/>
+              <a:t>addSchoolClass()</a:t>
+            </a:r>
+          </a:p>
+        </p:txBody>
+      </p:sp>
+      <p:cxnSp>
+        <p:nvCxnSpPr>
+          <p:cNvPr id="17" name="Straight Arrow Connector 16">
+            <a:extLst>
+              <a:ext uri="{FF2B5EF4-FFF2-40B4-BE49-F238E27FC236}">
+                <a16:creationId xmlns:a16="http://schemas.microsoft.com/office/drawing/2014/main" id="{9DB9927A-9B38-8061-1E4B-F5A5061D0611}"/>
+              </a:ext>
+            </a:extLst>
+          </p:cNvPr>
+          <p:cNvCxnSpPr>
+            <a:cxnSpLocks/>
+            <a:endCxn id="7" idx="1"/>
+          </p:cNvCxnSpPr>
+          <p:nvPr/>
+        </p:nvCxnSpPr>
+        <p:spPr>
+          <a:xfrm>
+            <a:off x="3053880" y="1826475"/>
+            <a:ext cx="1309378" cy="1"/>
+          </a:xfrm>
+          <a:prstGeom prst="straightConnector1">
+            <a:avLst/>
+          </a:prstGeom>
+          <a:ln>
+            <a:tailEnd type="triangle"/>
+          </a:ln>
+        </p:spPr>
+        <p:style>
+          <a:lnRef idx="1">
+            <a:schemeClr val="dk1"/>
+          </a:lnRef>
+          <a:fillRef idx="0">
+            <a:schemeClr val="dk1"/>
+          </a:fillRef>
+          <a:effectRef idx="0">
+            <a:schemeClr val="dk1"/>
+          </a:effectRef>
+          <a:fontRef idx="minor">
+            <a:schemeClr val="tx1"/>
+          </a:fontRef>
+        </p:style>
+      </p:cxnSp>
+      <p:sp>
+        <p:nvSpPr>
+          <p:cNvPr id="28" name="TextBox 27">
+            <a:extLst>
+              <a:ext uri="{FF2B5EF4-FFF2-40B4-BE49-F238E27FC236}">
+                <a16:creationId xmlns:a16="http://schemas.microsoft.com/office/drawing/2014/main" id="{2A1D1FB7-1EC8-6F54-160D-61805010570D}"/>
+              </a:ext>
+            </a:extLst>
+          </p:cNvPr>
+          <p:cNvSpPr txBox="1"/>
+          <p:nvPr/>
+        </p:nvSpPr>
+        <p:spPr>
+          <a:xfrm>
+            <a:off x="3272144" y="1557443"/>
+            <a:ext cx="884858" cy="276999"/>
+          </a:xfrm>
+          <a:prstGeom prst="rect">
+            <a:avLst/>
+          </a:prstGeom>
+          <a:noFill/>
+        </p:spPr>
+        <p:txBody>
+          <a:bodyPr wrap="none" rtlCol="0">
+            <a:spAutoFit/>
+          </a:bodyPr>
+          <a:lstStyle/>
+          <a:p>
+            <a:r>
+              <a:rPr lang="en-SG" sz="1200" dirty="0"/>
+              <a:t>&lt;&lt;create&gt;&gt;</a:t>
+            </a:r>
+          </a:p>
+        </p:txBody>
+      </p:sp>
+      <p:sp>
+        <p:nvSpPr>
+          <p:cNvPr id="30" name="Rectangle 29">
+            <a:extLst>
+              <a:ext uri="{FF2B5EF4-FFF2-40B4-BE49-F238E27FC236}">
+                <a16:creationId xmlns:a16="http://schemas.microsoft.com/office/drawing/2014/main" id="{41D39ACF-BBE6-B87C-3FB1-BF98702BF333}"/>
+              </a:ext>
+            </a:extLst>
+          </p:cNvPr>
+          <p:cNvSpPr/>
+          <p:nvPr/>
+        </p:nvSpPr>
+        <p:spPr>
+          <a:xfrm>
+            <a:off x="4970571" y="1977478"/>
+            <a:ext cx="183155" cy="438356"/>
+          </a:xfrm>
+          <a:prstGeom prst="rect">
+            <a:avLst/>
+          </a:prstGeom>
+          <a:solidFill>
+            <a:schemeClr val="accent4">
+              <a:lumMod val="60000"/>
+              <a:lumOff val="40000"/>
+            </a:schemeClr>
+          </a:solidFill>
+          <a:ln>
+            <a:solidFill>
+              <a:schemeClr val="bg2">
+                <a:lumMod val="75000"/>
+              </a:schemeClr>
+            </a:solidFill>
+          </a:ln>
+        </p:spPr>
+        <p:style>
+          <a:lnRef idx="2">
+            <a:schemeClr val="accent1">
+              <a:shade val="50000"/>
+            </a:schemeClr>
+          </a:lnRef>
+          <a:fillRef idx="1">
+            <a:schemeClr val="accent1"/>
+          </a:fillRef>
+          <a:effectRef idx="0">
+            <a:schemeClr val="accent1"/>
+          </a:effectRef>
+          <a:fontRef idx="minor">
+            <a:schemeClr val="lt1"/>
+          </a:fontRef>
+        </p:style>
+        <p:txBody>
+          <a:bodyPr rtlCol="0" anchor="ctr"/>
+          <a:lstStyle/>
+          <a:p>
+            <a:pPr algn="ctr"/>
+            <a:endParaRPr lang="en-SG"/>
+          </a:p>
+        </p:txBody>
+      </p:sp>
+      <p:cxnSp>
+        <p:nvCxnSpPr>
+          <p:cNvPr id="32" name="Straight Arrow Connector 31">
+            <a:extLst>
+              <a:ext uri="{FF2B5EF4-FFF2-40B4-BE49-F238E27FC236}">
+                <a16:creationId xmlns:a16="http://schemas.microsoft.com/office/drawing/2014/main" id="{AEA504CC-C3F2-E531-9439-D5040105204E}"/>
+              </a:ext>
+            </a:extLst>
+          </p:cNvPr>
+          <p:cNvCxnSpPr>
+            <a:cxnSpLocks/>
+          </p:cNvCxnSpPr>
+          <p:nvPr/>
+        </p:nvCxnSpPr>
+        <p:spPr>
+          <a:xfrm flipH="1">
+            <a:off x="3062269" y="2415834"/>
+            <a:ext cx="1893118" cy="0"/>
+          </a:xfrm>
+          <a:prstGeom prst="straightConnector1">
+            <a:avLst/>
+          </a:prstGeom>
+          <a:ln>
+            <a:prstDash val="lgDash"/>
+            <a:tailEnd type="triangle"/>
+          </a:ln>
+        </p:spPr>
+        <p:style>
+          <a:lnRef idx="1">
+            <a:schemeClr val="dk1"/>
+          </a:lnRef>
+          <a:fillRef idx="0">
+            <a:schemeClr val="dk1"/>
+          </a:fillRef>
+          <a:effectRef idx="0">
+            <a:schemeClr val="dk1"/>
+          </a:effectRef>
+          <a:fontRef idx="minor">
+            <a:schemeClr val="tx1"/>
+          </a:fontRef>
+        </p:style>
+      </p:cxnSp>
+      <p:sp>
+        <p:nvSpPr>
+          <p:cNvPr id="36" name="Rectangle 35">
+            <a:extLst>
+              <a:ext uri="{FF2B5EF4-FFF2-40B4-BE49-F238E27FC236}">
+                <a16:creationId xmlns:a16="http://schemas.microsoft.com/office/drawing/2014/main" id="{500FE3A5-854E-BA43-C2A0-08A9867DA194}"/>
+              </a:ext>
+            </a:extLst>
+          </p:cNvPr>
+          <p:cNvSpPr/>
+          <p:nvPr/>
+        </p:nvSpPr>
+        <p:spPr>
+          <a:xfrm>
+            <a:off x="6188280" y="373063"/>
+            <a:ext cx="813732" cy="302003"/>
+          </a:xfrm>
+          <a:prstGeom prst="rect">
+            <a:avLst/>
+          </a:prstGeom>
+          <a:solidFill>
+            <a:schemeClr val="accent4">
+              <a:lumMod val="40000"/>
+              <a:lumOff val="60000"/>
+            </a:schemeClr>
+          </a:solidFill>
+          <a:ln>
+            <a:solidFill>
+              <a:schemeClr val="tx1"/>
+            </a:solidFill>
+          </a:ln>
+        </p:spPr>
+        <p:style>
+          <a:lnRef idx="2">
+            <a:schemeClr val="accent1">
+              <a:shade val="50000"/>
+            </a:schemeClr>
+          </a:lnRef>
+          <a:fillRef idx="1">
+            <a:schemeClr val="accent1"/>
+          </a:fillRef>
+          <a:effectRef idx="0">
+            <a:schemeClr val="accent1"/>
+          </a:effectRef>
+          <a:fontRef idx="minor">
+            <a:schemeClr val="lt1"/>
+          </a:fontRef>
+        </p:style>
+        <p:txBody>
+          <a:bodyPr rtlCol="0" anchor="ctr"/>
+          <a:lstStyle/>
+          <a:p>
+            <a:pPr algn="ctr"/>
+            <a:r>
+              <a:rPr lang="en-SG" dirty="0">
+                <a:solidFill>
+                  <a:schemeClr val="tx1"/>
+                </a:solidFill>
+              </a:rPr>
+              <a:t>:Ui</a:t>
+            </a:r>
+          </a:p>
+        </p:txBody>
+      </p:sp>
+      <p:cxnSp>
+        <p:nvCxnSpPr>
+          <p:cNvPr id="40" name="Straight Connector 39">
+            <a:extLst>
+              <a:ext uri="{FF2B5EF4-FFF2-40B4-BE49-F238E27FC236}">
+                <a16:creationId xmlns:a16="http://schemas.microsoft.com/office/drawing/2014/main" id="{4361072F-F063-B900-BBEB-5E8651E0CED2}"/>
+              </a:ext>
+            </a:extLst>
+          </p:cNvPr>
+          <p:cNvCxnSpPr>
+            <a:cxnSpLocks/>
+          </p:cNvCxnSpPr>
+          <p:nvPr/>
+        </p:nvCxnSpPr>
+        <p:spPr>
+          <a:xfrm flipH="1">
+            <a:off x="6575749" y="679507"/>
+            <a:ext cx="19223" cy="5830349"/>
+          </a:xfrm>
+          <a:prstGeom prst="line">
+            <a:avLst/>
+          </a:prstGeom>
+          <a:ln w="19050">
+            <a:solidFill>
+              <a:schemeClr val="tx1">
+                <a:lumMod val="50000"/>
+                <a:lumOff val="50000"/>
+              </a:schemeClr>
+            </a:solidFill>
+            <a:prstDash val="dash"/>
+          </a:ln>
+        </p:spPr>
+        <p:style>
+          <a:lnRef idx="1">
+            <a:schemeClr val="accent1"/>
+          </a:lnRef>
+          <a:fillRef idx="0">
+            <a:schemeClr val="accent1"/>
+          </a:fillRef>
+          <a:effectRef idx="0">
+            <a:schemeClr val="accent1"/>
+          </a:effectRef>
+          <a:fontRef idx="minor">
+            <a:schemeClr val="tx1"/>
+          </a:fontRef>
+        </p:style>
+      </p:cxnSp>
+      <p:cxnSp>
+        <p:nvCxnSpPr>
+          <p:cNvPr id="41" name="Straight Connector 40">
+            <a:extLst>
+              <a:ext uri="{FF2B5EF4-FFF2-40B4-BE49-F238E27FC236}">
+                <a16:creationId xmlns:a16="http://schemas.microsoft.com/office/drawing/2014/main" id="{C04E26E6-0E10-8854-E8C8-7EB10DCE8956}"/>
+              </a:ext>
+            </a:extLst>
+          </p:cNvPr>
+          <p:cNvCxnSpPr>
+            <a:cxnSpLocks/>
+            <a:stCxn id="30" idx="2"/>
+          </p:cNvCxnSpPr>
+          <p:nvPr/>
+        </p:nvCxnSpPr>
+        <p:spPr>
+          <a:xfrm flipH="1">
+            <a:off x="5062148" y="2415834"/>
+            <a:ext cx="1" cy="4094022"/>
+          </a:xfrm>
+          <a:prstGeom prst="line">
+            <a:avLst/>
+          </a:prstGeom>
+          <a:ln w="19050">
+            <a:solidFill>
+              <a:schemeClr val="tx1">
+                <a:lumMod val="50000"/>
+                <a:lumOff val="50000"/>
+              </a:schemeClr>
+            </a:solidFill>
+            <a:prstDash val="dash"/>
+          </a:ln>
+        </p:spPr>
+        <p:style>
+          <a:lnRef idx="1">
+            <a:schemeClr val="accent1"/>
+          </a:lnRef>
+          <a:fillRef idx="0">
+            <a:schemeClr val="accent1"/>
+          </a:fillRef>
+          <a:effectRef idx="0">
+            <a:schemeClr val="accent1"/>
+          </a:effectRef>
+          <a:fontRef idx="minor">
+            <a:schemeClr val="tx1"/>
+          </a:fontRef>
+        </p:style>
+      </p:cxnSp>
+      <p:sp>
+        <p:nvSpPr>
+          <p:cNvPr id="44" name="Rectangle 43">
+            <a:extLst>
+              <a:ext uri="{FF2B5EF4-FFF2-40B4-BE49-F238E27FC236}">
+                <a16:creationId xmlns:a16="http://schemas.microsoft.com/office/drawing/2014/main" id="{041CFFB7-5DDA-435B-47D4-0E5B59D97383}"/>
+              </a:ext>
+            </a:extLst>
+          </p:cNvPr>
+          <p:cNvSpPr/>
+          <p:nvPr/>
+        </p:nvSpPr>
+        <p:spPr>
+          <a:xfrm>
+            <a:off x="6505501" y="3064158"/>
+            <a:ext cx="178942" cy="1474284"/>
+          </a:xfrm>
+          <a:prstGeom prst="rect">
+            <a:avLst/>
+          </a:prstGeom>
+          <a:solidFill>
+            <a:schemeClr val="accent4">
+              <a:lumMod val="60000"/>
+              <a:lumOff val="40000"/>
+            </a:schemeClr>
+          </a:solidFill>
+          <a:ln>
+            <a:solidFill>
+              <a:schemeClr val="bg2">
+                <a:lumMod val="75000"/>
+              </a:schemeClr>
+            </a:solidFill>
+          </a:ln>
+        </p:spPr>
+        <p:style>
+          <a:lnRef idx="2">
+            <a:schemeClr val="accent1">
+              <a:shade val="50000"/>
+            </a:schemeClr>
+          </a:lnRef>
+          <a:fillRef idx="1">
+            <a:schemeClr val="accent1"/>
+          </a:fillRef>
+          <a:effectRef idx="0">
+            <a:schemeClr val="accent1"/>
+          </a:effectRef>
+          <a:fontRef idx="minor">
+            <a:schemeClr val="lt1"/>
+          </a:fontRef>
+        </p:style>
+        <p:txBody>
+          <a:bodyPr rtlCol="0" anchor="ctr"/>
+          <a:lstStyle/>
+          <a:p>
+            <a:pPr algn="ctr"/>
+            <a:endParaRPr lang="en-SG"/>
+          </a:p>
+        </p:txBody>
+      </p:sp>
+      <p:sp>
+        <p:nvSpPr>
+          <p:cNvPr id="45" name="Rectangle 44">
+            <a:extLst>
+              <a:ext uri="{FF2B5EF4-FFF2-40B4-BE49-F238E27FC236}">
+                <a16:creationId xmlns:a16="http://schemas.microsoft.com/office/drawing/2014/main" id="{55108D82-4FFE-CAF5-3B54-420236404E2D}"/>
+              </a:ext>
+            </a:extLst>
+          </p:cNvPr>
+          <p:cNvSpPr/>
+          <p:nvPr/>
+        </p:nvSpPr>
+        <p:spPr>
+          <a:xfrm>
+            <a:off x="6592697" y="3334846"/>
+            <a:ext cx="178942" cy="365541"/>
+          </a:xfrm>
+          <a:prstGeom prst="rect">
+            <a:avLst/>
+          </a:prstGeom>
+          <a:solidFill>
+            <a:schemeClr val="accent4">
+              <a:lumMod val="60000"/>
+              <a:lumOff val="40000"/>
+            </a:schemeClr>
+          </a:solidFill>
+          <a:ln>
+            <a:solidFill>
+              <a:schemeClr val="bg2">
+                <a:lumMod val="75000"/>
+              </a:schemeClr>
+            </a:solidFill>
+          </a:ln>
+        </p:spPr>
+        <p:style>
+          <a:lnRef idx="2">
+            <a:schemeClr val="accent1">
+              <a:shade val="50000"/>
+            </a:schemeClr>
+          </a:lnRef>
+          <a:fillRef idx="1">
+            <a:schemeClr val="accent1"/>
+          </a:fillRef>
+          <a:effectRef idx="0">
+            <a:schemeClr val="accent1"/>
+          </a:effectRef>
+          <a:fontRef idx="minor">
+            <a:schemeClr val="lt1"/>
+          </a:fontRef>
+        </p:style>
+        <p:txBody>
+          <a:bodyPr rtlCol="0" anchor="ctr"/>
+          <a:lstStyle/>
+          <a:p>
+            <a:pPr algn="ctr"/>
+            <a:endParaRPr lang="en-SG"/>
+          </a:p>
+        </p:txBody>
+      </p:sp>
+      <p:sp>
+        <p:nvSpPr>
+          <p:cNvPr id="46" name="Rectangle 45">
+            <a:extLst>
+              <a:ext uri="{FF2B5EF4-FFF2-40B4-BE49-F238E27FC236}">
+                <a16:creationId xmlns:a16="http://schemas.microsoft.com/office/drawing/2014/main" id="{8BFB51C3-F5DC-429E-1847-4A79AB366EC6}"/>
+              </a:ext>
+            </a:extLst>
+          </p:cNvPr>
+          <p:cNvSpPr/>
+          <p:nvPr/>
+        </p:nvSpPr>
+        <p:spPr>
+          <a:xfrm>
+            <a:off x="6592697" y="4000927"/>
+            <a:ext cx="178942" cy="365541"/>
+          </a:xfrm>
+          <a:prstGeom prst="rect">
+            <a:avLst/>
+          </a:prstGeom>
+          <a:solidFill>
+            <a:schemeClr val="accent4">
+              <a:lumMod val="60000"/>
+              <a:lumOff val="40000"/>
+            </a:schemeClr>
+          </a:solidFill>
+          <a:ln>
+            <a:solidFill>
+              <a:schemeClr val="bg2">
+                <a:lumMod val="75000"/>
+              </a:schemeClr>
+            </a:solidFill>
+          </a:ln>
+        </p:spPr>
+        <p:style>
+          <a:lnRef idx="2">
+            <a:schemeClr val="accent1">
+              <a:shade val="50000"/>
+            </a:schemeClr>
+          </a:lnRef>
+          <a:fillRef idx="1">
+            <a:schemeClr val="accent1"/>
+          </a:fillRef>
+          <a:effectRef idx="0">
+            <a:schemeClr val="accent1"/>
+          </a:effectRef>
+          <a:fontRef idx="minor">
+            <a:schemeClr val="lt1"/>
+          </a:fontRef>
+        </p:style>
+        <p:txBody>
+          <a:bodyPr rtlCol="0" anchor="ctr"/>
+          <a:lstStyle/>
+          <a:p>
+            <a:pPr algn="ctr"/>
+            <a:endParaRPr lang="en-SG"/>
+          </a:p>
+        </p:txBody>
+      </p:sp>
+      <p:cxnSp>
+        <p:nvCxnSpPr>
+          <p:cNvPr id="47" name="Straight Connector 46">
+            <a:extLst>
+              <a:ext uri="{FF2B5EF4-FFF2-40B4-BE49-F238E27FC236}">
+                <a16:creationId xmlns:a16="http://schemas.microsoft.com/office/drawing/2014/main" id="{9260E7A5-3578-970B-D21E-6E4536FCFC2E}"/>
+              </a:ext>
+            </a:extLst>
+          </p:cNvPr>
+          <p:cNvCxnSpPr/>
+          <p:nvPr/>
+        </p:nvCxnSpPr>
+        <p:spPr>
+          <a:xfrm>
+            <a:off x="6683555" y="3171424"/>
+            <a:ext cx="353387" cy="0"/>
+          </a:xfrm>
+          <a:prstGeom prst="line">
+            <a:avLst/>
+          </a:prstGeom>
+        </p:spPr>
+        <p:style>
+          <a:lnRef idx="1">
+            <a:schemeClr val="dk1"/>
+          </a:lnRef>
+          <a:fillRef idx="0">
+            <a:schemeClr val="dk1"/>
+          </a:fillRef>
+          <a:effectRef idx="0">
+            <a:schemeClr val="dk1"/>
+          </a:effectRef>
+          <a:fontRef idx="minor">
+            <a:schemeClr val="tx1"/>
+          </a:fontRef>
+        </p:style>
+      </p:cxnSp>
+      <p:cxnSp>
+        <p:nvCxnSpPr>
+          <p:cNvPr id="48" name="Straight Connector 47">
+            <a:extLst>
+              <a:ext uri="{FF2B5EF4-FFF2-40B4-BE49-F238E27FC236}">
+                <a16:creationId xmlns:a16="http://schemas.microsoft.com/office/drawing/2014/main" id="{748BFA65-A8C5-32B4-C4E5-E23609091390}"/>
+              </a:ext>
+            </a:extLst>
+          </p:cNvPr>
+          <p:cNvCxnSpPr/>
+          <p:nvPr/>
+        </p:nvCxnSpPr>
+        <p:spPr>
+          <a:xfrm>
+            <a:off x="7036942" y="3171424"/>
+            <a:ext cx="0" cy="67112"/>
+          </a:xfrm>
+          <a:prstGeom prst="line">
+            <a:avLst/>
+          </a:prstGeom>
+        </p:spPr>
+        <p:style>
+          <a:lnRef idx="1">
+            <a:schemeClr val="dk1"/>
+          </a:lnRef>
+          <a:fillRef idx="0">
+            <a:schemeClr val="dk1"/>
+          </a:fillRef>
+          <a:effectRef idx="0">
+            <a:schemeClr val="dk1"/>
+          </a:effectRef>
+          <a:fontRef idx="minor">
+            <a:schemeClr val="tx1"/>
+          </a:fontRef>
+        </p:style>
+      </p:cxnSp>
+      <p:cxnSp>
+        <p:nvCxnSpPr>
+          <p:cNvPr id="49" name="Straight Arrow Connector 48">
+            <a:extLst>
+              <a:ext uri="{FF2B5EF4-FFF2-40B4-BE49-F238E27FC236}">
+                <a16:creationId xmlns:a16="http://schemas.microsoft.com/office/drawing/2014/main" id="{26ECA84D-585C-D85F-0D85-310538948E05}"/>
+              </a:ext>
+            </a:extLst>
+          </p:cNvPr>
+          <p:cNvCxnSpPr/>
+          <p:nvPr/>
+        </p:nvCxnSpPr>
+        <p:spPr>
+          <a:xfrm flipH="1">
+            <a:off x="6771639" y="3238536"/>
+            <a:ext cx="265303" cy="96310"/>
+          </a:xfrm>
+          <a:prstGeom prst="straightConnector1">
+            <a:avLst/>
+          </a:prstGeom>
+          <a:ln>
+            <a:tailEnd type="triangle"/>
+          </a:ln>
+        </p:spPr>
+        <p:style>
+          <a:lnRef idx="1">
+            <a:schemeClr val="dk1"/>
+          </a:lnRef>
+          <a:fillRef idx="0">
+            <a:schemeClr val="dk1"/>
+          </a:fillRef>
+          <a:effectRef idx="0">
+            <a:schemeClr val="dk1"/>
+          </a:effectRef>
+          <a:fontRef idx="minor">
+            <a:schemeClr val="tx1"/>
+          </a:fontRef>
+        </p:style>
+      </p:cxnSp>
+      <p:cxnSp>
+        <p:nvCxnSpPr>
+          <p:cNvPr id="50" name="Straight Connector 49">
+            <a:extLst>
+              <a:ext uri="{FF2B5EF4-FFF2-40B4-BE49-F238E27FC236}">
+                <a16:creationId xmlns:a16="http://schemas.microsoft.com/office/drawing/2014/main" id="{15AE90A6-FD39-D75D-358C-F13610C2CE86}"/>
+              </a:ext>
+            </a:extLst>
+          </p:cNvPr>
+          <p:cNvCxnSpPr/>
+          <p:nvPr/>
+        </p:nvCxnSpPr>
+        <p:spPr>
+          <a:xfrm>
+            <a:off x="6683555" y="3837505"/>
+            <a:ext cx="353387" cy="0"/>
+          </a:xfrm>
+          <a:prstGeom prst="line">
+            <a:avLst/>
+          </a:prstGeom>
+        </p:spPr>
+        <p:style>
+          <a:lnRef idx="1">
+            <a:schemeClr val="dk1"/>
+          </a:lnRef>
+          <a:fillRef idx="0">
+            <a:schemeClr val="dk1"/>
+          </a:fillRef>
+          <a:effectRef idx="0">
+            <a:schemeClr val="dk1"/>
+          </a:effectRef>
+          <a:fontRef idx="minor">
+            <a:schemeClr val="tx1"/>
+          </a:fontRef>
+        </p:style>
+      </p:cxnSp>
+      <p:cxnSp>
+        <p:nvCxnSpPr>
+          <p:cNvPr id="51" name="Straight Connector 50">
+            <a:extLst>
+              <a:ext uri="{FF2B5EF4-FFF2-40B4-BE49-F238E27FC236}">
+                <a16:creationId xmlns:a16="http://schemas.microsoft.com/office/drawing/2014/main" id="{E8A13B98-CCF7-A1C0-6DEC-83A0908D8F4F}"/>
+              </a:ext>
+            </a:extLst>
+          </p:cNvPr>
+          <p:cNvCxnSpPr/>
+          <p:nvPr/>
+        </p:nvCxnSpPr>
+        <p:spPr>
+          <a:xfrm>
+            <a:off x="7036942" y="3837505"/>
+            <a:ext cx="0" cy="67112"/>
+          </a:xfrm>
+          <a:prstGeom prst="line">
+            <a:avLst/>
+          </a:prstGeom>
+        </p:spPr>
+        <p:style>
+          <a:lnRef idx="1">
+            <a:schemeClr val="dk1"/>
+          </a:lnRef>
+          <a:fillRef idx="0">
+            <a:schemeClr val="dk1"/>
+          </a:fillRef>
+          <a:effectRef idx="0">
+            <a:schemeClr val="dk1"/>
+          </a:effectRef>
+          <a:fontRef idx="minor">
+            <a:schemeClr val="tx1"/>
+          </a:fontRef>
+        </p:style>
+      </p:cxnSp>
+      <p:cxnSp>
+        <p:nvCxnSpPr>
+          <p:cNvPr id="52" name="Straight Arrow Connector 51">
+            <a:extLst>
+              <a:ext uri="{FF2B5EF4-FFF2-40B4-BE49-F238E27FC236}">
+                <a16:creationId xmlns:a16="http://schemas.microsoft.com/office/drawing/2014/main" id="{816DCA72-3510-6B49-BB64-AA44CD0636DE}"/>
+              </a:ext>
+            </a:extLst>
+          </p:cNvPr>
+          <p:cNvCxnSpPr/>
+          <p:nvPr/>
+        </p:nvCxnSpPr>
+        <p:spPr>
+          <a:xfrm flipH="1">
+            <a:off x="6771639" y="3904617"/>
+            <a:ext cx="265303" cy="96310"/>
+          </a:xfrm>
+          <a:prstGeom prst="straightConnector1">
+            <a:avLst/>
+          </a:prstGeom>
+          <a:ln>
+            <a:tailEnd type="triangle"/>
+          </a:ln>
+        </p:spPr>
+        <p:style>
+          <a:lnRef idx="1">
+            <a:schemeClr val="dk1"/>
+          </a:lnRef>
+          <a:fillRef idx="0">
+            <a:schemeClr val="dk1"/>
+          </a:fillRef>
+          <a:effectRef idx="0">
+            <a:schemeClr val="dk1"/>
+          </a:effectRef>
+          <a:fontRef idx="minor">
+            <a:schemeClr val="tx1"/>
+          </a:fontRef>
+        </p:style>
+      </p:cxnSp>
+      <p:sp>
+        <p:nvSpPr>
+          <p:cNvPr id="53" name="TextBox 52">
+            <a:extLst>
+              <a:ext uri="{FF2B5EF4-FFF2-40B4-BE49-F238E27FC236}">
+                <a16:creationId xmlns:a16="http://schemas.microsoft.com/office/drawing/2014/main" id="{8F364142-5735-3ECB-DAB7-C0DB5B11083A}"/>
+              </a:ext>
+            </a:extLst>
+          </p:cNvPr>
+          <p:cNvSpPr txBox="1"/>
+          <p:nvPr/>
+        </p:nvSpPr>
+        <p:spPr>
+          <a:xfrm>
+            <a:off x="6719644" y="2947018"/>
+            <a:ext cx="956800" cy="276999"/>
+          </a:xfrm>
+          <a:prstGeom prst="rect">
+            <a:avLst/>
+          </a:prstGeom>
+          <a:noFill/>
+        </p:spPr>
+        <p:txBody>
+          <a:bodyPr wrap="none" rtlCol="0">
+            <a:spAutoFit/>
+          </a:bodyPr>
+          <a:lstStyle/>
+          <a:p>
+            <a:r>
+              <a:rPr lang="en-SG" sz="1200" dirty="0"/>
+              <a:t>borderLine()</a:t>
+            </a:r>
+          </a:p>
+        </p:txBody>
+      </p:sp>
+      <p:sp>
+        <p:nvSpPr>
+          <p:cNvPr id="54" name="TextBox 53">
+            <a:extLst>
+              <a:ext uri="{FF2B5EF4-FFF2-40B4-BE49-F238E27FC236}">
+                <a16:creationId xmlns:a16="http://schemas.microsoft.com/office/drawing/2014/main" id="{B547A0F4-E5C1-D181-3F0C-81019FE97AFA}"/>
+              </a:ext>
+            </a:extLst>
+          </p:cNvPr>
+          <p:cNvSpPr txBox="1"/>
+          <p:nvPr/>
+        </p:nvSpPr>
+        <p:spPr>
+          <a:xfrm>
+            <a:off x="6719644" y="3615848"/>
+            <a:ext cx="956800" cy="276999"/>
+          </a:xfrm>
+          <a:prstGeom prst="rect">
+            <a:avLst/>
+          </a:prstGeom>
+          <a:noFill/>
+        </p:spPr>
+        <p:txBody>
+          <a:bodyPr wrap="none" rtlCol="0">
+            <a:spAutoFit/>
+          </a:bodyPr>
+          <a:lstStyle/>
+          <a:p>
+            <a:r>
+              <a:rPr lang="en-SG" sz="1200" dirty="0"/>
+              <a:t>borderLine()</a:t>
+            </a:r>
+          </a:p>
+        </p:txBody>
+      </p:sp>
+      <p:cxnSp>
+        <p:nvCxnSpPr>
+          <p:cNvPr id="66" name="Straight Arrow Connector 65">
+            <a:extLst>
+              <a:ext uri="{FF2B5EF4-FFF2-40B4-BE49-F238E27FC236}">
+                <a16:creationId xmlns:a16="http://schemas.microsoft.com/office/drawing/2014/main" id="{3C05B27E-F021-3FBE-4154-13AAE4DD8FE9}"/>
+              </a:ext>
+            </a:extLst>
+          </p:cNvPr>
+          <p:cNvCxnSpPr>
+            <a:cxnSpLocks/>
+          </p:cNvCxnSpPr>
+          <p:nvPr/>
+        </p:nvCxnSpPr>
+        <p:spPr>
+          <a:xfrm>
+            <a:off x="3062269" y="3064158"/>
+            <a:ext cx="3445622" cy="0"/>
+          </a:xfrm>
+          <a:prstGeom prst="straightConnector1">
+            <a:avLst/>
+          </a:prstGeom>
+          <a:ln>
+            <a:tailEnd type="triangle"/>
+          </a:ln>
+        </p:spPr>
+        <p:style>
+          <a:lnRef idx="1">
+            <a:schemeClr val="dk1"/>
+          </a:lnRef>
+          <a:fillRef idx="0">
+            <a:schemeClr val="dk1"/>
+          </a:fillRef>
+          <a:effectRef idx="0">
+            <a:schemeClr val="dk1"/>
+          </a:effectRef>
+          <a:fontRef idx="minor">
+            <a:schemeClr val="tx1"/>
+          </a:fontRef>
+        </p:style>
+      </p:cxnSp>
+      <p:cxnSp>
+        <p:nvCxnSpPr>
+          <p:cNvPr id="69" name="Straight Arrow Connector 68">
+            <a:extLst>
+              <a:ext uri="{FF2B5EF4-FFF2-40B4-BE49-F238E27FC236}">
+                <a16:creationId xmlns:a16="http://schemas.microsoft.com/office/drawing/2014/main" id="{60FAA31D-4368-3A57-103C-063F6625A9B1}"/>
+              </a:ext>
+            </a:extLst>
+          </p:cNvPr>
+          <p:cNvCxnSpPr>
+            <a:cxnSpLocks/>
+          </p:cNvCxnSpPr>
+          <p:nvPr/>
+        </p:nvCxnSpPr>
+        <p:spPr>
+          <a:xfrm flipH="1">
+            <a:off x="3062269" y="4538442"/>
+            <a:ext cx="3435894" cy="0"/>
+          </a:xfrm>
+          <a:prstGeom prst="straightConnector1">
+            <a:avLst/>
+          </a:prstGeom>
+          <a:ln>
+            <a:prstDash val="lgDash"/>
+            <a:tailEnd type="triangle"/>
+          </a:ln>
+        </p:spPr>
+        <p:style>
+          <a:lnRef idx="1">
+            <a:schemeClr val="dk1"/>
+          </a:lnRef>
+          <a:fillRef idx="0">
+            <a:schemeClr val="dk1"/>
+          </a:fillRef>
+          <a:effectRef idx="0">
+            <a:schemeClr val="dk1"/>
+          </a:effectRef>
+          <a:fontRef idx="minor">
+            <a:schemeClr val="tx1"/>
+          </a:fontRef>
+        </p:style>
+      </p:cxnSp>
+      <p:sp>
+        <p:nvSpPr>
+          <p:cNvPr id="71" name="TextBox 70">
+            <a:extLst>
+              <a:ext uri="{FF2B5EF4-FFF2-40B4-BE49-F238E27FC236}">
+                <a16:creationId xmlns:a16="http://schemas.microsoft.com/office/drawing/2014/main" id="{C39D14FE-C9A3-A2F0-3814-553A1DCB9BC6}"/>
+              </a:ext>
+            </a:extLst>
+          </p:cNvPr>
+          <p:cNvSpPr txBox="1"/>
+          <p:nvPr/>
+        </p:nvSpPr>
+        <p:spPr>
+          <a:xfrm>
+            <a:off x="3181481" y="2808518"/>
+            <a:ext cx="1791196" cy="276999"/>
+          </a:xfrm>
+          <a:prstGeom prst="rect">
+            <a:avLst/>
+          </a:prstGeom>
+          <a:noFill/>
+        </p:spPr>
+        <p:txBody>
+          <a:bodyPr wrap="none" rtlCol="0">
+            <a:spAutoFit/>
+          </a:bodyPr>
+          <a:lstStyle/>
+          <a:p>
+            <a:r>
+              <a:rPr lang="en-SG" sz="1200" dirty="0"/>
+              <a:t>addSchoolClassMessage()</a:t>
+            </a:r>
+          </a:p>
+        </p:txBody>
+      </p:sp>
+    </p:spTree>
+    <p:extLst>
+      <p:ext uri="{BB962C8B-B14F-4D97-AF65-F5344CB8AC3E}">
+        <p14:creationId xmlns:p14="http://schemas.microsoft.com/office/powerpoint/2010/main" val="1431096498"/>
+      </p:ext>
+    </p:extLst>
+  </p:cSld>
+  <p:clrMapOvr>
+    <a:masterClrMapping/>
+  </p:clrMapOvr>
+</p:sld>
+</file>
+
 <file path=ppt/slides/slide2.xml><?xml version="1.0" encoding="utf-8"?>
 <p:sld xmlns:a="http://schemas.openxmlformats.org/drawingml/2006/main" xmlns:r="http://schemas.openxmlformats.org/officeDocument/2006/relationships" xmlns:p="http://schemas.openxmlformats.org/presentationml/2006/main">
   <p:cSld>
@@ -12796,6 +14375,2068 @@
     <p:extLst>
       <p:ext uri="{BB962C8B-B14F-4D97-AF65-F5344CB8AC3E}">
         <p14:creationId xmlns:p14="http://schemas.microsoft.com/office/powerpoint/2010/main" val="241774144"/>
+      </p:ext>
+    </p:extLst>
+  </p:cSld>
+  <p:clrMapOvr>
+    <a:masterClrMapping/>
+  </p:clrMapOvr>
+</p:sld>
+</file>
+
+<file path=ppt/slides/slide9.xml><?xml version="1.0" encoding="utf-8"?>
+<p:sld xmlns:a="http://schemas.openxmlformats.org/drawingml/2006/main" xmlns:r="http://schemas.openxmlformats.org/officeDocument/2006/relationships" xmlns:p="http://schemas.openxmlformats.org/presentationml/2006/main">
+  <p:cSld>
+    <p:spTree>
+      <p:nvGrpSpPr>
+        <p:cNvPr id="1" name=""/>
+        <p:cNvGrpSpPr/>
+        <p:nvPr/>
+      </p:nvGrpSpPr>
+      <p:grpSpPr>
+        <a:xfrm>
+          <a:off x="0" y="0"/>
+          <a:ext cx="0" cy="0"/>
+          <a:chOff x="0" y="0"/>
+          <a:chExt cx="0" cy="0"/>
+        </a:xfrm>
+      </p:grpSpPr>
+      <p:sp>
+        <p:nvSpPr>
+          <p:cNvPr id="4" name="Rectangle 3">
+            <a:extLst>
+              <a:ext uri="{FF2B5EF4-FFF2-40B4-BE49-F238E27FC236}">
+                <a16:creationId xmlns:a16="http://schemas.microsoft.com/office/drawing/2014/main" id="{6A975450-4A91-72F5-94F8-9286A59B9ADC}"/>
+              </a:ext>
+            </a:extLst>
+          </p:cNvPr>
+          <p:cNvSpPr/>
+          <p:nvPr/>
+        </p:nvSpPr>
+        <p:spPr>
+          <a:xfrm>
+            <a:off x="545545" y="377504"/>
+            <a:ext cx="860567" cy="302003"/>
+          </a:xfrm>
+          <a:prstGeom prst="rect">
+            <a:avLst/>
+          </a:prstGeom>
+          <a:solidFill>
+            <a:schemeClr val="accent4">
+              <a:lumMod val="40000"/>
+              <a:lumOff val="60000"/>
+            </a:schemeClr>
+          </a:solidFill>
+          <a:ln>
+            <a:solidFill>
+              <a:schemeClr val="tx1"/>
+            </a:solidFill>
+          </a:ln>
+        </p:spPr>
+        <p:style>
+          <a:lnRef idx="2">
+            <a:schemeClr val="accent1">
+              <a:shade val="50000"/>
+            </a:schemeClr>
+          </a:lnRef>
+          <a:fillRef idx="1">
+            <a:schemeClr val="accent1"/>
+          </a:fillRef>
+          <a:effectRef idx="0">
+            <a:schemeClr val="accent1"/>
+          </a:effectRef>
+          <a:fontRef idx="minor">
+            <a:schemeClr val="lt1"/>
+          </a:fontRef>
+        </p:style>
+        <p:txBody>
+          <a:bodyPr rtlCol="0" anchor="ctr"/>
+          <a:lstStyle/>
+          <a:p>
+            <a:pPr algn="ctr"/>
+            <a:r>
+              <a:rPr lang="en-SG" dirty="0">
+                <a:solidFill>
+                  <a:schemeClr val="tx1"/>
+                </a:solidFill>
+              </a:rPr>
+              <a:t>:Parser</a:t>
+            </a:r>
+          </a:p>
+        </p:txBody>
+      </p:sp>
+      <p:sp>
+        <p:nvSpPr>
+          <p:cNvPr id="6" name="Rectangle 5">
+            <a:extLst>
+              <a:ext uri="{FF2B5EF4-FFF2-40B4-BE49-F238E27FC236}">
+                <a16:creationId xmlns:a16="http://schemas.microsoft.com/office/drawing/2014/main" id="{BACDDAC9-4A2B-5B80-A485-E54E3239134C}"/>
+              </a:ext>
+            </a:extLst>
+          </p:cNvPr>
+          <p:cNvSpPr/>
+          <p:nvPr/>
+        </p:nvSpPr>
+        <p:spPr>
+          <a:xfrm>
+            <a:off x="2467763" y="377504"/>
+            <a:ext cx="813732" cy="302003"/>
+          </a:xfrm>
+          <a:prstGeom prst="rect">
+            <a:avLst/>
+          </a:prstGeom>
+          <a:solidFill>
+            <a:schemeClr val="accent4">
+              <a:lumMod val="40000"/>
+              <a:lumOff val="60000"/>
+            </a:schemeClr>
+          </a:solidFill>
+          <a:ln>
+            <a:solidFill>
+              <a:schemeClr val="tx1"/>
+            </a:solidFill>
+          </a:ln>
+        </p:spPr>
+        <p:style>
+          <a:lnRef idx="2">
+            <a:schemeClr val="accent1">
+              <a:shade val="50000"/>
+            </a:schemeClr>
+          </a:lnRef>
+          <a:fillRef idx="1">
+            <a:schemeClr val="accent1"/>
+          </a:fillRef>
+          <a:effectRef idx="0">
+            <a:schemeClr val="accent1"/>
+          </a:effectRef>
+          <a:fontRef idx="minor">
+            <a:schemeClr val="lt1"/>
+          </a:fontRef>
+        </p:style>
+        <p:txBody>
+          <a:bodyPr rtlCol="0" anchor="ctr"/>
+          <a:lstStyle/>
+          <a:p>
+            <a:pPr algn="ctr"/>
+            <a:r>
+              <a:rPr lang="en-SG" dirty="0">
+                <a:solidFill>
+                  <a:schemeClr val="tx1"/>
+                </a:solidFill>
+              </a:rPr>
+              <a:t>:Ui</a:t>
+            </a:r>
+          </a:p>
+        </p:txBody>
+      </p:sp>
+      <p:sp>
+        <p:nvSpPr>
+          <p:cNvPr id="7" name="Rectangle 6">
+            <a:extLst>
+              <a:ext uri="{FF2B5EF4-FFF2-40B4-BE49-F238E27FC236}">
+                <a16:creationId xmlns:a16="http://schemas.microsoft.com/office/drawing/2014/main" id="{789BA236-5688-B76C-40D5-D82C259DE51F}"/>
+              </a:ext>
+            </a:extLst>
+          </p:cNvPr>
+          <p:cNvSpPr/>
+          <p:nvPr/>
+        </p:nvSpPr>
+        <p:spPr>
+          <a:xfrm>
+            <a:off x="8153084" y="377504"/>
+            <a:ext cx="975158" cy="302003"/>
+          </a:xfrm>
+          <a:prstGeom prst="rect">
+            <a:avLst/>
+          </a:prstGeom>
+          <a:solidFill>
+            <a:schemeClr val="accent4">
+              <a:lumMod val="40000"/>
+              <a:lumOff val="60000"/>
+            </a:schemeClr>
+          </a:solidFill>
+          <a:ln>
+            <a:solidFill>
+              <a:schemeClr val="tx1"/>
+            </a:solidFill>
+          </a:ln>
+        </p:spPr>
+        <p:style>
+          <a:lnRef idx="2">
+            <a:schemeClr val="accent1">
+              <a:shade val="50000"/>
+            </a:schemeClr>
+          </a:lnRef>
+          <a:fillRef idx="1">
+            <a:schemeClr val="accent1"/>
+          </a:fillRef>
+          <a:effectRef idx="0">
+            <a:schemeClr val="accent1"/>
+          </a:effectRef>
+          <a:fontRef idx="minor">
+            <a:schemeClr val="lt1"/>
+          </a:fontRef>
+        </p:style>
+        <p:txBody>
+          <a:bodyPr rtlCol="0" anchor="ctr"/>
+          <a:lstStyle/>
+          <a:p>
+            <a:pPr algn="ctr"/>
+            <a:r>
+              <a:rPr lang="en-SG" dirty="0">
+                <a:solidFill>
+                  <a:schemeClr val="tx1"/>
+                </a:solidFill>
+              </a:rPr>
+              <a:t>:Storage</a:t>
+            </a:r>
+          </a:p>
+        </p:txBody>
+      </p:sp>
+      <p:sp>
+        <p:nvSpPr>
+          <p:cNvPr id="8" name="Rectangle 7">
+            <a:extLst>
+              <a:ext uri="{FF2B5EF4-FFF2-40B4-BE49-F238E27FC236}">
+                <a16:creationId xmlns:a16="http://schemas.microsoft.com/office/drawing/2014/main" id="{FB59D9ED-E313-758F-B4CE-ABE35859008C}"/>
+              </a:ext>
+            </a:extLst>
+          </p:cNvPr>
+          <p:cNvSpPr/>
+          <p:nvPr/>
+        </p:nvSpPr>
+        <p:spPr>
+          <a:xfrm>
+            <a:off x="6279163" y="377504"/>
+            <a:ext cx="813732" cy="302003"/>
+          </a:xfrm>
+          <a:prstGeom prst="rect">
+            <a:avLst/>
+          </a:prstGeom>
+          <a:solidFill>
+            <a:schemeClr val="accent4">
+              <a:lumMod val="40000"/>
+              <a:lumOff val="60000"/>
+            </a:schemeClr>
+          </a:solidFill>
+          <a:ln>
+            <a:solidFill>
+              <a:schemeClr val="tx1"/>
+            </a:solidFill>
+          </a:ln>
+        </p:spPr>
+        <p:style>
+          <a:lnRef idx="2">
+            <a:schemeClr val="accent1">
+              <a:shade val="50000"/>
+            </a:schemeClr>
+          </a:lnRef>
+          <a:fillRef idx="1">
+            <a:schemeClr val="accent1"/>
+          </a:fillRef>
+          <a:effectRef idx="0">
+            <a:schemeClr val="accent1"/>
+          </a:effectRef>
+          <a:fontRef idx="minor">
+            <a:schemeClr val="lt1"/>
+          </a:fontRef>
+        </p:style>
+        <p:txBody>
+          <a:bodyPr rtlCol="0" anchor="ctr"/>
+          <a:lstStyle/>
+          <a:p>
+            <a:pPr algn="ctr"/>
+            <a:r>
+              <a:rPr lang="en-SG" dirty="0">
+                <a:solidFill>
+                  <a:schemeClr val="tx1"/>
+                </a:solidFill>
+              </a:rPr>
+              <a:t>:Task</a:t>
+            </a:r>
+          </a:p>
+        </p:txBody>
+      </p:sp>
+      <p:sp>
+        <p:nvSpPr>
+          <p:cNvPr id="9" name="Rectangle 8">
+            <a:extLst>
+              <a:ext uri="{FF2B5EF4-FFF2-40B4-BE49-F238E27FC236}">
+                <a16:creationId xmlns:a16="http://schemas.microsoft.com/office/drawing/2014/main" id="{8C1F886F-AE13-9D8C-0324-0BEC3E02ED65}"/>
+              </a:ext>
+            </a:extLst>
+          </p:cNvPr>
+          <p:cNvSpPr/>
+          <p:nvPr/>
+        </p:nvSpPr>
+        <p:spPr>
+          <a:xfrm>
+            <a:off x="4353422" y="383176"/>
+            <a:ext cx="990718" cy="302003"/>
+          </a:xfrm>
+          <a:prstGeom prst="rect">
+            <a:avLst/>
+          </a:prstGeom>
+          <a:solidFill>
+            <a:schemeClr val="accent4">
+              <a:lumMod val="40000"/>
+              <a:lumOff val="60000"/>
+            </a:schemeClr>
+          </a:solidFill>
+          <a:ln>
+            <a:solidFill>
+              <a:schemeClr val="tx1"/>
+            </a:solidFill>
+          </a:ln>
+        </p:spPr>
+        <p:style>
+          <a:lnRef idx="2">
+            <a:schemeClr val="accent1">
+              <a:shade val="50000"/>
+            </a:schemeClr>
+          </a:lnRef>
+          <a:fillRef idx="1">
+            <a:schemeClr val="accent1"/>
+          </a:fillRef>
+          <a:effectRef idx="0">
+            <a:schemeClr val="accent1"/>
+          </a:effectRef>
+          <a:fontRef idx="minor">
+            <a:schemeClr val="lt1"/>
+          </a:fontRef>
+        </p:style>
+        <p:txBody>
+          <a:bodyPr rtlCol="0" anchor="ctr"/>
+          <a:lstStyle/>
+          <a:p>
+            <a:pPr algn="ctr"/>
+            <a:r>
+              <a:rPr lang="en-SG" dirty="0">
+                <a:solidFill>
+                  <a:schemeClr val="tx1"/>
+                </a:solidFill>
+              </a:rPr>
+              <a:t>:TaskList</a:t>
+            </a:r>
+          </a:p>
+        </p:txBody>
+      </p:sp>
+      <p:cxnSp>
+        <p:nvCxnSpPr>
+          <p:cNvPr id="11" name="Straight Connector 10">
+            <a:extLst>
+              <a:ext uri="{FF2B5EF4-FFF2-40B4-BE49-F238E27FC236}">
+                <a16:creationId xmlns:a16="http://schemas.microsoft.com/office/drawing/2014/main" id="{A21AF19C-D9D9-0FE7-FFDA-23843CB88743}"/>
+              </a:ext>
+            </a:extLst>
+          </p:cNvPr>
+          <p:cNvCxnSpPr>
+            <a:cxnSpLocks/>
+            <a:stCxn id="4" idx="2"/>
+          </p:cNvCxnSpPr>
+          <p:nvPr/>
+        </p:nvCxnSpPr>
+        <p:spPr>
+          <a:xfrm flipH="1">
+            <a:off x="956606" y="679507"/>
+            <a:ext cx="19223" cy="5830349"/>
+          </a:xfrm>
+          <a:prstGeom prst="line">
+            <a:avLst/>
+          </a:prstGeom>
+          <a:ln w="19050">
+            <a:solidFill>
+              <a:schemeClr val="tx1">
+                <a:lumMod val="50000"/>
+                <a:lumOff val="50000"/>
+              </a:schemeClr>
+            </a:solidFill>
+            <a:prstDash val="dash"/>
+          </a:ln>
+        </p:spPr>
+        <p:style>
+          <a:lnRef idx="1">
+            <a:schemeClr val="accent1"/>
+          </a:lnRef>
+          <a:fillRef idx="0">
+            <a:schemeClr val="accent1"/>
+          </a:fillRef>
+          <a:effectRef idx="0">
+            <a:schemeClr val="accent1"/>
+          </a:effectRef>
+          <a:fontRef idx="minor">
+            <a:schemeClr val="tx1"/>
+          </a:fontRef>
+        </p:style>
+      </p:cxnSp>
+      <p:cxnSp>
+        <p:nvCxnSpPr>
+          <p:cNvPr id="12" name="Straight Connector 11">
+            <a:extLst>
+              <a:ext uri="{FF2B5EF4-FFF2-40B4-BE49-F238E27FC236}">
+                <a16:creationId xmlns:a16="http://schemas.microsoft.com/office/drawing/2014/main" id="{68ECC557-D3D1-C9C6-C659-8784254D43F8}"/>
+              </a:ext>
+            </a:extLst>
+          </p:cNvPr>
+          <p:cNvCxnSpPr/>
+          <p:nvPr/>
+        </p:nvCxnSpPr>
+        <p:spPr>
+          <a:xfrm>
+            <a:off x="2868337" y="679508"/>
+            <a:ext cx="4194" cy="5830349"/>
+          </a:xfrm>
+          <a:prstGeom prst="line">
+            <a:avLst/>
+          </a:prstGeom>
+          <a:ln w="19050">
+            <a:solidFill>
+              <a:schemeClr val="tx1">
+                <a:lumMod val="50000"/>
+                <a:lumOff val="50000"/>
+              </a:schemeClr>
+            </a:solidFill>
+            <a:prstDash val="dash"/>
+          </a:ln>
+        </p:spPr>
+        <p:style>
+          <a:lnRef idx="1">
+            <a:schemeClr val="accent1"/>
+          </a:lnRef>
+          <a:fillRef idx="0">
+            <a:schemeClr val="accent1"/>
+          </a:fillRef>
+          <a:effectRef idx="0">
+            <a:schemeClr val="accent1"/>
+          </a:effectRef>
+          <a:fontRef idx="minor">
+            <a:schemeClr val="tx1"/>
+          </a:fontRef>
+        </p:style>
+      </p:cxnSp>
+      <p:cxnSp>
+        <p:nvCxnSpPr>
+          <p:cNvPr id="13" name="Straight Connector 12">
+            <a:extLst>
+              <a:ext uri="{FF2B5EF4-FFF2-40B4-BE49-F238E27FC236}">
+                <a16:creationId xmlns:a16="http://schemas.microsoft.com/office/drawing/2014/main" id="{065619AC-31DB-2C88-605F-418B5C8B72E5}"/>
+              </a:ext>
+            </a:extLst>
+          </p:cNvPr>
+          <p:cNvCxnSpPr/>
+          <p:nvPr/>
+        </p:nvCxnSpPr>
+        <p:spPr>
+          <a:xfrm>
+            <a:off x="8640663" y="679508"/>
+            <a:ext cx="4194" cy="5830349"/>
+          </a:xfrm>
+          <a:prstGeom prst="line">
+            <a:avLst/>
+          </a:prstGeom>
+          <a:ln w="19050">
+            <a:solidFill>
+              <a:schemeClr val="tx1">
+                <a:lumMod val="50000"/>
+                <a:lumOff val="50000"/>
+              </a:schemeClr>
+            </a:solidFill>
+            <a:prstDash val="dash"/>
+          </a:ln>
+        </p:spPr>
+        <p:style>
+          <a:lnRef idx="1">
+            <a:schemeClr val="accent1"/>
+          </a:lnRef>
+          <a:fillRef idx="0">
+            <a:schemeClr val="accent1"/>
+          </a:fillRef>
+          <a:effectRef idx="0">
+            <a:schemeClr val="accent1"/>
+          </a:effectRef>
+          <a:fontRef idx="minor">
+            <a:schemeClr val="tx1"/>
+          </a:fontRef>
+        </p:style>
+      </p:cxnSp>
+      <p:cxnSp>
+        <p:nvCxnSpPr>
+          <p:cNvPr id="14" name="Straight Connector 13">
+            <a:extLst>
+              <a:ext uri="{FF2B5EF4-FFF2-40B4-BE49-F238E27FC236}">
+                <a16:creationId xmlns:a16="http://schemas.microsoft.com/office/drawing/2014/main" id="{B9969A77-EE80-FC3E-E4D2-8A08C0634BCC}"/>
+              </a:ext>
+            </a:extLst>
+          </p:cNvPr>
+          <p:cNvCxnSpPr/>
+          <p:nvPr/>
+        </p:nvCxnSpPr>
+        <p:spPr>
+          <a:xfrm>
+            <a:off x="6680437" y="679508"/>
+            <a:ext cx="4194" cy="5830349"/>
+          </a:xfrm>
+          <a:prstGeom prst="line">
+            <a:avLst/>
+          </a:prstGeom>
+          <a:ln w="19050">
+            <a:solidFill>
+              <a:schemeClr val="tx1">
+                <a:lumMod val="50000"/>
+                <a:lumOff val="50000"/>
+              </a:schemeClr>
+            </a:solidFill>
+            <a:prstDash val="dash"/>
+          </a:ln>
+        </p:spPr>
+        <p:style>
+          <a:lnRef idx="1">
+            <a:schemeClr val="accent1"/>
+          </a:lnRef>
+          <a:fillRef idx="0">
+            <a:schemeClr val="accent1"/>
+          </a:fillRef>
+          <a:effectRef idx="0">
+            <a:schemeClr val="accent1"/>
+          </a:effectRef>
+          <a:fontRef idx="minor">
+            <a:schemeClr val="tx1"/>
+          </a:fontRef>
+        </p:style>
+      </p:cxnSp>
+      <p:cxnSp>
+        <p:nvCxnSpPr>
+          <p:cNvPr id="15" name="Straight Connector 14">
+            <a:extLst>
+              <a:ext uri="{FF2B5EF4-FFF2-40B4-BE49-F238E27FC236}">
+                <a16:creationId xmlns:a16="http://schemas.microsoft.com/office/drawing/2014/main" id="{0DE0306C-64FA-1572-CC87-5898136C80DF}"/>
+              </a:ext>
+            </a:extLst>
+          </p:cNvPr>
+          <p:cNvCxnSpPr/>
+          <p:nvPr/>
+        </p:nvCxnSpPr>
+        <p:spPr>
+          <a:xfrm>
+            <a:off x="4829262" y="679508"/>
+            <a:ext cx="4194" cy="5830349"/>
+          </a:xfrm>
+          <a:prstGeom prst="line">
+            <a:avLst/>
+          </a:prstGeom>
+          <a:ln w="19050">
+            <a:solidFill>
+              <a:schemeClr val="tx1">
+                <a:lumMod val="50000"/>
+                <a:lumOff val="50000"/>
+              </a:schemeClr>
+            </a:solidFill>
+            <a:prstDash val="dash"/>
+          </a:ln>
+        </p:spPr>
+        <p:style>
+          <a:lnRef idx="1">
+            <a:schemeClr val="accent1"/>
+          </a:lnRef>
+          <a:fillRef idx="0">
+            <a:schemeClr val="accent1"/>
+          </a:fillRef>
+          <a:effectRef idx="0">
+            <a:schemeClr val="accent1"/>
+          </a:effectRef>
+          <a:fontRef idx="minor">
+            <a:schemeClr val="tx1"/>
+          </a:fontRef>
+        </p:style>
+      </p:cxnSp>
+      <p:sp>
+        <p:nvSpPr>
+          <p:cNvPr id="16" name="Rectangle 15">
+            <a:extLst>
+              <a:ext uri="{FF2B5EF4-FFF2-40B4-BE49-F238E27FC236}">
+                <a16:creationId xmlns:a16="http://schemas.microsoft.com/office/drawing/2014/main" id="{443DEF40-EE55-8F3D-83F1-34AD7A468DF3}"/>
+              </a:ext>
+            </a:extLst>
+          </p:cNvPr>
+          <p:cNvSpPr/>
+          <p:nvPr/>
+        </p:nvSpPr>
+        <p:spPr>
+          <a:xfrm>
+            <a:off x="2785145" y="906011"/>
+            <a:ext cx="184554" cy="5486400"/>
+          </a:xfrm>
+          <a:prstGeom prst="rect">
+            <a:avLst/>
+          </a:prstGeom>
+          <a:solidFill>
+            <a:schemeClr val="accent4">
+              <a:lumMod val="60000"/>
+              <a:lumOff val="40000"/>
+            </a:schemeClr>
+          </a:solidFill>
+          <a:ln>
+            <a:solidFill>
+              <a:schemeClr val="bg2">
+                <a:lumMod val="75000"/>
+              </a:schemeClr>
+            </a:solidFill>
+          </a:ln>
+        </p:spPr>
+        <p:style>
+          <a:lnRef idx="2">
+            <a:schemeClr val="accent1">
+              <a:shade val="50000"/>
+            </a:schemeClr>
+          </a:lnRef>
+          <a:fillRef idx="1">
+            <a:schemeClr val="accent1"/>
+          </a:fillRef>
+          <a:effectRef idx="0">
+            <a:schemeClr val="accent1"/>
+          </a:effectRef>
+          <a:fontRef idx="minor">
+            <a:schemeClr val="lt1"/>
+          </a:fontRef>
+        </p:style>
+        <p:txBody>
+          <a:bodyPr rtlCol="0" anchor="ctr"/>
+          <a:lstStyle/>
+          <a:p>
+            <a:pPr algn="ctr"/>
+            <a:endParaRPr lang="en-SG"/>
+          </a:p>
+        </p:txBody>
+      </p:sp>
+      <p:cxnSp>
+        <p:nvCxnSpPr>
+          <p:cNvPr id="18" name="Straight Arrow Connector 17">
+            <a:extLst>
+              <a:ext uri="{FF2B5EF4-FFF2-40B4-BE49-F238E27FC236}">
+                <a16:creationId xmlns:a16="http://schemas.microsoft.com/office/drawing/2014/main" id="{2A026EFF-A2B7-77FC-7BF5-D849E09C5001}"/>
+              </a:ext>
+            </a:extLst>
+          </p:cNvPr>
+          <p:cNvCxnSpPr/>
+          <p:nvPr/>
+        </p:nvCxnSpPr>
+        <p:spPr>
+          <a:xfrm>
+            <a:off x="968929" y="906011"/>
+            <a:ext cx="1816216" cy="0"/>
+          </a:xfrm>
+          <a:prstGeom prst="straightConnector1">
+            <a:avLst/>
+          </a:prstGeom>
+          <a:ln>
+            <a:tailEnd type="triangle"/>
+          </a:ln>
+        </p:spPr>
+        <p:style>
+          <a:lnRef idx="1">
+            <a:schemeClr val="dk1"/>
+          </a:lnRef>
+          <a:fillRef idx="0">
+            <a:schemeClr val="dk1"/>
+          </a:fillRef>
+          <a:effectRef idx="0">
+            <a:schemeClr val="dk1"/>
+          </a:effectRef>
+          <a:fontRef idx="minor">
+            <a:schemeClr val="tx1"/>
+          </a:fontRef>
+        </p:style>
+      </p:cxnSp>
+      <p:sp>
+        <p:nvSpPr>
+          <p:cNvPr id="19" name="TextBox 18">
+            <a:extLst>
+              <a:ext uri="{FF2B5EF4-FFF2-40B4-BE49-F238E27FC236}">
+                <a16:creationId xmlns:a16="http://schemas.microsoft.com/office/drawing/2014/main" id="{90A56D40-C2D3-7E9A-02F0-898A8E4BE16A}"/>
+              </a:ext>
+            </a:extLst>
+          </p:cNvPr>
+          <p:cNvSpPr txBox="1"/>
+          <p:nvPr/>
+        </p:nvSpPr>
+        <p:spPr>
+          <a:xfrm>
+            <a:off x="1382991" y="662730"/>
+            <a:ext cx="909095" cy="276999"/>
+          </a:xfrm>
+          <a:prstGeom prst="rect">
+            <a:avLst/>
+          </a:prstGeom>
+          <a:noFill/>
+        </p:spPr>
+        <p:txBody>
+          <a:bodyPr wrap="none" rtlCol="0">
+            <a:spAutoFit/>
+          </a:bodyPr>
+          <a:lstStyle/>
+          <a:p>
+            <a:r>
+              <a:rPr lang="en-SG" sz="1200" dirty="0"/>
+              <a:t>listClasses()</a:t>
+            </a:r>
+          </a:p>
+        </p:txBody>
+      </p:sp>
+      <p:sp>
+        <p:nvSpPr>
+          <p:cNvPr id="20" name="Rectangle 19">
+            <a:extLst>
+              <a:ext uri="{FF2B5EF4-FFF2-40B4-BE49-F238E27FC236}">
+                <a16:creationId xmlns:a16="http://schemas.microsoft.com/office/drawing/2014/main" id="{1D1CBA3E-4A9C-B807-E268-2D9D62C42A9B}"/>
+              </a:ext>
+            </a:extLst>
+          </p:cNvPr>
+          <p:cNvSpPr/>
+          <p:nvPr/>
+        </p:nvSpPr>
+        <p:spPr>
+          <a:xfrm>
+            <a:off x="2881622" y="5159229"/>
+            <a:ext cx="184554" cy="402671"/>
+          </a:xfrm>
+          <a:prstGeom prst="rect">
+            <a:avLst/>
+          </a:prstGeom>
+          <a:solidFill>
+            <a:schemeClr val="accent4">
+              <a:lumMod val="60000"/>
+              <a:lumOff val="40000"/>
+            </a:schemeClr>
+          </a:solidFill>
+          <a:ln>
+            <a:solidFill>
+              <a:schemeClr val="bg2">
+                <a:lumMod val="75000"/>
+              </a:schemeClr>
+            </a:solidFill>
+          </a:ln>
+        </p:spPr>
+        <p:style>
+          <a:lnRef idx="2">
+            <a:schemeClr val="accent1">
+              <a:shade val="50000"/>
+            </a:schemeClr>
+          </a:lnRef>
+          <a:fillRef idx="1">
+            <a:schemeClr val="accent1"/>
+          </a:fillRef>
+          <a:effectRef idx="0">
+            <a:schemeClr val="accent1"/>
+          </a:effectRef>
+          <a:fontRef idx="minor">
+            <a:schemeClr val="lt1"/>
+          </a:fontRef>
+        </p:style>
+        <p:txBody>
+          <a:bodyPr rtlCol="0" anchor="ctr"/>
+          <a:lstStyle/>
+          <a:p>
+            <a:pPr algn="ctr"/>
+            <a:endParaRPr lang="en-SG"/>
+          </a:p>
+        </p:txBody>
+      </p:sp>
+      <p:sp>
+        <p:nvSpPr>
+          <p:cNvPr id="21" name="Rectangle 20">
+            <a:extLst>
+              <a:ext uri="{FF2B5EF4-FFF2-40B4-BE49-F238E27FC236}">
+                <a16:creationId xmlns:a16="http://schemas.microsoft.com/office/drawing/2014/main" id="{9D739646-4555-7B62-4927-B5F29380FB87}"/>
+              </a:ext>
+            </a:extLst>
+          </p:cNvPr>
+          <p:cNvSpPr/>
+          <p:nvPr/>
+        </p:nvSpPr>
+        <p:spPr>
+          <a:xfrm>
+            <a:off x="2877422" y="5834542"/>
+            <a:ext cx="184554" cy="402671"/>
+          </a:xfrm>
+          <a:prstGeom prst="rect">
+            <a:avLst/>
+          </a:prstGeom>
+          <a:solidFill>
+            <a:schemeClr val="accent4">
+              <a:lumMod val="60000"/>
+              <a:lumOff val="40000"/>
+            </a:schemeClr>
+          </a:solidFill>
+          <a:ln>
+            <a:solidFill>
+              <a:schemeClr val="bg2">
+                <a:lumMod val="75000"/>
+              </a:schemeClr>
+            </a:solidFill>
+          </a:ln>
+        </p:spPr>
+        <p:style>
+          <a:lnRef idx="2">
+            <a:schemeClr val="accent1">
+              <a:shade val="50000"/>
+            </a:schemeClr>
+          </a:lnRef>
+          <a:fillRef idx="1">
+            <a:schemeClr val="accent1"/>
+          </a:fillRef>
+          <a:effectRef idx="0">
+            <a:schemeClr val="accent1"/>
+          </a:effectRef>
+          <a:fontRef idx="minor">
+            <a:schemeClr val="lt1"/>
+          </a:fontRef>
+        </p:style>
+        <p:txBody>
+          <a:bodyPr rtlCol="0" anchor="ctr"/>
+          <a:lstStyle/>
+          <a:p>
+            <a:pPr algn="ctr"/>
+            <a:endParaRPr lang="en-SG"/>
+          </a:p>
+        </p:txBody>
+      </p:sp>
+      <p:sp>
+        <p:nvSpPr>
+          <p:cNvPr id="22" name="Rectangle 21">
+            <a:extLst>
+              <a:ext uri="{FF2B5EF4-FFF2-40B4-BE49-F238E27FC236}">
+                <a16:creationId xmlns:a16="http://schemas.microsoft.com/office/drawing/2014/main" id="{D1219018-454A-9D48-CE98-9C42DA7129DE}"/>
+              </a:ext>
+            </a:extLst>
+          </p:cNvPr>
+          <p:cNvSpPr/>
+          <p:nvPr/>
+        </p:nvSpPr>
+        <p:spPr>
+          <a:xfrm>
+            <a:off x="4741177" y="1161954"/>
+            <a:ext cx="180360" cy="3728827"/>
+          </a:xfrm>
+          <a:prstGeom prst="rect">
+            <a:avLst/>
+          </a:prstGeom>
+          <a:solidFill>
+            <a:schemeClr val="accent4">
+              <a:lumMod val="60000"/>
+              <a:lumOff val="40000"/>
+            </a:schemeClr>
+          </a:solidFill>
+          <a:ln>
+            <a:solidFill>
+              <a:schemeClr val="bg2">
+                <a:lumMod val="75000"/>
+              </a:schemeClr>
+            </a:solidFill>
+          </a:ln>
+        </p:spPr>
+        <p:style>
+          <a:lnRef idx="2">
+            <a:schemeClr val="accent1">
+              <a:shade val="50000"/>
+            </a:schemeClr>
+          </a:lnRef>
+          <a:fillRef idx="1">
+            <a:schemeClr val="accent1"/>
+          </a:fillRef>
+          <a:effectRef idx="0">
+            <a:schemeClr val="accent1"/>
+          </a:effectRef>
+          <a:fontRef idx="minor">
+            <a:schemeClr val="lt1"/>
+          </a:fontRef>
+        </p:style>
+        <p:txBody>
+          <a:bodyPr rtlCol="0" anchor="ctr"/>
+          <a:lstStyle/>
+          <a:p>
+            <a:pPr algn="ctr"/>
+            <a:endParaRPr lang="en-SG"/>
+          </a:p>
+        </p:txBody>
+      </p:sp>
+      <p:cxnSp>
+        <p:nvCxnSpPr>
+          <p:cNvPr id="23" name="Straight Arrow Connector 22">
+            <a:extLst>
+              <a:ext uri="{FF2B5EF4-FFF2-40B4-BE49-F238E27FC236}">
+                <a16:creationId xmlns:a16="http://schemas.microsoft.com/office/drawing/2014/main" id="{0DC95210-3D24-D68F-B211-3EB50AFB96AE}"/>
+              </a:ext>
+            </a:extLst>
+          </p:cNvPr>
+          <p:cNvCxnSpPr>
+            <a:cxnSpLocks/>
+          </p:cNvCxnSpPr>
+          <p:nvPr/>
+        </p:nvCxnSpPr>
+        <p:spPr>
+          <a:xfrm>
+            <a:off x="2969699" y="1161954"/>
+            <a:ext cx="1771478" cy="0"/>
+          </a:xfrm>
+          <a:prstGeom prst="straightConnector1">
+            <a:avLst/>
+          </a:prstGeom>
+          <a:ln>
+            <a:tailEnd type="triangle"/>
+          </a:ln>
+        </p:spPr>
+        <p:style>
+          <a:lnRef idx="1">
+            <a:schemeClr val="dk1"/>
+          </a:lnRef>
+          <a:fillRef idx="0">
+            <a:schemeClr val="dk1"/>
+          </a:fillRef>
+          <a:effectRef idx="0">
+            <a:schemeClr val="dk1"/>
+          </a:effectRef>
+          <a:fontRef idx="minor">
+            <a:schemeClr val="tx1"/>
+          </a:fontRef>
+        </p:style>
+      </p:cxnSp>
+      <p:sp>
+        <p:nvSpPr>
+          <p:cNvPr id="25" name="TextBox 24">
+            <a:extLst>
+              <a:ext uri="{FF2B5EF4-FFF2-40B4-BE49-F238E27FC236}">
+                <a16:creationId xmlns:a16="http://schemas.microsoft.com/office/drawing/2014/main" id="{7D17734E-46BA-E443-B6EE-494A956E171B}"/>
+              </a:ext>
+            </a:extLst>
+          </p:cNvPr>
+          <p:cNvSpPr txBox="1"/>
+          <p:nvPr/>
+        </p:nvSpPr>
+        <p:spPr>
+          <a:xfrm>
+            <a:off x="3495724" y="906011"/>
+            <a:ext cx="719428" cy="276999"/>
+          </a:xfrm>
+          <a:prstGeom prst="rect">
+            <a:avLst/>
+          </a:prstGeom>
+          <a:noFill/>
+        </p:spPr>
+        <p:txBody>
+          <a:bodyPr wrap="none" rtlCol="0">
+            <a:spAutoFit/>
+          </a:bodyPr>
+          <a:lstStyle/>
+          <a:p>
+            <a:r>
+              <a:rPr lang="en-SG" sz="1200" dirty="0"/>
+              <a:t>refresh()</a:t>
+            </a:r>
+          </a:p>
+        </p:txBody>
+      </p:sp>
+      <p:sp>
+        <p:nvSpPr>
+          <p:cNvPr id="26" name="Rectangle 25">
+            <a:extLst>
+              <a:ext uri="{FF2B5EF4-FFF2-40B4-BE49-F238E27FC236}">
+                <a16:creationId xmlns:a16="http://schemas.microsoft.com/office/drawing/2014/main" id="{A4E68995-B941-1F9D-90FA-EA566C37691B}"/>
+              </a:ext>
+            </a:extLst>
+          </p:cNvPr>
+          <p:cNvSpPr/>
+          <p:nvPr/>
+        </p:nvSpPr>
+        <p:spPr>
+          <a:xfrm>
+            <a:off x="6590257" y="1413624"/>
+            <a:ext cx="180360" cy="406787"/>
+          </a:xfrm>
+          <a:prstGeom prst="rect">
+            <a:avLst/>
+          </a:prstGeom>
+          <a:solidFill>
+            <a:schemeClr val="accent4">
+              <a:lumMod val="60000"/>
+              <a:lumOff val="40000"/>
+            </a:schemeClr>
+          </a:solidFill>
+          <a:ln>
+            <a:solidFill>
+              <a:schemeClr val="bg2">
+                <a:lumMod val="75000"/>
+              </a:schemeClr>
+            </a:solidFill>
+          </a:ln>
+        </p:spPr>
+        <p:style>
+          <a:lnRef idx="2">
+            <a:schemeClr val="accent1">
+              <a:shade val="50000"/>
+            </a:schemeClr>
+          </a:lnRef>
+          <a:fillRef idx="1">
+            <a:schemeClr val="accent1"/>
+          </a:fillRef>
+          <a:effectRef idx="0">
+            <a:schemeClr val="accent1"/>
+          </a:effectRef>
+          <a:fontRef idx="minor">
+            <a:schemeClr val="lt1"/>
+          </a:fontRef>
+        </p:style>
+        <p:txBody>
+          <a:bodyPr rtlCol="0" anchor="ctr"/>
+          <a:lstStyle/>
+          <a:p>
+            <a:pPr algn="ctr"/>
+            <a:endParaRPr lang="en-SG"/>
+          </a:p>
+        </p:txBody>
+      </p:sp>
+      <p:cxnSp>
+        <p:nvCxnSpPr>
+          <p:cNvPr id="27" name="Straight Arrow Connector 26">
+            <a:extLst>
+              <a:ext uri="{FF2B5EF4-FFF2-40B4-BE49-F238E27FC236}">
+                <a16:creationId xmlns:a16="http://schemas.microsoft.com/office/drawing/2014/main" id="{582D2284-3C3A-B9F8-69AC-D55C3FB91089}"/>
+              </a:ext>
+            </a:extLst>
+          </p:cNvPr>
+          <p:cNvCxnSpPr>
+            <a:cxnSpLocks/>
+          </p:cNvCxnSpPr>
+          <p:nvPr/>
+        </p:nvCxnSpPr>
+        <p:spPr>
+          <a:xfrm>
+            <a:off x="4921537" y="1410906"/>
+            <a:ext cx="1668720" cy="0"/>
+          </a:xfrm>
+          <a:prstGeom prst="straightConnector1">
+            <a:avLst/>
+          </a:prstGeom>
+          <a:ln>
+            <a:tailEnd type="triangle"/>
+          </a:ln>
+        </p:spPr>
+        <p:style>
+          <a:lnRef idx="1">
+            <a:schemeClr val="dk1"/>
+          </a:lnRef>
+          <a:fillRef idx="0">
+            <a:schemeClr val="dk1"/>
+          </a:fillRef>
+          <a:effectRef idx="0">
+            <a:schemeClr val="dk1"/>
+          </a:effectRef>
+          <a:fontRef idx="minor">
+            <a:schemeClr val="tx1"/>
+          </a:fontRef>
+        </p:style>
+      </p:cxnSp>
+      <p:sp>
+        <p:nvSpPr>
+          <p:cNvPr id="29" name="TextBox 28">
+            <a:extLst>
+              <a:ext uri="{FF2B5EF4-FFF2-40B4-BE49-F238E27FC236}">
+                <a16:creationId xmlns:a16="http://schemas.microsoft.com/office/drawing/2014/main" id="{665D8DC2-8B95-CD7F-91D8-9144819BF66B}"/>
+              </a:ext>
+            </a:extLst>
+          </p:cNvPr>
+          <p:cNvSpPr txBox="1"/>
+          <p:nvPr/>
+        </p:nvSpPr>
+        <p:spPr>
+          <a:xfrm>
+            <a:off x="5328311" y="1161954"/>
+            <a:ext cx="955903" cy="276999"/>
+          </a:xfrm>
+          <a:prstGeom prst="rect">
+            <a:avLst/>
+          </a:prstGeom>
+          <a:noFill/>
+        </p:spPr>
+        <p:txBody>
+          <a:bodyPr wrap="none" rtlCol="0">
+            <a:spAutoFit/>
+          </a:bodyPr>
+          <a:lstStyle/>
+          <a:p>
+            <a:r>
+              <a:rPr lang="en-SG" sz="1200" dirty="0"/>
+              <a:t>clearCount()</a:t>
+            </a:r>
+          </a:p>
+        </p:txBody>
+      </p:sp>
+      <p:cxnSp>
+        <p:nvCxnSpPr>
+          <p:cNvPr id="31" name="Straight Arrow Connector 30">
+            <a:extLst>
+              <a:ext uri="{FF2B5EF4-FFF2-40B4-BE49-F238E27FC236}">
+                <a16:creationId xmlns:a16="http://schemas.microsoft.com/office/drawing/2014/main" id="{9BF1B022-50E7-D0A8-CF6E-48DB00E5431A}"/>
+              </a:ext>
+            </a:extLst>
+          </p:cNvPr>
+          <p:cNvCxnSpPr>
+            <a:cxnSpLocks/>
+          </p:cNvCxnSpPr>
+          <p:nvPr/>
+        </p:nvCxnSpPr>
+        <p:spPr>
+          <a:xfrm flipH="1">
+            <a:off x="4921537" y="1820411"/>
+            <a:ext cx="1668720" cy="0"/>
+          </a:xfrm>
+          <a:prstGeom prst="straightConnector1">
+            <a:avLst/>
+          </a:prstGeom>
+          <a:ln>
+            <a:prstDash val="lgDash"/>
+            <a:tailEnd type="triangle"/>
+          </a:ln>
+        </p:spPr>
+        <p:style>
+          <a:lnRef idx="1">
+            <a:schemeClr val="dk1"/>
+          </a:lnRef>
+          <a:fillRef idx="0">
+            <a:schemeClr val="dk1"/>
+          </a:fillRef>
+          <a:effectRef idx="0">
+            <a:schemeClr val="dk1"/>
+          </a:effectRef>
+          <a:fontRef idx="minor">
+            <a:schemeClr val="tx1"/>
+          </a:fontRef>
+        </p:style>
+      </p:cxnSp>
+      <p:sp>
+        <p:nvSpPr>
+          <p:cNvPr id="34" name="Rectangle 33">
+            <a:extLst>
+              <a:ext uri="{FF2B5EF4-FFF2-40B4-BE49-F238E27FC236}">
+                <a16:creationId xmlns:a16="http://schemas.microsoft.com/office/drawing/2014/main" id="{F6F8368E-2E8E-923B-6EAB-54A6FB9E64C2}"/>
+              </a:ext>
+            </a:extLst>
+          </p:cNvPr>
+          <p:cNvSpPr/>
+          <p:nvPr/>
+        </p:nvSpPr>
+        <p:spPr>
+          <a:xfrm>
+            <a:off x="8552580" y="2137260"/>
+            <a:ext cx="180360" cy="2583480"/>
+          </a:xfrm>
+          <a:prstGeom prst="rect">
+            <a:avLst/>
+          </a:prstGeom>
+          <a:solidFill>
+            <a:schemeClr val="accent4">
+              <a:lumMod val="60000"/>
+              <a:lumOff val="40000"/>
+            </a:schemeClr>
+          </a:solidFill>
+          <a:ln>
+            <a:solidFill>
+              <a:schemeClr val="bg2">
+                <a:lumMod val="75000"/>
+              </a:schemeClr>
+            </a:solidFill>
+          </a:ln>
+        </p:spPr>
+        <p:style>
+          <a:lnRef idx="2">
+            <a:schemeClr val="accent1">
+              <a:shade val="50000"/>
+            </a:schemeClr>
+          </a:lnRef>
+          <a:fillRef idx="1">
+            <a:schemeClr val="accent1"/>
+          </a:fillRef>
+          <a:effectRef idx="0">
+            <a:schemeClr val="accent1"/>
+          </a:effectRef>
+          <a:fontRef idx="minor">
+            <a:schemeClr val="lt1"/>
+          </a:fontRef>
+        </p:style>
+        <p:txBody>
+          <a:bodyPr rtlCol="0" anchor="ctr"/>
+          <a:lstStyle/>
+          <a:p>
+            <a:pPr algn="ctr"/>
+            <a:endParaRPr lang="en-SG"/>
+          </a:p>
+        </p:txBody>
+      </p:sp>
+      <p:cxnSp>
+        <p:nvCxnSpPr>
+          <p:cNvPr id="35" name="Straight Arrow Connector 34">
+            <a:extLst>
+              <a:ext uri="{FF2B5EF4-FFF2-40B4-BE49-F238E27FC236}">
+                <a16:creationId xmlns:a16="http://schemas.microsoft.com/office/drawing/2014/main" id="{AFE6BE3B-7E00-E203-43BB-680F84402B26}"/>
+              </a:ext>
+            </a:extLst>
+          </p:cNvPr>
+          <p:cNvCxnSpPr>
+            <a:cxnSpLocks/>
+          </p:cNvCxnSpPr>
+          <p:nvPr/>
+        </p:nvCxnSpPr>
+        <p:spPr>
+          <a:xfrm>
+            <a:off x="4921537" y="2137260"/>
+            <a:ext cx="3631043" cy="0"/>
+          </a:xfrm>
+          <a:prstGeom prst="straightConnector1">
+            <a:avLst/>
+          </a:prstGeom>
+          <a:ln>
+            <a:tailEnd type="triangle"/>
+          </a:ln>
+        </p:spPr>
+        <p:style>
+          <a:lnRef idx="1">
+            <a:schemeClr val="dk1"/>
+          </a:lnRef>
+          <a:fillRef idx="0">
+            <a:schemeClr val="dk1"/>
+          </a:fillRef>
+          <a:effectRef idx="0">
+            <a:schemeClr val="dk1"/>
+          </a:effectRef>
+          <a:fontRef idx="minor">
+            <a:schemeClr val="tx1"/>
+          </a:fontRef>
+        </p:style>
+      </p:cxnSp>
+      <p:sp>
+        <p:nvSpPr>
+          <p:cNvPr id="37" name="TextBox 36">
+            <a:extLst>
+              <a:ext uri="{FF2B5EF4-FFF2-40B4-BE49-F238E27FC236}">
+                <a16:creationId xmlns:a16="http://schemas.microsoft.com/office/drawing/2014/main" id="{77748D9C-6BA1-70DC-CC36-01E460FA73DB}"/>
+              </a:ext>
+            </a:extLst>
+          </p:cNvPr>
+          <p:cNvSpPr txBox="1"/>
+          <p:nvPr/>
+        </p:nvSpPr>
+        <p:spPr>
+          <a:xfrm>
+            <a:off x="7065602" y="1860261"/>
+            <a:ext cx="751296" cy="276999"/>
+          </a:xfrm>
+          <a:prstGeom prst="rect">
+            <a:avLst/>
+          </a:prstGeom>
+          <a:noFill/>
+        </p:spPr>
+        <p:txBody>
+          <a:bodyPr wrap="none" rtlCol="0">
+            <a:spAutoFit/>
+          </a:bodyPr>
+          <a:lstStyle/>
+          <a:p>
+            <a:r>
+              <a:rPr lang="en-SG" sz="1200" dirty="0"/>
+              <a:t>tryLoad()</a:t>
+            </a:r>
+          </a:p>
+        </p:txBody>
+      </p:sp>
+      <p:sp>
+        <p:nvSpPr>
+          <p:cNvPr id="38" name="Rectangle 37">
+            <a:extLst>
+              <a:ext uri="{FF2B5EF4-FFF2-40B4-BE49-F238E27FC236}">
+                <a16:creationId xmlns:a16="http://schemas.microsoft.com/office/drawing/2014/main" id="{58A3545A-B33F-19AC-2AA9-44F411F5860D}"/>
+              </a:ext>
+            </a:extLst>
+          </p:cNvPr>
+          <p:cNvSpPr/>
+          <p:nvPr/>
+        </p:nvSpPr>
+        <p:spPr>
+          <a:xfrm>
+            <a:off x="8643807" y="2478783"/>
+            <a:ext cx="176167" cy="1996580"/>
+          </a:xfrm>
+          <a:prstGeom prst="rect">
+            <a:avLst/>
+          </a:prstGeom>
+          <a:solidFill>
+            <a:schemeClr val="accent4">
+              <a:lumMod val="60000"/>
+              <a:lumOff val="40000"/>
+            </a:schemeClr>
+          </a:solidFill>
+          <a:ln>
+            <a:solidFill>
+              <a:schemeClr val="bg2">
+                <a:lumMod val="75000"/>
+              </a:schemeClr>
+            </a:solidFill>
+          </a:ln>
+        </p:spPr>
+        <p:style>
+          <a:lnRef idx="2">
+            <a:schemeClr val="accent1">
+              <a:shade val="50000"/>
+            </a:schemeClr>
+          </a:lnRef>
+          <a:fillRef idx="1">
+            <a:schemeClr val="accent1"/>
+          </a:fillRef>
+          <a:effectRef idx="0">
+            <a:schemeClr val="accent1"/>
+          </a:effectRef>
+          <a:fontRef idx="minor">
+            <a:schemeClr val="lt1"/>
+          </a:fontRef>
+        </p:style>
+        <p:txBody>
+          <a:bodyPr rtlCol="0" anchor="ctr"/>
+          <a:lstStyle/>
+          <a:p>
+            <a:pPr algn="ctr"/>
+            <a:endParaRPr lang="en-SG"/>
+          </a:p>
+        </p:txBody>
+      </p:sp>
+      <p:sp>
+        <p:nvSpPr>
+          <p:cNvPr id="39" name="Rectangle 38">
+            <a:extLst>
+              <a:ext uri="{FF2B5EF4-FFF2-40B4-BE49-F238E27FC236}">
+                <a16:creationId xmlns:a16="http://schemas.microsoft.com/office/drawing/2014/main" id="{96ACA4C8-6542-1686-7FCA-FCA3BBC9EB87}"/>
+              </a:ext>
+            </a:extLst>
+          </p:cNvPr>
+          <p:cNvSpPr/>
+          <p:nvPr/>
+        </p:nvSpPr>
+        <p:spPr>
+          <a:xfrm>
+            <a:off x="8731891" y="2999104"/>
+            <a:ext cx="178263" cy="960376"/>
+          </a:xfrm>
+          <a:prstGeom prst="rect">
+            <a:avLst/>
+          </a:prstGeom>
+          <a:solidFill>
+            <a:schemeClr val="accent4">
+              <a:lumMod val="60000"/>
+              <a:lumOff val="40000"/>
+            </a:schemeClr>
+          </a:solidFill>
+          <a:ln>
+            <a:solidFill>
+              <a:schemeClr val="bg2">
+                <a:lumMod val="75000"/>
+              </a:schemeClr>
+            </a:solidFill>
+          </a:ln>
+        </p:spPr>
+        <p:style>
+          <a:lnRef idx="2">
+            <a:schemeClr val="accent1">
+              <a:shade val="50000"/>
+            </a:schemeClr>
+          </a:lnRef>
+          <a:fillRef idx="1">
+            <a:schemeClr val="accent1"/>
+          </a:fillRef>
+          <a:effectRef idx="0">
+            <a:schemeClr val="accent1"/>
+          </a:effectRef>
+          <a:fontRef idx="minor">
+            <a:schemeClr val="lt1"/>
+          </a:fontRef>
+        </p:style>
+        <p:txBody>
+          <a:bodyPr rtlCol="0" anchor="ctr"/>
+          <a:lstStyle/>
+          <a:p>
+            <a:pPr algn="ctr"/>
+            <a:endParaRPr lang="en-SG"/>
+          </a:p>
+        </p:txBody>
+      </p:sp>
+      <p:cxnSp>
+        <p:nvCxnSpPr>
+          <p:cNvPr id="76" name="Straight Connector 75">
+            <a:extLst>
+              <a:ext uri="{FF2B5EF4-FFF2-40B4-BE49-F238E27FC236}">
+                <a16:creationId xmlns:a16="http://schemas.microsoft.com/office/drawing/2014/main" id="{B476A9D9-825A-7C46-8C96-4DECA906BCAC}"/>
+              </a:ext>
+            </a:extLst>
+          </p:cNvPr>
+          <p:cNvCxnSpPr/>
+          <p:nvPr/>
+        </p:nvCxnSpPr>
+        <p:spPr>
+          <a:xfrm>
+            <a:off x="8731890" y="2315361"/>
+            <a:ext cx="353387" cy="0"/>
+          </a:xfrm>
+          <a:prstGeom prst="line">
+            <a:avLst/>
+          </a:prstGeom>
+        </p:spPr>
+        <p:style>
+          <a:lnRef idx="1">
+            <a:schemeClr val="dk1"/>
+          </a:lnRef>
+          <a:fillRef idx="0">
+            <a:schemeClr val="dk1"/>
+          </a:fillRef>
+          <a:effectRef idx="0">
+            <a:schemeClr val="dk1"/>
+          </a:effectRef>
+          <a:fontRef idx="minor">
+            <a:schemeClr val="tx1"/>
+          </a:fontRef>
+        </p:style>
+      </p:cxnSp>
+      <p:cxnSp>
+        <p:nvCxnSpPr>
+          <p:cNvPr id="78" name="Straight Connector 77">
+            <a:extLst>
+              <a:ext uri="{FF2B5EF4-FFF2-40B4-BE49-F238E27FC236}">
+                <a16:creationId xmlns:a16="http://schemas.microsoft.com/office/drawing/2014/main" id="{0A5513D1-A308-2249-6AA3-59B972D332FA}"/>
+              </a:ext>
+            </a:extLst>
+          </p:cNvPr>
+          <p:cNvCxnSpPr/>
+          <p:nvPr/>
+        </p:nvCxnSpPr>
+        <p:spPr>
+          <a:xfrm>
+            <a:off x="9085277" y="2315361"/>
+            <a:ext cx="0" cy="67112"/>
+          </a:xfrm>
+          <a:prstGeom prst="line">
+            <a:avLst/>
+          </a:prstGeom>
+        </p:spPr>
+        <p:style>
+          <a:lnRef idx="1">
+            <a:schemeClr val="dk1"/>
+          </a:lnRef>
+          <a:fillRef idx="0">
+            <a:schemeClr val="dk1"/>
+          </a:fillRef>
+          <a:effectRef idx="0">
+            <a:schemeClr val="dk1"/>
+          </a:effectRef>
+          <a:fontRef idx="minor">
+            <a:schemeClr val="tx1"/>
+          </a:fontRef>
+        </p:style>
+      </p:cxnSp>
+      <p:cxnSp>
+        <p:nvCxnSpPr>
+          <p:cNvPr id="80" name="Straight Arrow Connector 79">
+            <a:extLst>
+              <a:ext uri="{FF2B5EF4-FFF2-40B4-BE49-F238E27FC236}">
+                <a16:creationId xmlns:a16="http://schemas.microsoft.com/office/drawing/2014/main" id="{F867790A-B501-C88F-28B2-0ED436DC733A}"/>
+              </a:ext>
+            </a:extLst>
+          </p:cNvPr>
+          <p:cNvCxnSpPr/>
+          <p:nvPr/>
+        </p:nvCxnSpPr>
+        <p:spPr>
+          <a:xfrm flipH="1">
+            <a:off x="8819974" y="2382473"/>
+            <a:ext cx="265303" cy="96310"/>
+          </a:xfrm>
+          <a:prstGeom prst="straightConnector1">
+            <a:avLst/>
+          </a:prstGeom>
+          <a:ln>
+            <a:tailEnd type="triangle"/>
+          </a:ln>
+        </p:spPr>
+        <p:style>
+          <a:lnRef idx="1">
+            <a:schemeClr val="dk1"/>
+          </a:lnRef>
+          <a:fillRef idx="0">
+            <a:schemeClr val="dk1"/>
+          </a:fillRef>
+          <a:effectRef idx="0">
+            <a:schemeClr val="dk1"/>
+          </a:effectRef>
+          <a:fontRef idx="minor">
+            <a:schemeClr val="tx1"/>
+          </a:fontRef>
+        </p:style>
+      </p:cxnSp>
+      <p:sp>
+        <p:nvSpPr>
+          <p:cNvPr id="81" name="TextBox 80">
+            <a:extLst>
+              <a:ext uri="{FF2B5EF4-FFF2-40B4-BE49-F238E27FC236}">
+                <a16:creationId xmlns:a16="http://schemas.microsoft.com/office/drawing/2014/main" id="{56F02A74-4F6B-0B3E-C847-1A91AC4014CA}"/>
+              </a:ext>
+            </a:extLst>
+          </p:cNvPr>
+          <p:cNvSpPr txBox="1"/>
+          <p:nvPr/>
+        </p:nvSpPr>
+        <p:spPr>
+          <a:xfrm>
+            <a:off x="8717326" y="2063285"/>
+            <a:ext cx="548548" cy="276999"/>
+          </a:xfrm>
+          <a:prstGeom prst="rect">
+            <a:avLst/>
+          </a:prstGeom>
+          <a:noFill/>
+        </p:spPr>
+        <p:txBody>
+          <a:bodyPr wrap="none" rtlCol="0">
+            <a:spAutoFit/>
+          </a:bodyPr>
+          <a:lstStyle/>
+          <a:p>
+            <a:r>
+              <a:rPr lang="en-SG" sz="1200" dirty="0"/>
+              <a:t>load()</a:t>
+            </a:r>
+          </a:p>
+        </p:txBody>
+      </p:sp>
+      <p:cxnSp>
+        <p:nvCxnSpPr>
+          <p:cNvPr id="83" name="Straight Connector 82">
+            <a:extLst>
+              <a:ext uri="{FF2B5EF4-FFF2-40B4-BE49-F238E27FC236}">
+                <a16:creationId xmlns:a16="http://schemas.microsoft.com/office/drawing/2014/main" id="{DE30403D-97AF-8AB9-648C-C305296730BA}"/>
+              </a:ext>
+            </a:extLst>
+          </p:cNvPr>
+          <p:cNvCxnSpPr/>
+          <p:nvPr/>
+        </p:nvCxnSpPr>
+        <p:spPr>
+          <a:xfrm>
+            <a:off x="8815022" y="2835682"/>
+            <a:ext cx="353387" cy="0"/>
+          </a:xfrm>
+          <a:prstGeom prst="line">
+            <a:avLst/>
+          </a:prstGeom>
+        </p:spPr>
+        <p:style>
+          <a:lnRef idx="1">
+            <a:schemeClr val="dk1"/>
+          </a:lnRef>
+          <a:fillRef idx="0">
+            <a:schemeClr val="dk1"/>
+          </a:fillRef>
+          <a:effectRef idx="0">
+            <a:schemeClr val="dk1"/>
+          </a:effectRef>
+          <a:fontRef idx="minor">
+            <a:schemeClr val="tx1"/>
+          </a:fontRef>
+        </p:style>
+      </p:cxnSp>
+      <p:cxnSp>
+        <p:nvCxnSpPr>
+          <p:cNvPr id="84" name="Straight Connector 83">
+            <a:extLst>
+              <a:ext uri="{FF2B5EF4-FFF2-40B4-BE49-F238E27FC236}">
+                <a16:creationId xmlns:a16="http://schemas.microsoft.com/office/drawing/2014/main" id="{768BFBC0-1058-8783-CA03-86FA2A9F1A4F}"/>
+              </a:ext>
+            </a:extLst>
+          </p:cNvPr>
+          <p:cNvCxnSpPr/>
+          <p:nvPr/>
+        </p:nvCxnSpPr>
+        <p:spPr>
+          <a:xfrm>
+            <a:off x="9168409" y="2835682"/>
+            <a:ext cx="0" cy="67112"/>
+          </a:xfrm>
+          <a:prstGeom prst="line">
+            <a:avLst/>
+          </a:prstGeom>
+        </p:spPr>
+        <p:style>
+          <a:lnRef idx="1">
+            <a:schemeClr val="dk1"/>
+          </a:lnRef>
+          <a:fillRef idx="0">
+            <a:schemeClr val="dk1"/>
+          </a:fillRef>
+          <a:effectRef idx="0">
+            <a:schemeClr val="dk1"/>
+          </a:effectRef>
+          <a:fontRef idx="minor">
+            <a:schemeClr val="tx1"/>
+          </a:fontRef>
+        </p:style>
+      </p:cxnSp>
+      <p:cxnSp>
+        <p:nvCxnSpPr>
+          <p:cNvPr id="85" name="Straight Arrow Connector 84">
+            <a:extLst>
+              <a:ext uri="{FF2B5EF4-FFF2-40B4-BE49-F238E27FC236}">
+                <a16:creationId xmlns:a16="http://schemas.microsoft.com/office/drawing/2014/main" id="{27D422A4-3708-964F-D57B-141EA410691B}"/>
+              </a:ext>
+            </a:extLst>
+          </p:cNvPr>
+          <p:cNvCxnSpPr/>
+          <p:nvPr/>
+        </p:nvCxnSpPr>
+        <p:spPr>
+          <a:xfrm flipH="1">
+            <a:off x="8903106" y="2902794"/>
+            <a:ext cx="265303" cy="96310"/>
+          </a:xfrm>
+          <a:prstGeom prst="straightConnector1">
+            <a:avLst/>
+          </a:prstGeom>
+          <a:ln>
+            <a:tailEnd type="triangle"/>
+          </a:ln>
+        </p:spPr>
+        <p:style>
+          <a:lnRef idx="1">
+            <a:schemeClr val="dk1"/>
+          </a:lnRef>
+          <a:fillRef idx="0">
+            <a:schemeClr val="dk1"/>
+          </a:fillRef>
+          <a:effectRef idx="0">
+            <a:schemeClr val="dk1"/>
+          </a:effectRef>
+          <a:fontRef idx="minor">
+            <a:schemeClr val="tx1"/>
+          </a:fontRef>
+        </p:style>
+      </p:cxnSp>
+      <p:sp>
+        <p:nvSpPr>
+          <p:cNvPr id="86" name="TextBox 85">
+            <a:extLst>
+              <a:ext uri="{FF2B5EF4-FFF2-40B4-BE49-F238E27FC236}">
+                <a16:creationId xmlns:a16="http://schemas.microsoft.com/office/drawing/2014/main" id="{BE8E323D-B94E-6FFA-F7E7-7D74807011A8}"/>
+              </a:ext>
+            </a:extLst>
+          </p:cNvPr>
+          <p:cNvSpPr txBox="1"/>
+          <p:nvPr/>
+        </p:nvSpPr>
+        <p:spPr>
+          <a:xfrm>
+            <a:off x="8815022" y="2585496"/>
+            <a:ext cx="817019" cy="276999"/>
+          </a:xfrm>
+          <a:prstGeom prst="rect">
+            <a:avLst/>
+          </a:prstGeom>
+          <a:noFill/>
+        </p:spPr>
+        <p:txBody>
+          <a:bodyPr wrap="none" rtlCol="0">
+            <a:spAutoFit/>
+          </a:bodyPr>
+          <a:lstStyle/>
+          <a:p>
+            <a:r>
+              <a:rPr lang="en-SG" sz="1200" dirty="0"/>
+              <a:t>loadTask()</a:t>
+            </a:r>
+          </a:p>
+        </p:txBody>
+      </p:sp>
+      <p:cxnSp>
+        <p:nvCxnSpPr>
+          <p:cNvPr id="87" name="Straight Arrow Connector 86">
+            <a:extLst>
+              <a:ext uri="{FF2B5EF4-FFF2-40B4-BE49-F238E27FC236}">
+                <a16:creationId xmlns:a16="http://schemas.microsoft.com/office/drawing/2014/main" id="{390030B1-457A-E8F8-79FB-738A04BBB27B}"/>
+              </a:ext>
+            </a:extLst>
+          </p:cNvPr>
+          <p:cNvCxnSpPr>
+            <a:cxnSpLocks/>
+          </p:cNvCxnSpPr>
+          <p:nvPr/>
+        </p:nvCxnSpPr>
+        <p:spPr>
+          <a:xfrm flipH="1">
+            <a:off x="4921537" y="4720740"/>
+            <a:ext cx="3621961" cy="0"/>
+          </a:xfrm>
+          <a:prstGeom prst="straightConnector1">
+            <a:avLst/>
+          </a:prstGeom>
+          <a:ln>
+            <a:prstDash val="lgDash"/>
+            <a:tailEnd type="triangle"/>
+          </a:ln>
+        </p:spPr>
+        <p:style>
+          <a:lnRef idx="1">
+            <a:schemeClr val="dk1"/>
+          </a:lnRef>
+          <a:fillRef idx="0">
+            <a:schemeClr val="dk1"/>
+          </a:fillRef>
+          <a:effectRef idx="0">
+            <a:schemeClr val="dk1"/>
+          </a:effectRef>
+          <a:fontRef idx="minor">
+            <a:schemeClr val="tx1"/>
+          </a:fontRef>
+        </p:style>
+      </p:cxnSp>
+      <p:cxnSp>
+        <p:nvCxnSpPr>
+          <p:cNvPr id="89" name="Straight Arrow Connector 88">
+            <a:extLst>
+              <a:ext uri="{FF2B5EF4-FFF2-40B4-BE49-F238E27FC236}">
+                <a16:creationId xmlns:a16="http://schemas.microsoft.com/office/drawing/2014/main" id="{C8556C6D-39B6-CADD-FA68-9D276B84F8A9}"/>
+              </a:ext>
+            </a:extLst>
+          </p:cNvPr>
+          <p:cNvCxnSpPr>
+            <a:cxnSpLocks/>
+          </p:cNvCxnSpPr>
+          <p:nvPr/>
+        </p:nvCxnSpPr>
+        <p:spPr>
+          <a:xfrm flipH="1">
+            <a:off x="2969699" y="4883790"/>
+            <a:ext cx="1760997" cy="0"/>
+          </a:xfrm>
+          <a:prstGeom prst="straightConnector1">
+            <a:avLst/>
+          </a:prstGeom>
+          <a:ln>
+            <a:prstDash val="lgDash"/>
+            <a:tailEnd type="triangle"/>
+          </a:ln>
+        </p:spPr>
+        <p:style>
+          <a:lnRef idx="1">
+            <a:schemeClr val="dk1"/>
+          </a:lnRef>
+          <a:fillRef idx="0">
+            <a:schemeClr val="dk1"/>
+          </a:fillRef>
+          <a:effectRef idx="0">
+            <a:schemeClr val="dk1"/>
+          </a:effectRef>
+          <a:fontRef idx="minor">
+            <a:schemeClr val="tx1"/>
+          </a:fontRef>
+        </p:style>
+      </p:cxnSp>
+      <p:cxnSp>
+        <p:nvCxnSpPr>
+          <p:cNvPr id="91" name="Straight Connector 90">
+            <a:extLst>
+              <a:ext uri="{FF2B5EF4-FFF2-40B4-BE49-F238E27FC236}">
+                <a16:creationId xmlns:a16="http://schemas.microsoft.com/office/drawing/2014/main" id="{FE08440C-83BF-528F-5D86-F3659F223666}"/>
+              </a:ext>
+            </a:extLst>
+          </p:cNvPr>
+          <p:cNvCxnSpPr/>
+          <p:nvPr/>
+        </p:nvCxnSpPr>
+        <p:spPr>
+          <a:xfrm>
+            <a:off x="2978780" y="4999343"/>
+            <a:ext cx="353387" cy="0"/>
+          </a:xfrm>
+          <a:prstGeom prst="line">
+            <a:avLst/>
+          </a:prstGeom>
+        </p:spPr>
+        <p:style>
+          <a:lnRef idx="1">
+            <a:schemeClr val="dk1"/>
+          </a:lnRef>
+          <a:fillRef idx="0">
+            <a:schemeClr val="dk1"/>
+          </a:fillRef>
+          <a:effectRef idx="0">
+            <a:schemeClr val="dk1"/>
+          </a:effectRef>
+          <a:fontRef idx="minor">
+            <a:schemeClr val="tx1"/>
+          </a:fontRef>
+        </p:style>
+      </p:cxnSp>
+      <p:cxnSp>
+        <p:nvCxnSpPr>
+          <p:cNvPr id="92" name="Straight Connector 91">
+            <a:extLst>
+              <a:ext uri="{FF2B5EF4-FFF2-40B4-BE49-F238E27FC236}">
+                <a16:creationId xmlns:a16="http://schemas.microsoft.com/office/drawing/2014/main" id="{CDE4AC0F-FF91-3044-F625-926EECC51023}"/>
+              </a:ext>
+            </a:extLst>
+          </p:cNvPr>
+          <p:cNvCxnSpPr/>
+          <p:nvPr/>
+        </p:nvCxnSpPr>
+        <p:spPr>
+          <a:xfrm>
+            <a:off x="3332167" y="4999343"/>
+            <a:ext cx="0" cy="67112"/>
+          </a:xfrm>
+          <a:prstGeom prst="line">
+            <a:avLst/>
+          </a:prstGeom>
+        </p:spPr>
+        <p:style>
+          <a:lnRef idx="1">
+            <a:schemeClr val="dk1"/>
+          </a:lnRef>
+          <a:fillRef idx="0">
+            <a:schemeClr val="dk1"/>
+          </a:fillRef>
+          <a:effectRef idx="0">
+            <a:schemeClr val="dk1"/>
+          </a:effectRef>
+          <a:fontRef idx="minor">
+            <a:schemeClr val="tx1"/>
+          </a:fontRef>
+        </p:style>
+      </p:cxnSp>
+      <p:cxnSp>
+        <p:nvCxnSpPr>
+          <p:cNvPr id="93" name="Straight Arrow Connector 92">
+            <a:extLst>
+              <a:ext uri="{FF2B5EF4-FFF2-40B4-BE49-F238E27FC236}">
+                <a16:creationId xmlns:a16="http://schemas.microsoft.com/office/drawing/2014/main" id="{62CCAE40-5E59-749A-A413-3739106C7BE7}"/>
+              </a:ext>
+            </a:extLst>
+          </p:cNvPr>
+          <p:cNvCxnSpPr/>
+          <p:nvPr/>
+        </p:nvCxnSpPr>
+        <p:spPr>
+          <a:xfrm flipH="1">
+            <a:off x="3066864" y="5066455"/>
+            <a:ext cx="265303" cy="96310"/>
+          </a:xfrm>
+          <a:prstGeom prst="straightConnector1">
+            <a:avLst/>
+          </a:prstGeom>
+          <a:ln>
+            <a:tailEnd type="triangle"/>
+          </a:ln>
+        </p:spPr>
+        <p:style>
+          <a:lnRef idx="1">
+            <a:schemeClr val="dk1"/>
+          </a:lnRef>
+          <a:fillRef idx="0">
+            <a:schemeClr val="dk1"/>
+          </a:fillRef>
+          <a:effectRef idx="0">
+            <a:schemeClr val="dk1"/>
+          </a:effectRef>
+          <a:fontRef idx="minor">
+            <a:schemeClr val="tx1"/>
+          </a:fontRef>
+        </p:style>
+      </p:cxnSp>
+      <p:cxnSp>
+        <p:nvCxnSpPr>
+          <p:cNvPr id="94" name="Straight Connector 93">
+            <a:extLst>
+              <a:ext uri="{FF2B5EF4-FFF2-40B4-BE49-F238E27FC236}">
+                <a16:creationId xmlns:a16="http://schemas.microsoft.com/office/drawing/2014/main" id="{E9F0FCEF-F1B1-49F7-EA1A-2EAD07442D67}"/>
+              </a:ext>
+            </a:extLst>
+          </p:cNvPr>
+          <p:cNvCxnSpPr/>
+          <p:nvPr/>
+        </p:nvCxnSpPr>
+        <p:spPr>
+          <a:xfrm>
+            <a:off x="2978022" y="5674900"/>
+            <a:ext cx="353387" cy="0"/>
+          </a:xfrm>
+          <a:prstGeom prst="line">
+            <a:avLst/>
+          </a:prstGeom>
+        </p:spPr>
+        <p:style>
+          <a:lnRef idx="1">
+            <a:schemeClr val="dk1"/>
+          </a:lnRef>
+          <a:fillRef idx="0">
+            <a:schemeClr val="dk1"/>
+          </a:fillRef>
+          <a:effectRef idx="0">
+            <a:schemeClr val="dk1"/>
+          </a:effectRef>
+          <a:fontRef idx="minor">
+            <a:schemeClr val="tx1"/>
+          </a:fontRef>
+        </p:style>
+      </p:cxnSp>
+      <p:cxnSp>
+        <p:nvCxnSpPr>
+          <p:cNvPr id="95" name="Straight Connector 94">
+            <a:extLst>
+              <a:ext uri="{FF2B5EF4-FFF2-40B4-BE49-F238E27FC236}">
+                <a16:creationId xmlns:a16="http://schemas.microsoft.com/office/drawing/2014/main" id="{3FD0EBB0-0680-46E7-8B3E-4C6FA7F2BB89}"/>
+              </a:ext>
+            </a:extLst>
+          </p:cNvPr>
+          <p:cNvCxnSpPr/>
+          <p:nvPr/>
+        </p:nvCxnSpPr>
+        <p:spPr>
+          <a:xfrm>
+            <a:off x="3331409" y="5674900"/>
+            <a:ext cx="0" cy="67112"/>
+          </a:xfrm>
+          <a:prstGeom prst="line">
+            <a:avLst/>
+          </a:prstGeom>
+        </p:spPr>
+        <p:style>
+          <a:lnRef idx="1">
+            <a:schemeClr val="dk1"/>
+          </a:lnRef>
+          <a:fillRef idx="0">
+            <a:schemeClr val="dk1"/>
+          </a:fillRef>
+          <a:effectRef idx="0">
+            <a:schemeClr val="dk1"/>
+          </a:effectRef>
+          <a:fontRef idx="minor">
+            <a:schemeClr val="tx1"/>
+          </a:fontRef>
+        </p:style>
+      </p:cxnSp>
+      <p:cxnSp>
+        <p:nvCxnSpPr>
+          <p:cNvPr id="96" name="Straight Arrow Connector 95">
+            <a:extLst>
+              <a:ext uri="{FF2B5EF4-FFF2-40B4-BE49-F238E27FC236}">
+                <a16:creationId xmlns:a16="http://schemas.microsoft.com/office/drawing/2014/main" id="{AF38CE4E-DC18-3B01-DC26-95752C4279FF}"/>
+              </a:ext>
+            </a:extLst>
+          </p:cNvPr>
+          <p:cNvCxnSpPr/>
+          <p:nvPr/>
+        </p:nvCxnSpPr>
+        <p:spPr>
+          <a:xfrm flipH="1">
+            <a:off x="3066106" y="5742012"/>
+            <a:ext cx="265303" cy="96310"/>
+          </a:xfrm>
+          <a:prstGeom prst="straightConnector1">
+            <a:avLst/>
+          </a:prstGeom>
+          <a:ln>
+            <a:tailEnd type="triangle"/>
+          </a:ln>
+        </p:spPr>
+        <p:style>
+          <a:lnRef idx="1">
+            <a:schemeClr val="dk1"/>
+          </a:lnRef>
+          <a:fillRef idx="0">
+            <a:schemeClr val="dk1"/>
+          </a:fillRef>
+          <a:effectRef idx="0">
+            <a:schemeClr val="dk1"/>
+          </a:effectRef>
+          <a:fontRef idx="minor">
+            <a:schemeClr val="tx1"/>
+          </a:fontRef>
+        </p:style>
+      </p:cxnSp>
+      <p:sp>
+        <p:nvSpPr>
+          <p:cNvPr id="97" name="TextBox 96">
+            <a:extLst>
+              <a:ext uri="{FF2B5EF4-FFF2-40B4-BE49-F238E27FC236}">
+                <a16:creationId xmlns:a16="http://schemas.microsoft.com/office/drawing/2014/main" id="{FB69F809-8D0C-C7F5-69DE-A3E6044444EB}"/>
+              </a:ext>
+            </a:extLst>
+          </p:cNvPr>
+          <p:cNvSpPr txBox="1"/>
+          <p:nvPr/>
+        </p:nvSpPr>
+        <p:spPr>
+          <a:xfrm>
+            <a:off x="3287350" y="4927955"/>
+            <a:ext cx="956800" cy="276999"/>
+          </a:xfrm>
+          <a:prstGeom prst="rect">
+            <a:avLst/>
+          </a:prstGeom>
+          <a:noFill/>
+        </p:spPr>
+        <p:txBody>
+          <a:bodyPr wrap="none" rtlCol="0">
+            <a:spAutoFit/>
+          </a:bodyPr>
+          <a:lstStyle/>
+          <a:p>
+            <a:r>
+              <a:rPr lang="en-SG" sz="1200" dirty="0"/>
+              <a:t>borderLine()</a:t>
+            </a:r>
+          </a:p>
+        </p:txBody>
+      </p:sp>
+      <p:sp>
+        <p:nvSpPr>
+          <p:cNvPr id="98" name="TextBox 97">
+            <a:extLst>
+              <a:ext uri="{FF2B5EF4-FFF2-40B4-BE49-F238E27FC236}">
+                <a16:creationId xmlns:a16="http://schemas.microsoft.com/office/drawing/2014/main" id="{802727DC-3EAD-654D-DD4A-AB0303399A28}"/>
+              </a:ext>
+            </a:extLst>
+          </p:cNvPr>
+          <p:cNvSpPr txBox="1"/>
+          <p:nvPr/>
+        </p:nvSpPr>
+        <p:spPr>
+          <a:xfrm>
+            <a:off x="3052891" y="5431457"/>
+            <a:ext cx="956800" cy="276999"/>
+          </a:xfrm>
+          <a:prstGeom prst="rect">
+            <a:avLst/>
+          </a:prstGeom>
+          <a:noFill/>
+        </p:spPr>
+        <p:txBody>
+          <a:bodyPr wrap="none" rtlCol="0">
+            <a:spAutoFit/>
+          </a:bodyPr>
+          <a:lstStyle/>
+          <a:p>
+            <a:r>
+              <a:rPr lang="en-SG" sz="1200" dirty="0"/>
+              <a:t>borderLine()</a:t>
+            </a:r>
+          </a:p>
+        </p:txBody>
+      </p:sp>
+    </p:spTree>
+    <p:extLst>
+      <p:ext uri="{BB962C8B-B14F-4D97-AF65-F5344CB8AC3E}">
+        <p14:creationId xmlns:p14="http://schemas.microsoft.com/office/powerpoint/2010/main" val="3813339032"/>
       </p:ext>
     </p:extLst>
   </p:cSld>

</xml_diff>